<commit_message>
Expand deck with step-by-step MCP tutorial and clearer visuals
Co-authored-by: hassanahmedfoodservicesdirectunilever <hassanahmedfoodservicesdirectunilever@users.noreply.github.com>
</commit_message>
<xml_diff>
--- a/Solution_Assessment_Cursor_AI_Capabilities_Integration_Review.pptx
+++ b/Solution_Assessment_Cursor_AI_Capabilities_Integration_Review.pptx
@@ -17,6 +17,14 @@
     <p:sldId id="265" r:id="rId16"/>
     <p:sldId id="266" r:id="rId17"/>
     <p:sldId id="267" r:id="rId18"/>
+    <p:sldId id="268" r:id="rId19"/>
+    <p:sldId id="269" r:id="rId20"/>
+    <p:sldId id="270" r:id="rId21"/>
+    <p:sldId id="271" r:id="rId22"/>
+    <p:sldId id="272" r:id="rId23"/>
+    <p:sldId id="273" r:id="rId24"/>
+    <p:sldId id="274" r:id="rId25"/>
+    <p:sldId id="275" r:id="rId26"/>
   </p:sldIdLst>
   <p:sldSz cx="12191695" cy="6858000" type="screen4x3"/>
   <p:notesSz cx="6858000" cy="9144000"/>
@@ -3161,7 +3169,7 @@
                   <a:srgbClr val="465876"/>
                 </a:solidFill>
               </a:rPr>
-              <a:t>Prepared agenda covering MCP for Jira, Figma, Bitbucket, effective usage, and agent skills.</a:t>
+              <a:t>Training edition with step-by-step labs, commands, and adoption model.</a:t>
             </a:r>
           </a:p>
         </p:txBody>
@@ -3259,8 +3267,8 @@
         </p:blipFill>
         <p:spPr>
           <a:xfrm>
-            <a:off x="5486400" y="1143000"/>
-            <a:ext cx="6400800" cy="3600450"/>
+            <a:off x="5440680" y="1097280"/>
+            <a:ext cx="6537960" cy="3675786"/>
           </a:xfrm>
           <a:prstGeom prst="rect">
             <a:avLst/>
@@ -3314,7 +3322,7 @@
                   <a:srgbClr val="152A4B"/>
                 </a:solidFill>
               </a:rPr>
-              <a:t>Risk Management and Governance Controls</a:t>
+              <a:t>How to Add Agent Skills</a:t>
             </a:r>
           </a:p>
         </p:txBody>
@@ -3355,7 +3363,7 @@
               </a:defRPr>
             </a:pPr>
             <a:r>
-              <a:t>Top risks: over-permissioned tokens, unreviewed write actions, and prompt drift.</a:t>
+              <a:t>A skill package should include metadata, prompts, tools, and validation tests.</a:t>
             </a:r>
           </a:p>
           <a:p>
@@ -3373,7 +3381,7 @@
               </a:defRPr>
             </a:pPr>
             <a:r>
-              <a:t>Controls: RBAC, approval checkpoints, central logs, and benchmark test suites.</a:t>
+              <a:t>Use a versioned registry and changelog for transparent rollout and rollback.</a:t>
             </a:r>
           </a:p>
           <a:p>
@@ -3391,7 +3399,7 @@
               </a:defRPr>
             </a:pPr>
             <a:r>
-              <a:t>Security baseline: vault secrets, rotate credentials every 90 days, anomaly alerts.</a:t>
+              <a:t>Test each skill on golden tasks before publishing to teams.</a:t>
             </a:r>
           </a:p>
           <a:p>
@@ -3409,14 +3417,14 @@
               </a:defRPr>
             </a:pPr>
             <a:r>
-              <a:t>Ownership: platform team manages MCP; squad leads manage skill effectiveness.</a:t>
+              <a:t>Run monthly quality reviews to improve prompts and remove stale skills.</a:t>
             </a:r>
           </a:p>
         </p:txBody>
       </p:sp>
       <p:pic>
         <p:nvPicPr>
-          <p:cNvPr id="4" name="Picture 3" descr="risk_heatmap.png"/>
+          <p:cNvPr id="4" name="Picture 3" descr="skill_lifecycle.png"/>
           <p:cNvPicPr>
             <a:picLocks noChangeAspect="1"/>
           </p:cNvPicPr>
@@ -3430,8 +3438,8 @@
         </p:blipFill>
         <p:spPr>
           <a:xfrm>
-            <a:off x="5669280" y="1188720"/>
-            <a:ext cx="6217920" cy="3497580"/>
+            <a:off x="5440680" y="1143000"/>
+            <a:ext cx="6492240" cy="3650082"/>
           </a:xfrm>
           <a:prstGeom prst="rect">
             <a:avLst/>
@@ -3485,7 +3493,7 @@
                   <a:srgbClr val="152A4B"/>
                 </a:solidFill>
               </a:rPr>
-              <a:t>90-Day Rollout Roadmap</a:t>
+              <a:t>Tutorial Step 1: Local Environment Setup</a:t>
             </a:r>
           </a:p>
         </p:txBody>
@@ -3498,8 +3506,8 @@
         </p:nvSpPr>
         <p:spPr>
           <a:xfrm>
-            <a:off x="502920" y="1234440"/>
-            <a:ext cx="5029200" cy="5166360"/>
+            <a:off x="438912" y="749808"/>
+            <a:ext cx="10972800" cy="411480"/>
           </a:xfrm>
           <a:prstGeom prst="rect">
             <a:avLst/>
@@ -3507,108 +3515,321 @@
           <a:noFill/>
         </p:spPr>
         <p:txBody>
-          <a:bodyPr wrap="square">
+          <a:bodyPr wrap="none">
             <a:spAutoFit/>
           </a:bodyPr>
           <a:lstStyle/>
           <a:p>
-            <a:pPr>
-              <a:spcBef>
-                <a:spcPts val="200"/>
-              </a:spcBef>
-              <a:spcAft>
-                <a:spcPts val="1000"/>
-              </a:spcAft>
-              <a:defRPr sz="2200">
-                <a:solidFill>
-                  <a:srgbClr val="233452"/>
-                </a:solidFill>
-              </a:defRPr>
-            </a:pPr>
-            <a:r>
-              <a:t>Days 0-30: establish MCP connectors, security controls, and baseline metrics.</a:t>
-            </a:r>
-          </a:p>
-          <a:p>
-            <a:pPr>
-              <a:spcBef>
-                <a:spcPts val="200"/>
-              </a:spcBef>
-              <a:spcAft>
-                <a:spcPts val="1000"/>
-              </a:spcAft>
-              <a:defRPr sz="2200">
-                <a:solidFill>
-                  <a:srgbClr val="233452"/>
-                </a:solidFill>
-              </a:defRPr>
-            </a:pPr>
-            <a:r>
-              <a:t>Days 31-60: publish high-value skills, add CI quality gates, and train champions.</a:t>
-            </a:r>
-          </a:p>
-          <a:p>
-            <a:pPr>
-              <a:spcBef>
-                <a:spcPts val="200"/>
-              </a:spcBef>
-              <a:spcAft>
-                <a:spcPts val="1000"/>
-              </a:spcAft>
-              <a:defRPr sz="2200">
-                <a:solidFill>
-                  <a:srgbClr val="233452"/>
-                </a:solidFill>
-              </a:defRPr>
-            </a:pPr>
-            <a:r>
-              <a:t>Days 61-90: scale to additional squads and report quantified business impact.</a:t>
-            </a:r>
-          </a:p>
-          <a:p>
-            <a:pPr>
-              <a:spcBef>
-                <a:spcPts val="200"/>
-              </a:spcBef>
-              <a:spcAft>
-                <a:spcPts val="1000"/>
-              </a:spcAft>
-              <a:defRPr sz="2200">
-                <a:solidFill>
-                  <a:srgbClr val="233452"/>
-                </a:solidFill>
-              </a:defRPr>
-            </a:pPr>
-            <a:r>
-              <a:t>Success target: &gt;20% cycle-time improvement without governance incidents.</a:t>
-            </a:r>
-          </a:p>
-        </p:txBody>
-      </p:sp>
-      <p:pic>
-        <p:nvPicPr>
-          <p:cNvPr id="4" name="Picture 3" descr="roadmap.png"/>
-          <p:cNvPicPr>
-            <a:picLocks noChangeAspect="1"/>
-          </p:cNvPicPr>
+            <a:r>
+              <a:rPr sz="1800">
+                <a:solidFill>
+                  <a:srgbClr val="465876"/>
+                </a:solidFill>
+              </a:rPr>
+              <a:t>Run these commands once per developer machine.</a:t>
+            </a:r>
+          </a:p>
+        </p:txBody>
+      </p:sp>
+      <p:sp>
+        <p:nvSpPr>
+          <p:cNvPr id="4" name="Rounded Rectangle 3"/>
+          <p:cNvSpPr/>
           <p:nvPr/>
-        </p:nvPicPr>
-        <p:blipFill>
-          <a:blip r:embed="rId2"/>
-          <a:stretch>
-            <a:fillRect/>
-          </a:stretch>
-        </p:blipFill>
-        <p:spPr>
-          <a:xfrm>
-            <a:off x="5669280" y="1188720"/>
-            <a:ext cx="6217920" cy="3497580"/>
-          </a:xfrm>
-          <a:prstGeom prst="rect">
+        </p:nvSpPr>
+        <p:spPr>
+          <a:xfrm>
+            <a:off x="502920" y="1508760"/>
+            <a:ext cx="11155680" cy="4983480"/>
+          </a:xfrm>
+          <a:prstGeom prst="roundRect">
             <a:avLst/>
           </a:prstGeom>
-        </p:spPr>
-      </p:pic>
+          <a:solidFill>
+            <a:srgbClr val="182134"/>
+          </a:solidFill>
+          <a:ln>
+            <a:solidFill>
+              <a:srgbClr val="182134"/>
+            </a:solidFill>
+          </a:ln>
+        </p:spPr>
+        <p:style>
+          <a:lnRef idx="1">
+            <a:schemeClr val="accent1"/>
+          </a:lnRef>
+          <a:fillRef idx="3">
+            <a:schemeClr val="accent1"/>
+          </a:fillRef>
+          <a:effectRef idx="2">
+            <a:schemeClr val="accent1"/>
+          </a:effectRef>
+          <a:fontRef idx="minor">
+            <a:schemeClr val="lt1"/>
+          </a:fontRef>
+        </p:style>
+        <p:txBody>
+          <a:bodyPr rtlCol="0" anchor="ctr" wrap="square"/>
+          <a:lstStyle/>
+          <a:p>
+            <a:pPr algn="ctr">
+              <a:spcBef>
+                <a:spcPts val="0"/>
+              </a:spcBef>
+              <a:spcAft>
+                <a:spcPts val="300"/>
+              </a:spcAft>
+              <a:defRPr sz="1500">
+                <a:solidFill>
+                  <a:srgbClr val="E8EEFC"/>
+                </a:solidFill>
+                <a:latin typeface="DejaVu Sans Mono"/>
+              </a:defRPr>
+            </a:pPr>
+            <a:r>
+              <a:t># 1) Create training workspace</a:t>
+            </a:r>
+          </a:p>
+          <a:p>
+            <a:pPr>
+              <a:spcBef>
+                <a:spcPts val="0"/>
+              </a:spcBef>
+              <a:spcAft>
+                <a:spcPts val="300"/>
+              </a:spcAft>
+              <a:defRPr sz="1500">
+                <a:solidFill>
+                  <a:srgbClr val="E8EEFC"/>
+                </a:solidFill>
+                <a:latin typeface="DejaVu Sans Mono"/>
+              </a:defRPr>
+            </a:pPr>
+            <a:r>
+              <a:t>mkdir -p ~/cursor-mcp-training/{servers,skills,logs} &amp;&amp; cd ~/cursor-mcp-training</a:t>
+            </a:r>
+          </a:p>
+          <a:p>
+            <a:pPr>
+              <a:spcBef>
+                <a:spcPts val="0"/>
+              </a:spcBef>
+              <a:spcAft>
+                <a:spcPts val="300"/>
+              </a:spcAft>
+              <a:defRPr sz="1500">
+                <a:solidFill>
+                  <a:srgbClr val="E8EEFC"/>
+                </a:solidFill>
+                <a:latin typeface="DejaVu Sans Mono"/>
+              </a:defRPr>
+            </a:pPr>
+          </a:p>
+          <a:p>
+            <a:pPr>
+              <a:spcBef>
+                <a:spcPts val="0"/>
+              </a:spcBef>
+              <a:spcAft>
+                <a:spcPts val="300"/>
+              </a:spcAft>
+              <a:defRPr sz="1500">
+                <a:solidFill>
+                  <a:srgbClr val="E8EEFC"/>
+                </a:solidFill>
+                <a:latin typeface="DejaVu Sans Mono"/>
+              </a:defRPr>
+            </a:pPr>
+            <a:r>
+              <a:t># 2) Create Python environment for helper scripts</a:t>
+            </a:r>
+          </a:p>
+          <a:p>
+            <a:pPr>
+              <a:spcBef>
+                <a:spcPts val="0"/>
+              </a:spcBef>
+              <a:spcAft>
+                <a:spcPts val="300"/>
+              </a:spcAft>
+              <a:defRPr sz="1500">
+                <a:solidFill>
+                  <a:srgbClr val="E8EEFC"/>
+                </a:solidFill>
+                <a:latin typeface="DejaVu Sans Mono"/>
+              </a:defRPr>
+            </a:pPr>
+            <a:r>
+              <a:t>python3 -m venv .venv</a:t>
+            </a:r>
+          </a:p>
+          <a:p>
+            <a:pPr>
+              <a:spcBef>
+                <a:spcPts val="0"/>
+              </a:spcBef>
+              <a:spcAft>
+                <a:spcPts val="300"/>
+              </a:spcAft>
+              <a:defRPr sz="1500">
+                <a:solidFill>
+                  <a:srgbClr val="E8EEFC"/>
+                </a:solidFill>
+                <a:latin typeface="DejaVu Sans Mono"/>
+              </a:defRPr>
+            </a:pPr>
+            <a:r>
+              <a:t>source .venv/bin/activate</a:t>
+            </a:r>
+          </a:p>
+          <a:p>
+            <a:pPr>
+              <a:spcBef>
+                <a:spcPts val="0"/>
+              </a:spcBef>
+              <a:spcAft>
+                <a:spcPts val="300"/>
+              </a:spcAft>
+              <a:defRPr sz="1500">
+                <a:solidFill>
+                  <a:srgbClr val="E8EEFC"/>
+                </a:solidFill>
+                <a:latin typeface="DejaVu Sans Mono"/>
+              </a:defRPr>
+            </a:pPr>
+            <a:r>
+              <a:t>python -m pip install --upgrade pip</a:t>
+            </a:r>
+          </a:p>
+          <a:p>
+            <a:pPr>
+              <a:spcBef>
+                <a:spcPts val="0"/>
+              </a:spcBef>
+              <a:spcAft>
+                <a:spcPts val="300"/>
+              </a:spcAft>
+              <a:defRPr sz="1500">
+                <a:solidFill>
+                  <a:srgbClr val="E8EEFC"/>
+                </a:solidFill>
+                <a:latin typeface="DejaVu Sans Mono"/>
+              </a:defRPr>
+            </a:pPr>
+            <a:r>
+              <a:t>pip install mcp httpx python-dotenv pyyaml</a:t>
+            </a:r>
+          </a:p>
+          <a:p>
+            <a:pPr>
+              <a:spcBef>
+                <a:spcPts val="0"/>
+              </a:spcBef>
+              <a:spcAft>
+                <a:spcPts val="300"/>
+              </a:spcAft>
+              <a:defRPr sz="1500">
+                <a:solidFill>
+                  <a:srgbClr val="E8EEFC"/>
+                </a:solidFill>
+                <a:latin typeface="DejaVu Sans Mono"/>
+              </a:defRPr>
+            </a:pPr>
+          </a:p>
+          <a:p>
+            <a:pPr>
+              <a:spcBef>
+                <a:spcPts val="0"/>
+              </a:spcBef>
+              <a:spcAft>
+                <a:spcPts val="300"/>
+              </a:spcAft>
+              <a:defRPr sz="1500">
+                <a:solidFill>
+                  <a:srgbClr val="E8EEFC"/>
+                </a:solidFill>
+                <a:latin typeface="DejaVu Sans Mono"/>
+              </a:defRPr>
+            </a:pPr>
+            <a:r>
+              <a:t># 3) Verify runtime versions</a:t>
+            </a:r>
+          </a:p>
+          <a:p>
+            <a:pPr>
+              <a:spcBef>
+                <a:spcPts val="0"/>
+              </a:spcBef>
+              <a:spcAft>
+                <a:spcPts val="300"/>
+              </a:spcAft>
+              <a:defRPr sz="1500">
+                <a:solidFill>
+                  <a:srgbClr val="E8EEFC"/>
+                </a:solidFill>
+                <a:latin typeface="DejaVu Sans Mono"/>
+              </a:defRPr>
+            </a:pPr>
+            <a:r>
+              <a:t>python --version &amp;&amp; node --version &amp;&amp; npm --version</a:t>
+            </a:r>
+          </a:p>
+          <a:p>
+            <a:pPr>
+              <a:spcBef>
+                <a:spcPts val="0"/>
+              </a:spcBef>
+              <a:spcAft>
+                <a:spcPts val="300"/>
+              </a:spcAft>
+              <a:defRPr sz="1500">
+                <a:solidFill>
+                  <a:srgbClr val="E8EEFC"/>
+                </a:solidFill>
+                <a:latin typeface="DejaVu Sans Mono"/>
+              </a:defRPr>
+            </a:pPr>
+          </a:p>
+          <a:p>
+            <a:pPr>
+              <a:spcBef>
+                <a:spcPts val="0"/>
+              </a:spcBef>
+              <a:spcAft>
+                <a:spcPts val="300"/>
+              </a:spcAft>
+              <a:defRPr sz="1500">
+                <a:solidFill>
+                  <a:srgbClr val="E8EEFC"/>
+                </a:solidFill>
+                <a:latin typeface="DejaVu Sans Mono"/>
+              </a:defRPr>
+            </a:pPr>
+            <a:r>
+              <a:t># 4) Optional CLI helper</a:t>
+            </a:r>
+          </a:p>
+          <a:p>
+            <a:pPr>
+              <a:spcBef>
+                <a:spcPts val="0"/>
+              </a:spcBef>
+              <a:spcAft>
+                <a:spcPts val="300"/>
+              </a:spcAft>
+              <a:defRPr sz="1500">
+                <a:solidFill>
+                  <a:srgbClr val="E8EEFC"/>
+                </a:solidFill>
+                <a:latin typeface="DejaVu Sans Mono"/>
+              </a:defRPr>
+            </a:pPr>
+            <a:r>
+              <a:t>sudo apt-get update &amp;&amp; sudo apt-get install -y jq</a:t>
+            </a:r>
+          </a:p>
+        </p:txBody>
+      </p:sp>
     </p:spTree>
   </p:cSld>
   <p:clrMapOvr>
@@ -3656,7 +3877,7 @@
                   <a:srgbClr val="152A4B"/>
                 </a:solidFill>
               </a:rPr>
-              <a:t>Recommended Next Steps</a:t>
+              <a:t>Tutorial Step 2: Configure MCP Servers in Cursor</a:t>
             </a:r>
           </a:p>
         </p:txBody>
@@ -3669,8 +3890,8 @@
         </p:nvSpPr>
         <p:spPr>
           <a:xfrm>
-            <a:off x="822960" y="1463040"/>
-            <a:ext cx="5029200" cy="4937760"/>
+            <a:off x="438912" y="749808"/>
+            <a:ext cx="10972800" cy="411480"/>
           </a:xfrm>
           <a:prstGeom prst="rect">
             <a:avLst/>
@@ -3678,6 +3899,2116 @@
           <a:noFill/>
         </p:spPr>
         <p:txBody>
+          <a:bodyPr wrap="none">
+            <a:spAutoFit/>
+          </a:bodyPr>
+          <a:lstStyle/>
+          <a:p>
+            <a:r>
+              <a:rPr sz="1800">
+                <a:solidFill>
+                  <a:srgbClr val="465876"/>
+                </a:solidFill>
+              </a:rPr>
+              <a:t>Use this as a template and replace placeholders with your values.</a:t>
+            </a:r>
+          </a:p>
+        </p:txBody>
+      </p:sp>
+      <p:sp>
+        <p:nvSpPr>
+          <p:cNvPr id="4" name="Rounded Rectangle 3"/>
+          <p:cNvSpPr/>
+          <p:nvPr/>
+        </p:nvSpPr>
+        <p:spPr>
+          <a:xfrm>
+            <a:off x="502920" y="1508760"/>
+            <a:ext cx="11155680" cy="4983480"/>
+          </a:xfrm>
+          <a:prstGeom prst="roundRect">
+            <a:avLst/>
+          </a:prstGeom>
+          <a:solidFill>
+            <a:srgbClr val="182134"/>
+          </a:solidFill>
+          <a:ln>
+            <a:solidFill>
+              <a:srgbClr val="182134"/>
+            </a:solidFill>
+          </a:ln>
+        </p:spPr>
+        <p:style>
+          <a:lnRef idx="1">
+            <a:schemeClr val="accent1"/>
+          </a:lnRef>
+          <a:fillRef idx="3">
+            <a:schemeClr val="accent1"/>
+          </a:fillRef>
+          <a:effectRef idx="2">
+            <a:schemeClr val="accent1"/>
+          </a:effectRef>
+          <a:fontRef idx="minor">
+            <a:schemeClr val="lt1"/>
+          </a:fontRef>
+        </p:style>
+        <p:txBody>
+          <a:bodyPr rtlCol="0" anchor="ctr" wrap="square"/>
+          <a:lstStyle/>
+          <a:p>
+            <a:pPr algn="ctr">
+              <a:spcBef>
+                <a:spcPts val="0"/>
+              </a:spcBef>
+              <a:spcAft>
+                <a:spcPts val="300"/>
+              </a:spcAft>
+              <a:defRPr sz="1500">
+                <a:solidFill>
+                  <a:srgbClr val="E8EEFC"/>
+                </a:solidFill>
+                <a:latin typeface="DejaVu Sans Mono"/>
+              </a:defRPr>
+            </a:pPr>
+            <a:r>
+              <a:t># 1) Store credentials</a:t>
+            </a:r>
+          </a:p>
+          <a:p>
+            <a:pPr>
+              <a:spcBef>
+                <a:spcPts val="0"/>
+              </a:spcBef>
+              <a:spcAft>
+                <a:spcPts val="300"/>
+              </a:spcAft>
+              <a:defRPr sz="1500">
+                <a:solidFill>
+                  <a:srgbClr val="E8EEFC"/>
+                </a:solidFill>
+                <a:latin typeface="DejaVu Sans Mono"/>
+              </a:defRPr>
+            </a:pPr>
+            <a:r>
+              <a:t>cat &gt; .env &lt;&lt;'EOF'</a:t>
+            </a:r>
+          </a:p>
+          <a:p>
+            <a:pPr>
+              <a:spcBef>
+                <a:spcPts val="0"/>
+              </a:spcBef>
+              <a:spcAft>
+                <a:spcPts val="300"/>
+              </a:spcAft>
+              <a:defRPr sz="1500">
+                <a:solidFill>
+                  <a:srgbClr val="E8EEFC"/>
+                </a:solidFill>
+                <a:latin typeface="DejaVu Sans Mono"/>
+              </a:defRPr>
+            </a:pPr>
+            <a:r>
+              <a:t>JIRA_BASE_URL=https://your-company.atlassian.net</a:t>
+            </a:r>
+          </a:p>
+          <a:p>
+            <a:pPr>
+              <a:spcBef>
+                <a:spcPts val="0"/>
+              </a:spcBef>
+              <a:spcAft>
+                <a:spcPts val="300"/>
+              </a:spcAft>
+              <a:defRPr sz="1500">
+                <a:solidFill>
+                  <a:srgbClr val="E8EEFC"/>
+                </a:solidFill>
+                <a:latin typeface="DejaVu Sans Mono"/>
+              </a:defRPr>
+            </a:pPr>
+            <a:r>
+              <a:t>JIRA_EMAIL=you@company.com</a:t>
+            </a:r>
+          </a:p>
+          <a:p>
+            <a:pPr>
+              <a:spcBef>
+                <a:spcPts val="0"/>
+              </a:spcBef>
+              <a:spcAft>
+                <a:spcPts val="300"/>
+              </a:spcAft>
+              <a:defRPr sz="1500">
+                <a:solidFill>
+                  <a:srgbClr val="E8EEFC"/>
+                </a:solidFill>
+                <a:latin typeface="DejaVu Sans Mono"/>
+              </a:defRPr>
+            </a:pPr>
+            <a:r>
+              <a:t>JIRA_API_TOKEN=&lt;jira_token&gt;</a:t>
+            </a:r>
+          </a:p>
+          <a:p>
+            <a:pPr>
+              <a:spcBef>
+                <a:spcPts val="0"/>
+              </a:spcBef>
+              <a:spcAft>
+                <a:spcPts val="300"/>
+              </a:spcAft>
+              <a:defRPr sz="1500">
+                <a:solidFill>
+                  <a:srgbClr val="E8EEFC"/>
+                </a:solidFill>
+                <a:latin typeface="DejaVu Sans Mono"/>
+              </a:defRPr>
+            </a:pPr>
+            <a:r>
+              <a:t>FIGMA_TOKEN=&lt;figma_token&gt;</a:t>
+            </a:r>
+          </a:p>
+          <a:p>
+            <a:pPr>
+              <a:spcBef>
+                <a:spcPts val="0"/>
+              </a:spcBef>
+              <a:spcAft>
+                <a:spcPts val="300"/>
+              </a:spcAft>
+              <a:defRPr sz="1500">
+                <a:solidFill>
+                  <a:srgbClr val="E8EEFC"/>
+                </a:solidFill>
+                <a:latin typeface="DejaVu Sans Mono"/>
+              </a:defRPr>
+            </a:pPr>
+            <a:r>
+              <a:t>BITBUCKET_WORKSPACE=&lt;workspace&gt;</a:t>
+            </a:r>
+          </a:p>
+          <a:p>
+            <a:pPr>
+              <a:spcBef>
+                <a:spcPts val="0"/>
+              </a:spcBef>
+              <a:spcAft>
+                <a:spcPts val="300"/>
+              </a:spcAft>
+              <a:defRPr sz="1500">
+                <a:solidFill>
+                  <a:srgbClr val="E8EEFC"/>
+                </a:solidFill>
+                <a:latin typeface="DejaVu Sans Mono"/>
+              </a:defRPr>
+            </a:pPr>
+            <a:r>
+              <a:t>BITBUCKET_USERNAME=&lt;username&gt;</a:t>
+            </a:r>
+          </a:p>
+          <a:p>
+            <a:pPr>
+              <a:spcBef>
+                <a:spcPts val="0"/>
+              </a:spcBef>
+              <a:spcAft>
+                <a:spcPts val="300"/>
+              </a:spcAft>
+              <a:defRPr sz="1500">
+                <a:solidFill>
+                  <a:srgbClr val="E8EEFC"/>
+                </a:solidFill>
+                <a:latin typeface="DejaVu Sans Mono"/>
+              </a:defRPr>
+            </a:pPr>
+            <a:r>
+              <a:t>BITBUCKET_APP_PASSWORD=&lt;app_password&gt;</a:t>
+            </a:r>
+          </a:p>
+          <a:p>
+            <a:pPr>
+              <a:spcBef>
+                <a:spcPts val="0"/>
+              </a:spcBef>
+              <a:spcAft>
+                <a:spcPts val="300"/>
+              </a:spcAft>
+              <a:defRPr sz="1500">
+                <a:solidFill>
+                  <a:srgbClr val="E8EEFC"/>
+                </a:solidFill>
+                <a:latin typeface="DejaVu Sans Mono"/>
+              </a:defRPr>
+            </a:pPr>
+            <a:r>
+              <a:t>EOF</a:t>
+            </a:r>
+          </a:p>
+          <a:p>
+            <a:pPr>
+              <a:spcBef>
+                <a:spcPts val="0"/>
+              </a:spcBef>
+              <a:spcAft>
+                <a:spcPts val="300"/>
+              </a:spcAft>
+              <a:defRPr sz="1500">
+                <a:solidFill>
+                  <a:srgbClr val="E8EEFC"/>
+                </a:solidFill>
+                <a:latin typeface="DejaVu Sans Mono"/>
+              </a:defRPr>
+            </a:pPr>
+          </a:p>
+          <a:p>
+            <a:pPr>
+              <a:spcBef>
+                <a:spcPts val="0"/>
+              </a:spcBef>
+              <a:spcAft>
+                <a:spcPts val="300"/>
+              </a:spcAft>
+              <a:defRPr sz="1500">
+                <a:solidFill>
+                  <a:srgbClr val="E8EEFC"/>
+                </a:solidFill>
+                <a:latin typeface="DejaVu Sans Mono"/>
+              </a:defRPr>
+            </a:pPr>
+            <a:r>
+              <a:t># 2) Cursor MCP config</a:t>
+            </a:r>
+          </a:p>
+          <a:p>
+            <a:pPr>
+              <a:spcBef>
+                <a:spcPts val="0"/>
+              </a:spcBef>
+              <a:spcAft>
+                <a:spcPts val="300"/>
+              </a:spcAft>
+              <a:defRPr sz="1500">
+                <a:solidFill>
+                  <a:srgbClr val="E8EEFC"/>
+                </a:solidFill>
+                <a:latin typeface="DejaVu Sans Mono"/>
+              </a:defRPr>
+            </a:pPr>
+            <a:r>
+              <a:t>mkdir -p .cursor</a:t>
+            </a:r>
+          </a:p>
+          <a:p>
+            <a:pPr>
+              <a:spcBef>
+                <a:spcPts val="0"/>
+              </a:spcBef>
+              <a:spcAft>
+                <a:spcPts val="300"/>
+              </a:spcAft>
+              <a:defRPr sz="1500">
+                <a:solidFill>
+                  <a:srgbClr val="E8EEFC"/>
+                </a:solidFill>
+                <a:latin typeface="DejaVu Sans Mono"/>
+              </a:defRPr>
+            </a:pPr>
+            <a:r>
+              <a:t>cat &gt; .cursor/mcp.json &lt;&lt;'JSON'</a:t>
+            </a:r>
+          </a:p>
+          <a:p>
+            <a:pPr>
+              <a:spcBef>
+                <a:spcPts val="0"/>
+              </a:spcBef>
+              <a:spcAft>
+                <a:spcPts val="300"/>
+              </a:spcAft>
+              <a:defRPr sz="1500">
+                <a:solidFill>
+                  <a:srgbClr val="E8EEFC"/>
+                </a:solidFill>
+                <a:latin typeface="DejaVu Sans Mono"/>
+              </a:defRPr>
+            </a:pPr>
+            <a:r>
+              <a:t>{"mcpServers":{"jira":{"command":"python","args":["servers/jira_server.py"],"envFile":".env"},"figma":{"command":"python","args":["servers/figma_server.py"],"envFile":".env"},"bitbucket":{"command":"python","args":["servers/bitbucket_server.py"],"envFile":".env"}}}</a:t>
+            </a:r>
+          </a:p>
+          <a:p>
+            <a:pPr>
+              <a:spcBef>
+                <a:spcPts val="0"/>
+              </a:spcBef>
+              <a:spcAft>
+                <a:spcPts val="300"/>
+              </a:spcAft>
+              <a:defRPr sz="1500">
+                <a:solidFill>
+                  <a:srgbClr val="E8EEFC"/>
+                </a:solidFill>
+                <a:latin typeface="DejaVu Sans Mono"/>
+              </a:defRPr>
+            </a:pPr>
+            <a:r>
+              <a:t>JSON</a:t>
+            </a:r>
+          </a:p>
+        </p:txBody>
+      </p:sp>
+    </p:spTree>
+  </p:cSld>
+  <p:clrMapOvr>
+    <a:masterClrMapping/>
+  </p:clrMapOvr>
+</p:sld>
+</file>
+
+<file path=ppt/slides/slide13.xml><?xml version="1.0" encoding="utf-8"?>
+<p:sld xmlns:a="http://schemas.openxmlformats.org/drawingml/2006/main" xmlns:p="http://schemas.openxmlformats.org/presentationml/2006/main" xmlns:r="http://schemas.openxmlformats.org/officeDocument/2006/relationships">
+  <p:cSld>
+    <p:spTree>
+      <p:nvGrpSpPr>
+        <p:cNvPr id="1" name=""/>
+        <p:cNvGrpSpPr/>
+        <p:nvPr/>
+      </p:nvGrpSpPr>
+      <p:grpSpPr/>
+      <p:sp>
+        <p:nvSpPr>
+          <p:cNvPr id="2" name="TextBox 1"/>
+          <p:cNvSpPr txBox="1"/>
+          <p:nvPr/>
+        </p:nvSpPr>
+        <p:spPr>
+          <a:xfrm>
+            <a:off x="411480" y="146304"/>
+            <a:ext cx="11155680" cy="640080"/>
+          </a:xfrm>
+          <a:prstGeom prst="rect">
+            <a:avLst/>
+          </a:prstGeom>
+          <a:noFill/>
+        </p:spPr>
+        <p:txBody>
+          <a:bodyPr wrap="none">
+            <a:spAutoFit/>
+          </a:bodyPr>
+          <a:lstStyle/>
+          <a:p>
+            <a:pPr algn="l"/>
+            <a:r>
+              <a:rPr sz="3400" b="1">
+                <a:solidFill>
+                  <a:srgbClr val="152A4B"/>
+                </a:solidFill>
+              </a:rPr>
+              <a:t>Tutorial Step 3: Jira Lab (Ticket Triage + Acceptance Criteria)</a:t>
+            </a:r>
+          </a:p>
+        </p:txBody>
+      </p:sp>
+      <p:sp>
+        <p:nvSpPr>
+          <p:cNvPr id="3" name="TextBox 2"/>
+          <p:cNvSpPr txBox="1"/>
+          <p:nvPr/>
+        </p:nvSpPr>
+        <p:spPr>
+          <a:xfrm>
+            <a:off x="438912" y="749808"/>
+            <a:ext cx="10972800" cy="411480"/>
+          </a:xfrm>
+          <a:prstGeom prst="rect">
+            <a:avLst/>
+          </a:prstGeom>
+          <a:noFill/>
+        </p:spPr>
+        <p:txBody>
+          <a:bodyPr wrap="none">
+            <a:spAutoFit/>
+          </a:bodyPr>
+          <a:lstStyle/>
+          <a:p>
+            <a:r>
+              <a:rPr sz="1800">
+                <a:solidFill>
+                  <a:srgbClr val="465876"/>
+                </a:solidFill>
+              </a:rPr>
+              <a:t>First validate API access, then run the workflow from Cursor chat.</a:t>
+            </a:r>
+          </a:p>
+        </p:txBody>
+      </p:sp>
+      <p:sp>
+        <p:nvSpPr>
+          <p:cNvPr id="4" name="Rounded Rectangle 3"/>
+          <p:cNvSpPr/>
+          <p:nvPr/>
+        </p:nvSpPr>
+        <p:spPr>
+          <a:xfrm>
+            <a:off x="502920" y="1508760"/>
+            <a:ext cx="11155680" cy="4983480"/>
+          </a:xfrm>
+          <a:prstGeom prst="roundRect">
+            <a:avLst/>
+          </a:prstGeom>
+          <a:solidFill>
+            <a:srgbClr val="182134"/>
+          </a:solidFill>
+          <a:ln>
+            <a:solidFill>
+              <a:srgbClr val="182134"/>
+            </a:solidFill>
+          </a:ln>
+        </p:spPr>
+        <p:style>
+          <a:lnRef idx="1">
+            <a:schemeClr val="accent1"/>
+          </a:lnRef>
+          <a:fillRef idx="3">
+            <a:schemeClr val="accent1"/>
+          </a:fillRef>
+          <a:effectRef idx="2">
+            <a:schemeClr val="accent1"/>
+          </a:effectRef>
+          <a:fontRef idx="minor">
+            <a:schemeClr val="lt1"/>
+          </a:fontRef>
+        </p:style>
+        <p:txBody>
+          <a:bodyPr rtlCol="0" anchor="ctr" wrap="square"/>
+          <a:lstStyle/>
+          <a:p>
+            <a:pPr algn="ctr">
+              <a:spcBef>
+                <a:spcPts val="0"/>
+              </a:spcBef>
+              <a:spcAft>
+                <a:spcPts val="300"/>
+              </a:spcAft>
+              <a:defRPr sz="1500">
+                <a:solidFill>
+                  <a:srgbClr val="E8EEFC"/>
+                </a:solidFill>
+                <a:latin typeface="DejaVu Sans Mono"/>
+              </a:defRPr>
+            </a:pPr>
+            <a:r>
+              <a:t>source .venv/bin/activate &amp;&amp; source .env</a:t>
+            </a:r>
+          </a:p>
+          <a:p>
+            <a:pPr>
+              <a:spcBef>
+                <a:spcPts val="0"/>
+              </a:spcBef>
+              <a:spcAft>
+                <a:spcPts val="300"/>
+              </a:spcAft>
+              <a:defRPr sz="1500">
+                <a:solidFill>
+                  <a:srgbClr val="E8EEFC"/>
+                </a:solidFill>
+                <a:latin typeface="DejaVu Sans Mono"/>
+              </a:defRPr>
+            </a:pPr>
+          </a:p>
+          <a:p>
+            <a:pPr>
+              <a:spcBef>
+                <a:spcPts val="0"/>
+              </a:spcBef>
+              <a:spcAft>
+                <a:spcPts val="300"/>
+              </a:spcAft>
+              <a:defRPr sz="1500">
+                <a:solidFill>
+                  <a:srgbClr val="E8EEFC"/>
+                </a:solidFill>
+                <a:latin typeface="DejaVu Sans Mono"/>
+              </a:defRPr>
+            </a:pPr>
+            <a:r>
+              <a:t># Validate Jira token and user</a:t>
+            </a:r>
+          </a:p>
+          <a:p>
+            <a:pPr>
+              <a:spcBef>
+                <a:spcPts val="0"/>
+              </a:spcBef>
+              <a:spcAft>
+                <a:spcPts val="300"/>
+              </a:spcAft>
+              <a:defRPr sz="1500">
+                <a:solidFill>
+                  <a:srgbClr val="E8EEFC"/>
+                </a:solidFill>
+                <a:latin typeface="DejaVu Sans Mono"/>
+              </a:defRPr>
+            </a:pPr>
+            <a:r>
+              <a:t>curl -s -u "$JIRA_EMAIL:$JIRA_API_TOKEN" "$JIRA_BASE_URL/rest/api/3/myself" | jq '.displayName'</a:t>
+            </a:r>
+          </a:p>
+          <a:p>
+            <a:pPr>
+              <a:spcBef>
+                <a:spcPts val="0"/>
+              </a:spcBef>
+              <a:spcAft>
+                <a:spcPts val="300"/>
+              </a:spcAft>
+              <a:defRPr sz="1500">
+                <a:solidFill>
+                  <a:srgbClr val="E8EEFC"/>
+                </a:solidFill>
+                <a:latin typeface="DejaVu Sans Mono"/>
+              </a:defRPr>
+            </a:pPr>
+          </a:p>
+          <a:p>
+            <a:pPr>
+              <a:spcBef>
+                <a:spcPts val="0"/>
+              </a:spcBef>
+              <a:spcAft>
+                <a:spcPts val="300"/>
+              </a:spcAft>
+              <a:defRPr sz="1500">
+                <a:solidFill>
+                  <a:srgbClr val="E8EEFC"/>
+                </a:solidFill>
+                <a:latin typeface="DejaVu Sans Mono"/>
+              </a:defRPr>
+            </a:pPr>
+            <a:r>
+              <a:t># Pull latest issues from a project</a:t>
+            </a:r>
+          </a:p>
+          <a:p>
+            <a:pPr>
+              <a:spcBef>
+                <a:spcPts val="0"/>
+              </a:spcBef>
+              <a:spcAft>
+                <a:spcPts val="300"/>
+              </a:spcAft>
+              <a:defRPr sz="1500">
+                <a:solidFill>
+                  <a:srgbClr val="E8EEFC"/>
+                </a:solidFill>
+                <a:latin typeface="DejaVu Sans Mono"/>
+              </a:defRPr>
+            </a:pPr>
+            <a:r>
+              <a:t>curl -s -u "$JIRA_EMAIL:$JIRA_API_TOKEN" -G "$JIRA_BASE_URL/rest/api/3/search" --data-urlencode 'jql=project = PROJ ORDER BY updated DESC' --data-urlencode 'maxResults=5' | jq '.issues[].key'</a:t>
+            </a:r>
+          </a:p>
+          <a:p>
+            <a:pPr>
+              <a:spcBef>
+                <a:spcPts val="0"/>
+              </a:spcBef>
+              <a:spcAft>
+                <a:spcPts val="300"/>
+              </a:spcAft>
+              <a:defRPr sz="1500">
+                <a:solidFill>
+                  <a:srgbClr val="E8EEFC"/>
+                </a:solidFill>
+                <a:latin typeface="DejaVu Sans Mono"/>
+              </a:defRPr>
+            </a:pPr>
+          </a:p>
+          <a:p>
+            <a:pPr>
+              <a:spcBef>
+                <a:spcPts val="0"/>
+              </a:spcBef>
+              <a:spcAft>
+                <a:spcPts val="300"/>
+              </a:spcAft>
+              <a:defRPr sz="1500">
+                <a:solidFill>
+                  <a:srgbClr val="E8EEFC"/>
+                </a:solidFill>
+                <a:latin typeface="DejaVu Sans Mono"/>
+              </a:defRPr>
+            </a:pPr>
+            <a:r>
+              <a:t># Prompt in Cursor</a:t>
+            </a:r>
+          </a:p>
+          <a:p>
+            <a:pPr>
+              <a:spcBef>
+                <a:spcPts val="0"/>
+              </a:spcBef>
+              <a:spcAft>
+                <a:spcPts val="300"/>
+              </a:spcAft>
+              <a:defRPr sz="1500">
+                <a:solidFill>
+                  <a:srgbClr val="E8EEFC"/>
+                </a:solidFill>
+                <a:latin typeface="DejaVu Sans Mono"/>
+              </a:defRPr>
+            </a:pPr>
+            <a:r>
+              <a:t>Prompt: "Using Jira MCP, summarize PROJ-101, draft acceptance criteria, and produce test cases."</a:t>
+            </a:r>
+          </a:p>
+          <a:p>
+            <a:pPr>
+              <a:spcBef>
+                <a:spcPts val="0"/>
+              </a:spcBef>
+              <a:spcAft>
+                <a:spcPts val="300"/>
+              </a:spcAft>
+              <a:defRPr sz="1500">
+                <a:solidFill>
+                  <a:srgbClr val="E8EEFC"/>
+                </a:solidFill>
+                <a:latin typeface="DejaVu Sans Mono"/>
+              </a:defRPr>
+            </a:pPr>
+            <a:r>
+              <a:t>Prompt: "Generate status update with blockers, risks, and next actions for standup."</a:t>
+            </a:r>
+          </a:p>
+        </p:txBody>
+      </p:sp>
+    </p:spTree>
+  </p:cSld>
+  <p:clrMapOvr>
+    <a:masterClrMapping/>
+  </p:clrMapOvr>
+</p:sld>
+</file>
+
+<file path=ppt/slides/slide14.xml><?xml version="1.0" encoding="utf-8"?>
+<p:sld xmlns:a="http://schemas.openxmlformats.org/drawingml/2006/main" xmlns:p="http://schemas.openxmlformats.org/presentationml/2006/main" xmlns:r="http://schemas.openxmlformats.org/officeDocument/2006/relationships">
+  <p:cSld>
+    <p:spTree>
+      <p:nvGrpSpPr>
+        <p:cNvPr id="1" name=""/>
+        <p:cNvGrpSpPr/>
+        <p:nvPr/>
+      </p:nvGrpSpPr>
+      <p:grpSpPr/>
+      <p:sp>
+        <p:nvSpPr>
+          <p:cNvPr id="2" name="TextBox 1"/>
+          <p:cNvSpPr txBox="1"/>
+          <p:nvPr/>
+        </p:nvSpPr>
+        <p:spPr>
+          <a:xfrm>
+            <a:off x="411480" y="146304"/>
+            <a:ext cx="11155680" cy="640080"/>
+          </a:xfrm>
+          <a:prstGeom prst="rect">
+            <a:avLst/>
+          </a:prstGeom>
+          <a:noFill/>
+        </p:spPr>
+        <p:txBody>
+          <a:bodyPr wrap="none">
+            <a:spAutoFit/>
+          </a:bodyPr>
+          <a:lstStyle/>
+          <a:p>
+            <a:pPr algn="l"/>
+            <a:r>
+              <a:rPr sz="3400" b="1">
+                <a:solidFill>
+                  <a:srgbClr val="152A4B"/>
+                </a:solidFill>
+              </a:rPr>
+              <a:t>Tutorial Step 4: Figma Lab (Design-to-Code Handoff)</a:t>
+            </a:r>
+          </a:p>
+        </p:txBody>
+      </p:sp>
+      <p:sp>
+        <p:nvSpPr>
+          <p:cNvPr id="3" name="TextBox 2"/>
+          <p:cNvSpPr txBox="1"/>
+          <p:nvPr/>
+        </p:nvSpPr>
+        <p:spPr>
+          <a:xfrm>
+            <a:off x="438912" y="749808"/>
+            <a:ext cx="10972800" cy="411480"/>
+          </a:xfrm>
+          <a:prstGeom prst="rect">
+            <a:avLst/>
+          </a:prstGeom>
+          <a:noFill/>
+        </p:spPr>
+        <p:txBody>
+          <a:bodyPr wrap="none">
+            <a:spAutoFit/>
+          </a:bodyPr>
+          <a:lstStyle/>
+          <a:p>
+            <a:r>
+              <a:rPr sz="1800">
+                <a:solidFill>
+                  <a:srgbClr val="465876"/>
+                </a:solidFill>
+              </a:rPr>
+              <a:t>Validate token, then generate implementation checklist and tasks.</a:t>
+            </a:r>
+          </a:p>
+        </p:txBody>
+      </p:sp>
+      <p:sp>
+        <p:nvSpPr>
+          <p:cNvPr id="4" name="Rounded Rectangle 3"/>
+          <p:cNvSpPr/>
+          <p:nvPr/>
+        </p:nvSpPr>
+        <p:spPr>
+          <a:xfrm>
+            <a:off x="502920" y="1508760"/>
+            <a:ext cx="11155680" cy="4983480"/>
+          </a:xfrm>
+          <a:prstGeom prst="roundRect">
+            <a:avLst/>
+          </a:prstGeom>
+          <a:solidFill>
+            <a:srgbClr val="182134"/>
+          </a:solidFill>
+          <a:ln>
+            <a:solidFill>
+              <a:srgbClr val="182134"/>
+            </a:solidFill>
+          </a:ln>
+        </p:spPr>
+        <p:style>
+          <a:lnRef idx="1">
+            <a:schemeClr val="accent1"/>
+          </a:lnRef>
+          <a:fillRef idx="3">
+            <a:schemeClr val="accent1"/>
+          </a:fillRef>
+          <a:effectRef idx="2">
+            <a:schemeClr val="accent1"/>
+          </a:effectRef>
+          <a:fontRef idx="minor">
+            <a:schemeClr val="lt1"/>
+          </a:fontRef>
+        </p:style>
+        <p:txBody>
+          <a:bodyPr rtlCol="0" anchor="ctr" wrap="square"/>
+          <a:lstStyle/>
+          <a:p>
+            <a:pPr algn="ctr">
+              <a:spcBef>
+                <a:spcPts val="0"/>
+              </a:spcBef>
+              <a:spcAft>
+                <a:spcPts val="300"/>
+              </a:spcAft>
+              <a:defRPr sz="1500">
+                <a:solidFill>
+                  <a:srgbClr val="E8EEFC"/>
+                </a:solidFill>
+                <a:latin typeface="DejaVu Sans Mono"/>
+              </a:defRPr>
+            </a:pPr>
+            <a:r>
+              <a:t>source .venv/bin/activate &amp;&amp; source .env</a:t>
+            </a:r>
+          </a:p>
+          <a:p>
+            <a:pPr>
+              <a:spcBef>
+                <a:spcPts val="0"/>
+              </a:spcBef>
+              <a:spcAft>
+                <a:spcPts val="300"/>
+              </a:spcAft>
+              <a:defRPr sz="1500">
+                <a:solidFill>
+                  <a:srgbClr val="E8EEFC"/>
+                </a:solidFill>
+                <a:latin typeface="DejaVu Sans Mono"/>
+              </a:defRPr>
+            </a:pPr>
+            <a:r>
+              <a:t>export FIGMA_FILE_KEY=&lt;file_key&gt;</a:t>
+            </a:r>
+          </a:p>
+          <a:p>
+            <a:pPr>
+              <a:spcBef>
+                <a:spcPts val="0"/>
+              </a:spcBef>
+              <a:spcAft>
+                <a:spcPts val="300"/>
+              </a:spcAft>
+              <a:defRPr sz="1500">
+                <a:solidFill>
+                  <a:srgbClr val="E8EEFC"/>
+                </a:solidFill>
+                <a:latin typeface="DejaVu Sans Mono"/>
+              </a:defRPr>
+            </a:pPr>
+          </a:p>
+          <a:p>
+            <a:pPr>
+              <a:spcBef>
+                <a:spcPts val="0"/>
+              </a:spcBef>
+              <a:spcAft>
+                <a:spcPts val="300"/>
+              </a:spcAft>
+              <a:defRPr sz="1500">
+                <a:solidFill>
+                  <a:srgbClr val="E8EEFC"/>
+                </a:solidFill>
+                <a:latin typeface="DejaVu Sans Mono"/>
+              </a:defRPr>
+            </a:pPr>
+            <a:r>
+              <a:t># Validate Figma API access</a:t>
+            </a:r>
+          </a:p>
+          <a:p>
+            <a:pPr>
+              <a:spcBef>
+                <a:spcPts val="0"/>
+              </a:spcBef>
+              <a:spcAft>
+                <a:spcPts val="300"/>
+              </a:spcAft>
+              <a:defRPr sz="1500">
+                <a:solidFill>
+                  <a:srgbClr val="E8EEFC"/>
+                </a:solidFill>
+                <a:latin typeface="DejaVu Sans Mono"/>
+              </a:defRPr>
+            </a:pPr>
+            <a:r>
+              <a:t>curl -s -H "X-Figma-Token: $FIGMA_TOKEN" "https://api.figma.com/v1/files/$FIGMA_FILE_KEY" | jq '.name'</a:t>
+            </a:r>
+          </a:p>
+          <a:p>
+            <a:pPr>
+              <a:spcBef>
+                <a:spcPts val="0"/>
+              </a:spcBef>
+              <a:spcAft>
+                <a:spcPts val="300"/>
+              </a:spcAft>
+              <a:defRPr sz="1500">
+                <a:solidFill>
+                  <a:srgbClr val="E8EEFC"/>
+                </a:solidFill>
+                <a:latin typeface="DejaVu Sans Mono"/>
+              </a:defRPr>
+            </a:pPr>
+          </a:p>
+          <a:p>
+            <a:pPr>
+              <a:spcBef>
+                <a:spcPts val="0"/>
+              </a:spcBef>
+              <a:spcAft>
+                <a:spcPts val="300"/>
+              </a:spcAft>
+              <a:defRPr sz="1500">
+                <a:solidFill>
+                  <a:srgbClr val="E8EEFC"/>
+                </a:solidFill>
+                <a:latin typeface="DejaVu Sans Mono"/>
+              </a:defRPr>
+            </a:pPr>
+            <a:r>
+              <a:t># Prompts in Cursor</a:t>
+            </a:r>
+          </a:p>
+          <a:p>
+            <a:pPr>
+              <a:spcBef>
+                <a:spcPts val="0"/>
+              </a:spcBef>
+              <a:spcAft>
+                <a:spcPts val="300"/>
+              </a:spcAft>
+              <a:defRPr sz="1500">
+                <a:solidFill>
+                  <a:srgbClr val="E8EEFC"/>
+                </a:solidFill>
+                <a:latin typeface="DejaVu Sans Mono"/>
+              </a:defRPr>
+            </a:pPr>
+            <a:r>
+              <a:t>Prompt: "Using Figma MCP, extract colors, spacing, and typography tokens."</a:t>
+            </a:r>
+          </a:p>
+          <a:p>
+            <a:pPr>
+              <a:spcBef>
+                <a:spcPts val="0"/>
+              </a:spcBef>
+              <a:spcAft>
+                <a:spcPts val="300"/>
+              </a:spcAft>
+              <a:defRPr sz="1500">
+                <a:solidFill>
+                  <a:srgbClr val="E8EEFC"/>
+                </a:solidFill>
+                <a:latin typeface="DejaVu Sans Mono"/>
+              </a:defRPr>
+            </a:pPr>
+            <a:r>
+              <a:t>Prompt: "Map components in frame HomePage to frontend stories with acceptance criteria."</a:t>
+            </a:r>
+          </a:p>
+          <a:p>
+            <a:pPr>
+              <a:spcBef>
+                <a:spcPts val="0"/>
+              </a:spcBef>
+              <a:spcAft>
+                <a:spcPts val="300"/>
+              </a:spcAft>
+              <a:defRPr sz="1500">
+                <a:solidFill>
+                  <a:srgbClr val="E8EEFC"/>
+                </a:solidFill>
+                <a:latin typeface="DejaVu Sans Mono"/>
+              </a:defRPr>
+            </a:pPr>
+            <a:r>
+              <a:t>Prompt: "Create UI handoff checklist including responsive and accessibility checks."</a:t>
+            </a:r>
+          </a:p>
+        </p:txBody>
+      </p:sp>
+    </p:spTree>
+  </p:cSld>
+  <p:clrMapOvr>
+    <a:masterClrMapping/>
+  </p:clrMapOvr>
+</p:sld>
+</file>
+
+<file path=ppt/slides/slide15.xml><?xml version="1.0" encoding="utf-8"?>
+<p:sld xmlns:a="http://schemas.openxmlformats.org/drawingml/2006/main" xmlns:p="http://schemas.openxmlformats.org/presentationml/2006/main" xmlns:r="http://schemas.openxmlformats.org/officeDocument/2006/relationships">
+  <p:cSld>
+    <p:spTree>
+      <p:nvGrpSpPr>
+        <p:cNvPr id="1" name=""/>
+        <p:cNvGrpSpPr/>
+        <p:nvPr/>
+      </p:nvGrpSpPr>
+      <p:grpSpPr/>
+      <p:sp>
+        <p:nvSpPr>
+          <p:cNvPr id="2" name="TextBox 1"/>
+          <p:cNvSpPr txBox="1"/>
+          <p:nvPr/>
+        </p:nvSpPr>
+        <p:spPr>
+          <a:xfrm>
+            <a:off x="411480" y="146304"/>
+            <a:ext cx="11155680" cy="640080"/>
+          </a:xfrm>
+          <a:prstGeom prst="rect">
+            <a:avLst/>
+          </a:prstGeom>
+          <a:noFill/>
+        </p:spPr>
+        <p:txBody>
+          <a:bodyPr wrap="none">
+            <a:spAutoFit/>
+          </a:bodyPr>
+          <a:lstStyle/>
+          <a:p>
+            <a:pPr algn="l"/>
+            <a:r>
+              <a:rPr sz="3400" b="1">
+                <a:solidFill>
+                  <a:srgbClr val="152A4B"/>
+                </a:solidFill>
+              </a:rPr>
+              <a:t>Tutorial Step 5: Bitbucket Lab (PR Review and Release Notes)</a:t>
+            </a:r>
+          </a:p>
+        </p:txBody>
+      </p:sp>
+      <p:sp>
+        <p:nvSpPr>
+          <p:cNvPr id="3" name="TextBox 2"/>
+          <p:cNvSpPr txBox="1"/>
+          <p:nvPr/>
+        </p:nvSpPr>
+        <p:spPr>
+          <a:xfrm>
+            <a:off x="438912" y="749808"/>
+            <a:ext cx="10972800" cy="411480"/>
+          </a:xfrm>
+          <a:prstGeom prst="rect">
+            <a:avLst/>
+          </a:prstGeom>
+          <a:noFill/>
+        </p:spPr>
+        <p:txBody>
+          <a:bodyPr wrap="none">
+            <a:spAutoFit/>
+          </a:bodyPr>
+          <a:lstStyle/>
+          <a:p>
+            <a:r>
+              <a:rPr sz="1800">
+                <a:solidFill>
+                  <a:srgbClr val="465876"/>
+                </a:solidFill>
+              </a:rPr>
+              <a:t>Use repo metadata + prompts to speed up review quality.</a:t>
+            </a:r>
+          </a:p>
+        </p:txBody>
+      </p:sp>
+      <p:sp>
+        <p:nvSpPr>
+          <p:cNvPr id="4" name="Rounded Rectangle 3"/>
+          <p:cNvSpPr/>
+          <p:nvPr/>
+        </p:nvSpPr>
+        <p:spPr>
+          <a:xfrm>
+            <a:off x="502920" y="1508760"/>
+            <a:ext cx="11155680" cy="4983480"/>
+          </a:xfrm>
+          <a:prstGeom prst="roundRect">
+            <a:avLst/>
+          </a:prstGeom>
+          <a:solidFill>
+            <a:srgbClr val="182134"/>
+          </a:solidFill>
+          <a:ln>
+            <a:solidFill>
+              <a:srgbClr val="182134"/>
+            </a:solidFill>
+          </a:ln>
+        </p:spPr>
+        <p:style>
+          <a:lnRef idx="1">
+            <a:schemeClr val="accent1"/>
+          </a:lnRef>
+          <a:fillRef idx="3">
+            <a:schemeClr val="accent1"/>
+          </a:fillRef>
+          <a:effectRef idx="2">
+            <a:schemeClr val="accent1"/>
+          </a:effectRef>
+          <a:fontRef idx="minor">
+            <a:schemeClr val="lt1"/>
+          </a:fontRef>
+        </p:style>
+        <p:txBody>
+          <a:bodyPr rtlCol="0" anchor="ctr" wrap="square"/>
+          <a:lstStyle/>
+          <a:p>
+            <a:pPr algn="ctr">
+              <a:spcBef>
+                <a:spcPts val="0"/>
+              </a:spcBef>
+              <a:spcAft>
+                <a:spcPts val="300"/>
+              </a:spcAft>
+              <a:defRPr sz="1500">
+                <a:solidFill>
+                  <a:srgbClr val="E8EEFC"/>
+                </a:solidFill>
+                <a:latin typeface="DejaVu Sans Mono"/>
+              </a:defRPr>
+            </a:pPr>
+            <a:r>
+              <a:t>source .venv/bin/activate &amp;&amp; source .env</a:t>
+            </a:r>
+          </a:p>
+          <a:p>
+            <a:pPr>
+              <a:spcBef>
+                <a:spcPts val="0"/>
+              </a:spcBef>
+              <a:spcAft>
+                <a:spcPts val="300"/>
+              </a:spcAft>
+              <a:defRPr sz="1500">
+                <a:solidFill>
+                  <a:srgbClr val="E8EEFC"/>
+                </a:solidFill>
+                <a:latin typeface="DejaVu Sans Mono"/>
+              </a:defRPr>
+            </a:pPr>
+          </a:p>
+          <a:p>
+            <a:pPr>
+              <a:spcBef>
+                <a:spcPts val="0"/>
+              </a:spcBef>
+              <a:spcAft>
+                <a:spcPts val="300"/>
+              </a:spcAft>
+              <a:defRPr sz="1500">
+                <a:solidFill>
+                  <a:srgbClr val="E8EEFC"/>
+                </a:solidFill>
+                <a:latin typeface="DejaVu Sans Mono"/>
+              </a:defRPr>
+            </a:pPr>
+            <a:r>
+              <a:t># Validate Bitbucket workspace access</a:t>
+            </a:r>
+          </a:p>
+          <a:p>
+            <a:pPr>
+              <a:spcBef>
+                <a:spcPts val="0"/>
+              </a:spcBef>
+              <a:spcAft>
+                <a:spcPts val="300"/>
+              </a:spcAft>
+              <a:defRPr sz="1500">
+                <a:solidFill>
+                  <a:srgbClr val="E8EEFC"/>
+                </a:solidFill>
+                <a:latin typeface="DejaVu Sans Mono"/>
+              </a:defRPr>
+            </a:pPr>
+            <a:r>
+              <a:t>curl -s -u "$BITBUCKET_USERNAME:$BITBUCKET_APP_PASSWORD" "https://api.bitbucket.org/2.0/repositories/$BITBUCKET_WORKSPACE" | jq '.values[0].full_name'</a:t>
+            </a:r>
+          </a:p>
+          <a:p>
+            <a:pPr>
+              <a:spcBef>
+                <a:spcPts val="0"/>
+              </a:spcBef>
+              <a:spcAft>
+                <a:spcPts val="300"/>
+              </a:spcAft>
+              <a:defRPr sz="1500">
+                <a:solidFill>
+                  <a:srgbClr val="E8EEFC"/>
+                </a:solidFill>
+                <a:latin typeface="DejaVu Sans Mono"/>
+              </a:defRPr>
+            </a:pPr>
+          </a:p>
+          <a:p>
+            <a:pPr>
+              <a:spcBef>
+                <a:spcPts val="0"/>
+              </a:spcBef>
+              <a:spcAft>
+                <a:spcPts val="300"/>
+              </a:spcAft>
+              <a:defRPr sz="1500">
+                <a:solidFill>
+                  <a:srgbClr val="E8EEFC"/>
+                </a:solidFill>
+                <a:latin typeface="DejaVu Sans Mono"/>
+              </a:defRPr>
+            </a:pPr>
+            <a:r>
+              <a:t># Prompts in Cursor</a:t>
+            </a:r>
+          </a:p>
+          <a:p>
+            <a:pPr>
+              <a:spcBef>
+                <a:spcPts val="0"/>
+              </a:spcBef>
+              <a:spcAft>
+                <a:spcPts val="300"/>
+              </a:spcAft>
+              <a:defRPr sz="1500">
+                <a:solidFill>
+                  <a:srgbClr val="E8EEFC"/>
+                </a:solidFill>
+                <a:latin typeface="DejaVu Sans Mono"/>
+              </a:defRPr>
+            </a:pPr>
+            <a:r>
+              <a:t>Prompt: "Using Bitbucket MCP, summarize PR #123 and list functional risk areas."</a:t>
+            </a:r>
+          </a:p>
+          <a:p>
+            <a:pPr>
+              <a:spcBef>
+                <a:spcPts val="0"/>
+              </a:spcBef>
+              <a:spcAft>
+                <a:spcPts val="300"/>
+              </a:spcAft>
+              <a:defRPr sz="1500">
+                <a:solidFill>
+                  <a:srgbClr val="E8EEFC"/>
+                </a:solidFill>
+                <a:latin typeface="DejaVu Sans Mono"/>
+              </a:defRPr>
+            </a:pPr>
+            <a:r>
+              <a:t>Prompt: "Generate a reviewer checklist focused on tests, security, and rollback plan."</a:t>
+            </a:r>
+          </a:p>
+          <a:p>
+            <a:pPr>
+              <a:spcBef>
+                <a:spcPts val="0"/>
+              </a:spcBef>
+              <a:spcAft>
+                <a:spcPts val="300"/>
+              </a:spcAft>
+              <a:defRPr sz="1500">
+                <a:solidFill>
+                  <a:srgbClr val="E8EEFC"/>
+                </a:solidFill>
+                <a:latin typeface="DejaVu Sans Mono"/>
+              </a:defRPr>
+            </a:pPr>
+            <a:r>
+              <a:t>Prompt: "Create release notes from commits merged since previous release tag."</a:t>
+            </a:r>
+          </a:p>
+        </p:txBody>
+      </p:sp>
+    </p:spTree>
+  </p:cSld>
+  <p:clrMapOvr>
+    <a:masterClrMapping/>
+  </p:clrMapOvr>
+</p:sld>
+</file>
+
+<file path=ppt/slides/slide16.xml><?xml version="1.0" encoding="utf-8"?>
+<p:sld xmlns:a="http://schemas.openxmlformats.org/drawingml/2006/main" xmlns:p="http://schemas.openxmlformats.org/presentationml/2006/main" xmlns:r="http://schemas.openxmlformats.org/officeDocument/2006/relationships">
+  <p:cSld>
+    <p:spTree>
+      <p:nvGrpSpPr>
+        <p:cNvPr id="1" name=""/>
+        <p:cNvGrpSpPr/>
+        <p:nvPr/>
+      </p:nvGrpSpPr>
+      <p:grpSpPr/>
+      <p:sp>
+        <p:nvSpPr>
+          <p:cNvPr id="2" name="TextBox 1"/>
+          <p:cNvSpPr txBox="1"/>
+          <p:nvPr/>
+        </p:nvSpPr>
+        <p:spPr>
+          <a:xfrm>
+            <a:off x="411480" y="146304"/>
+            <a:ext cx="11155680" cy="640080"/>
+          </a:xfrm>
+          <a:prstGeom prst="rect">
+            <a:avLst/>
+          </a:prstGeom>
+          <a:noFill/>
+        </p:spPr>
+        <p:txBody>
+          <a:bodyPr wrap="none">
+            <a:spAutoFit/>
+          </a:bodyPr>
+          <a:lstStyle/>
+          <a:p>
+            <a:pPr algn="l"/>
+            <a:r>
+              <a:rPr sz="3400" b="1">
+                <a:solidFill>
+                  <a:srgbClr val="152A4B"/>
+                </a:solidFill>
+              </a:rPr>
+              <a:t>Tutorial Step 6: Add Agent Skills (Reusable Team Assets)</a:t>
+            </a:r>
+          </a:p>
+        </p:txBody>
+      </p:sp>
+      <p:sp>
+        <p:nvSpPr>
+          <p:cNvPr id="3" name="TextBox 2"/>
+          <p:cNvSpPr txBox="1"/>
+          <p:nvPr/>
+        </p:nvSpPr>
+        <p:spPr>
+          <a:xfrm>
+            <a:off x="438912" y="749808"/>
+            <a:ext cx="10972800" cy="411480"/>
+          </a:xfrm>
+          <a:prstGeom prst="rect">
+            <a:avLst/>
+          </a:prstGeom>
+          <a:noFill/>
+        </p:spPr>
+        <p:txBody>
+          <a:bodyPr wrap="none">
+            <a:spAutoFit/>
+          </a:bodyPr>
+          <a:lstStyle/>
+          <a:p>
+            <a:r>
+              <a:rPr sz="1800">
+                <a:solidFill>
+                  <a:srgbClr val="465876"/>
+                </a:solidFill>
+              </a:rPr>
+              <a:t>Each skill should include metadata, prompt contract, and test cases.</a:t>
+            </a:r>
+          </a:p>
+        </p:txBody>
+      </p:sp>
+      <p:sp>
+        <p:nvSpPr>
+          <p:cNvPr id="4" name="Rounded Rectangle 3"/>
+          <p:cNvSpPr/>
+          <p:nvPr/>
+        </p:nvSpPr>
+        <p:spPr>
+          <a:xfrm>
+            <a:off x="502920" y="1508760"/>
+            <a:ext cx="11155680" cy="4983480"/>
+          </a:xfrm>
+          <a:prstGeom prst="roundRect">
+            <a:avLst/>
+          </a:prstGeom>
+          <a:solidFill>
+            <a:srgbClr val="182134"/>
+          </a:solidFill>
+          <a:ln>
+            <a:solidFill>
+              <a:srgbClr val="182134"/>
+            </a:solidFill>
+          </a:ln>
+        </p:spPr>
+        <p:style>
+          <a:lnRef idx="1">
+            <a:schemeClr val="accent1"/>
+          </a:lnRef>
+          <a:fillRef idx="3">
+            <a:schemeClr val="accent1"/>
+          </a:fillRef>
+          <a:effectRef idx="2">
+            <a:schemeClr val="accent1"/>
+          </a:effectRef>
+          <a:fontRef idx="minor">
+            <a:schemeClr val="lt1"/>
+          </a:fontRef>
+        </p:style>
+        <p:txBody>
+          <a:bodyPr rtlCol="0" anchor="ctr" wrap="square"/>
+          <a:lstStyle/>
+          <a:p>
+            <a:pPr algn="ctr">
+              <a:spcBef>
+                <a:spcPts val="0"/>
+              </a:spcBef>
+              <a:spcAft>
+                <a:spcPts val="300"/>
+              </a:spcAft>
+              <a:defRPr sz="1500">
+                <a:solidFill>
+                  <a:srgbClr val="E8EEFC"/>
+                </a:solidFill>
+                <a:latin typeface="DejaVu Sans Mono"/>
+              </a:defRPr>
+            </a:pPr>
+            <a:r>
+              <a:t># Create skill directory</a:t>
+            </a:r>
+          </a:p>
+          <a:p>
+            <a:pPr>
+              <a:spcBef>
+                <a:spcPts val="0"/>
+              </a:spcBef>
+              <a:spcAft>
+                <a:spcPts val="300"/>
+              </a:spcAft>
+              <a:defRPr sz="1500">
+                <a:solidFill>
+                  <a:srgbClr val="E8EEFC"/>
+                </a:solidFill>
+                <a:latin typeface="DejaVu Sans Mono"/>
+              </a:defRPr>
+            </a:pPr>
+            <a:r>
+              <a:t>mkdir -p skills/jira-ticket-triage &amp;&amp; cd skills/jira-ticket-triage</a:t>
+            </a:r>
+          </a:p>
+          <a:p>
+            <a:pPr>
+              <a:spcBef>
+                <a:spcPts val="0"/>
+              </a:spcBef>
+              <a:spcAft>
+                <a:spcPts val="300"/>
+              </a:spcAft>
+              <a:defRPr sz="1500">
+                <a:solidFill>
+                  <a:srgbClr val="E8EEFC"/>
+                </a:solidFill>
+                <a:latin typeface="DejaVu Sans Mono"/>
+              </a:defRPr>
+            </a:pPr>
+          </a:p>
+          <a:p>
+            <a:pPr>
+              <a:spcBef>
+                <a:spcPts val="0"/>
+              </a:spcBef>
+              <a:spcAft>
+                <a:spcPts val="300"/>
+              </a:spcAft>
+              <a:defRPr sz="1500">
+                <a:solidFill>
+                  <a:srgbClr val="E8EEFC"/>
+                </a:solidFill>
+                <a:latin typeface="DejaVu Sans Mono"/>
+              </a:defRPr>
+            </a:pPr>
+            <a:r>
+              <a:t>cat &gt; skill.yaml &lt;&lt;'YAML'</a:t>
+            </a:r>
+          </a:p>
+          <a:p>
+            <a:pPr>
+              <a:spcBef>
+                <a:spcPts val="0"/>
+              </a:spcBef>
+              <a:spcAft>
+                <a:spcPts val="300"/>
+              </a:spcAft>
+              <a:defRPr sz="1500">
+                <a:solidFill>
+                  <a:srgbClr val="E8EEFC"/>
+                </a:solidFill>
+                <a:latin typeface="DejaVu Sans Mono"/>
+              </a:defRPr>
+            </a:pPr>
+            <a:r>
+              <a:t>name: jira-ticket-triage</a:t>
+            </a:r>
+          </a:p>
+          <a:p>
+            <a:pPr>
+              <a:spcBef>
+                <a:spcPts val="0"/>
+              </a:spcBef>
+              <a:spcAft>
+                <a:spcPts val="300"/>
+              </a:spcAft>
+              <a:defRPr sz="1500">
+                <a:solidFill>
+                  <a:srgbClr val="E8EEFC"/>
+                </a:solidFill>
+                <a:latin typeface="DejaVu Sans Mono"/>
+              </a:defRPr>
+            </a:pPr>
+            <a:r>
+              <a:t>version: 1.0.0</a:t>
+            </a:r>
+          </a:p>
+          <a:p>
+            <a:pPr>
+              <a:spcBef>
+                <a:spcPts val="0"/>
+              </a:spcBef>
+              <a:spcAft>
+                <a:spcPts val="300"/>
+              </a:spcAft>
+              <a:defRPr sz="1500">
+                <a:solidFill>
+                  <a:srgbClr val="E8EEFC"/>
+                </a:solidFill>
+                <a:latin typeface="DejaVu Sans Mono"/>
+              </a:defRPr>
+            </a:pPr>
+            <a:r>
+              <a:t>description: Triage issue and output action plan</a:t>
+            </a:r>
+          </a:p>
+          <a:p>
+            <a:pPr>
+              <a:spcBef>
+                <a:spcPts val="0"/>
+              </a:spcBef>
+              <a:spcAft>
+                <a:spcPts val="300"/>
+              </a:spcAft>
+              <a:defRPr sz="1500">
+                <a:solidFill>
+                  <a:srgbClr val="E8EEFC"/>
+                </a:solidFill>
+                <a:latin typeface="DejaVu Sans Mono"/>
+              </a:defRPr>
+            </a:pPr>
+            <a:r>
+              <a:t>tools: [jira.search, jira.get_issue]</a:t>
+            </a:r>
+          </a:p>
+          <a:p>
+            <a:pPr>
+              <a:spcBef>
+                <a:spcPts val="0"/>
+              </a:spcBef>
+              <a:spcAft>
+                <a:spcPts val="300"/>
+              </a:spcAft>
+              <a:defRPr sz="1500">
+                <a:solidFill>
+                  <a:srgbClr val="E8EEFC"/>
+                </a:solidFill>
+                <a:latin typeface="DejaVu Sans Mono"/>
+              </a:defRPr>
+            </a:pPr>
+            <a:r>
+              <a:t>YAML</a:t>
+            </a:r>
+          </a:p>
+          <a:p>
+            <a:pPr>
+              <a:spcBef>
+                <a:spcPts val="0"/>
+              </a:spcBef>
+              <a:spcAft>
+                <a:spcPts val="300"/>
+              </a:spcAft>
+              <a:defRPr sz="1500">
+                <a:solidFill>
+                  <a:srgbClr val="E8EEFC"/>
+                </a:solidFill>
+                <a:latin typeface="DejaVu Sans Mono"/>
+              </a:defRPr>
+            </a:pPr>
+          </a:p>
+          <a:p>
+            <a:pPr>
+              <a:spcBef>
+                <a:spcPts val="0"/>
+              </a:spcBef>
+              <a:spcAft>
+                <a:spcPts val="300"/>
+              </a:spcAft>
+              <a:defRPr sz="1500">
+                <a:solidFill>
+                  <a:srgbClr val="E8EEFC"/>
+                </a:solidFill>
+                <a:latin typeface="DejaVu Sans Mono"/>
+              </a:defRPr>
+            </a:pPr>
+            <a:r>
+              <a:t>cat &gt; prompts.md &lt;&lt;'MD'</a:t>
+            </a:r>
+          </a:p>
+          <a:p>
+            <a:pPr>
+              <a:spcBef>
+                <a:spcPts val="0"/>
+              </a:spcBef>
+              <a:spcAft>
+                <a:spcPts val="300"/>
+              </a:spcAft>
+              <a:defRPr sz="1500">
+                <a:solidFill>
+                  <a:srgbClr val="E8EEFC"/>
+                </a:solidFill>
+                <a:latin typeface="DejaVu Sans Mono"/>
+              </a:defRPr>
+            </a:pPr>
+            <a:r>
+              <a:t># Inputs: issue key, team context, definition of done</a:t>
+            </a:r>
+          </a:p>
+          <a:p>
+            <a:pPr>
+              <a:spcBef>
+                <a:spcPts val="0"/>
+              </a:spcBef>
+              <a:spcAft>
+                <a:spcPts val="300"/>
+              </a:spcAft>
+              <a:defRPr sz="1500">
+                <a:solidFill>
+                  <a:srgbClr val="E8EEFC"/>
+                </a:solidFill>
+                <a:latin typeface="DejaVu Sans Mono"/>
+              </a:defRPr>
+            </a:pPr>
+            <a:r>
+              <a:t># Output: summary, acceptance criteria, test cases</a:t>
+            </a:r>
+          </a:p>
+          <a:p>
+            <a:pPr>
+              <a:spcBef>
+                <a:spcPts val="0"/>
+              </a:spcBef>
+              <a:spcAft>
+                <a:spcPts val="300"/>
+              </a:spcAft>
+              <a:defRPr sz="1500">
+                <a:solidFill>
+                  <a:srgbClr val="E8EEFC"/>
+                </a:solidFill>
+                <a:latin typeface="DejaVu Sans Mono"/>
+              </a:defRPr>
+            </a:pPr>
+            <a:r>
+              <a:t>MD</a:t>
+            </a:r>
+          </a:p>
+          <a:p>
+            <a:pPr>
+              <a:spcBef>
+                <a:spcPts val="0"/>
+              </a:spcBef>
+              <a:spcAft>
+                <a:spcPts val="300"/>
+              </a:spcAft>
+              <a:defRPr sz="1500">
+                <a:solidFill>
+                  <a:srgbClr val="E8EEFC"/>
+                </a:solidFill>
+                <a:latin typeface="DejaVu Sans Mono"/>
+              </a:defRPr>
+            </a:pPr>
+          </a:p>
+          <a:p>
+            <a:pPr>
+              <a:spcBef>
+                <a:spcPts val="0"/>
+              </a:spcBef>
+              <a:spcAft>
+                <a:spcPts val="300"/>
+              </a:spcAft>
+              <a:defRPr sz="1500">
+                <a:solidFill>
+                  <a:srgbClr val="E8EEFC"/>
+                </a:solidFill>
+                <a:latin typeface="DejaVu Sans Mono"/>
+              </a:defRPr>
+            </a:pPr>
+            <a:r>
+              <a:t>echo '[{"input":"PROJ-101","assert_contains":["Summary","Acceptance Criteria"]}]' &gt; tests.json</a:t>
+            </a:r>
+          </a:p>
+        </p:txBody>
+      </p:sp>
+    </p:spTree>
+  </p:cSld>
+  <p:clrMapOvr>
+    <a:masterClrMapping/>
+  </p:clrMapOvr>
+</p:sld>
+</file>
+
+<file path=ppt/slides/slide17.xml><?xml version="1.0" encoding="utf-8"?>
+<p:sld xmlns:a="http://schemas.openxmlformats.org/drawingml/2006/main" xmlns:p="http://schemas.openxmlformats.org/presentationml/2006/main" xmlns:r="http://schemas.openxmlformats.org/officeDocument/2006/relationships">
+  <p:cSld>
+    <p:spTree>
+      <p:nvGrpSpPr>
+        <p:cNvPr id="1" name=""/>
+        <p:cNvGrpSpPr/>
+        <p:nvPr/>
+      </p:nvGrpSpPr>
+      <p:grpSpPr/>
+      <p:sp>
+        <p:nvSpPr>
+          <p:cNvPr id="2" name="TextBox 1"/>
+          <p:cNvSpPr txBox="1"/>
+          <p:nvPr/>
+        </p:nvSpPr>
+        <p:spPr>
+          <a:xfrm>
+            <a:off x="411480" y="146304"/>
+            <a:ext cx="11155680" cy="640080"/>
+          </a:xfrm>
+          <a:prstGeom prst="rect">
+            <a:avLst/>
+          </a:prstGeom>
+          <a:noFill/>
+        </p:spPr>
+        <p:txBody>
+          <a:bodyPr wrap="none">
+            <a:spAutoFit/>
+          </a:bodyPr>
+          <a:lstStyle/>
+          <a:p>
+            <a:pPr algn="l"/>
+            <a:r>
+              <a:rPr sz="3400" b="1">
+                <a:solidFill>
+                  <a:srgbClr val="152A4B"/>
+                </a:solidFill>
+              </a:rPr>
+              <a:t>Tutorial Step 7: Governance and KPI Operations</a:t>
+            </a:r>
+          </a:p>
+        </p:txBody>
+      </p:sp>
+      <p:sp>
+        <p:nvSpPr>
+          <p:cNvPr id="3" name="TextBox 2"/>
+          <p:cNvSpPr txBox="1"/>
+          <p:nvPr/>
+        </p:nvSpPr>
+        <p:spPr>
+          <a:xfrm>
+            <a:off x="438912" y="749808"/>
+            <a:ext cx="10972800" cy="411480"/>
+          </a:xfrm>
+          <a:prstGeom prst="rect">
+            <a:avLst/>
+          </a:prstGeom>
+          <a:noFill/>
+        </p:spPr>
+        <p:txBody>
+          <a:bodyPr wrap="none">
+            <a:spAutoFit/>
+          </a:bodyPr>
+          <a:lstStyle/>
+          <a:p>
+            <a:r>
+              <a:rPr sz="1800">
+                <a:solidFill>
+                  <a:srgbClr val="465876"/>
+                </a:solidFill>
+              </a:rPr>
+              <a:t>Use scheduled scripts and weekly reviews to sustain adoption quality.</a:t>
+            </a:r>
+          </a:p>
+        </p:txBody>
+      </p:sp>
+      <p:sp>
+        <p:nvSpPr>
+          <p:cNvPr id="4" name="Rounded Rectangle 3"/>
+          <p:cNvSpPr/>
+          <p:nvPr/>
+        </p:nvSpPr>
+        <p:spPr>
+          <a:xfrm>
+            <a:off x="502920" y="1508760"/>
+            <a:ext cx="11155680" cy="4983480"/>
+          </a:xfrm>
+          <a:prstGeom prst="roundRect">
+            <a:avLst/>
+          </a:prstGeom>
+          <a:solidFill>
+            <a:srgbClr val="182134"/>
+          </a:solidFill>
+          <a:ln>
+            <a:solidFill>
+              <a:srgbClr val="182134"/>
+            </a:solidFill>
+          </a:ln>
+        </p:spPr>
+        <p:style>
+          <a:lnRef idx="1">
+            <a:schemeClr val="accent1"/>
+          </a:lnRef>
+          <a:fillRef idx="3">
+            <a:schemeClr val="accent1"/>
+          </a:fillRef>
+          <a:effectRef idx="2">
+            <a:schemeClr val="accent1"/>
+          </a:effectRef>
+          <a:fontRef idx="minor">
+            <a:schemeClr val="lt1"/>
+          </a:fontRef>
+        </p:style>
+        <p:txBody>
+          <a:bodyPr rtlCol="0" anchor="ctr" wrap="square"/>
+          <a:lstStyle/>
+          <a:p>
+            <a:pPr algn="ctr">
+              <a:spcBef>
+                <a:spcPts val="0"/>
+              </a:spcBef>
+              <a:spcAft>
+                <a:spcPts val="300"/>
+              </a:spcAft>
+              <a:defRPr sz="1500">
+                <a:solidFill>
+                  <a:srgbClr val="E8EEFC"/>
+                </a:solidFill>
+                <a:latin typeface="DejaVu Sans Mono"/>
+              </a:defRPr>
+            </a:pPr>
+            <a:r>
+              <a:t># Example weekly KPI export (replace script names with your internal tooling)</a:t>
+            </a:r>
+          </a:p>
+          <a:p>
+            <a:pPr>
+              <a:spcBef>
+                <a:spcPts val="0"/>
+              </a:spcBef>
+              <a:spcAft>
+                <a:spcPts val="300"/>
+              </a:spcAft>
+              <a:defRPr sz="1500">
+                <a:solidFill>
+                  <a:srgbClr val="E8EEFC"/>
+                </a:solidFill>
+                <a:latin typeface="DejaVu Sans Mono"/>
+              </a:defRPr>
+            </a:pPr>
+            <a:r>
+              <a:t>mkdir -p logs metrics</a:t>
+            </a:r>
+          </a:p>
+          <a:p>
+            <a:pPr>
+              <a:spcBef>
+                <a:spcPts val="0"/>
+              </a:spcBef>
+              <a:spcAft>
+                <a:spcPts val="300"/>
+              </a:spcAft>
+              <a:defRPr sz="1500">
+                <a:solidFill>
+                  <a:srgbClr val="E8EEFC"/>
+                </a:solidFill>
+                <a:latin typeface="DejaVu Sans Mono"/>
+              </a:defRPr>
+            </a:pPr>
+            <a:r>
+              <a:t>python scripts/export_mcp_logs.py --last-days 7 &gt; logs/mcp_weekly.json</a:t>
+            </a:r>
+          </a:p>
+          <a:p>
+            <a:pPr>
+              <a:spcBef>
+                <a:spcPts val="0"/>
+              </a:spcBef>
+              <a:spcAft>
+                <a:spcPts val="300"/>
+              </a:spcAft>
+              <a:defRPr sz="1500">
+                <a:solidFill>
+                  <a:srgbClr val="E8EEFC"/>
+                </a:solidFill>
+                <a:latin typeface="DejaVu Sans Mono"/>
+              </a:defRPr>
+            </a:pPr>
+            <a:r>
+              <a:t>python scripts/calc_kpis.py --input logs/mcp_weekly.json --output metrics/weekly_kpis.csv</a:t>
+            </a:r>
+          </a:p>
+          <a:p>
+            <a:pPr>
+              <a:spcBef>
+                <a:spcPts val="0"/>
+              </a:spcBef>
+              <a:spcAft>
+                <a:spcPts val="300"/>
+              </a:spcAft>
+              <a:defRPr sz="1500">
+                <a:solidFill>
+                  <a:srgbClr val="E8EEFC"/>
+                </a:solidFill>
+                <a:latin typeface="DejaVu Sans Mono"/>
+              </a:defRPr>
+            </a:pPr>
+          </a:p>
+          <a:p>
+            <a:pPr>
+              <a:spcBef>
+                <a:spcPts val="0"/>
+              </a:spcBef>
+              <a:spcAft>
+                <a:spcPts val="300"/>
+              </a:spcAft>
+              <a:defRPr sz="1500">
+                <a:solidFill>
+                  <a:srgbClr val="E8EEFC"/>
+                </a:solidFill>
+                <a:latin typeface="DejaVu Sans Mono"/>
+              </a:defRPr>
+            </a:pPr>
+            <a:r>
+              <a:t># KPI template</a:t>
+            </a:r>
+          </a:p>
+          <a:p>
+            <a:pPr>
+              <a:spcBef>
+                <a:spcPts val="0"/>
+              </a:spcBef>
+              <a:spcAft>
+                <a:spcPts val="300"/>
+              </a:spcAft>
+              <a:defRPr sz="1500">
+                <a:solidFill>
+                  <a:srgbClr val="E8EEFC"/>
+                </a:solidFill>
+                <a:latin typeface="DejaVu Sans Mono"/>
+              </a:defRPr>
+            </a:pPr>
+            <a:r>
+              <a:t>echo 'date,cycle_time,pr_lead_time,reopen_rate,prompt_reuse,automation_success' &gt; metrics/template.csv</a:t>
+            </a:r>
+          </a:p>
+          <a:p>
+            <a:pPr>
+              <a:spcBef>
+                <a:spcPts val="0"/>
+              </a:spcBef>
+              <a:spcAft>
+                <a:spcPts val="300"/>
+              </a:spcAft>
+              <a:defRPr sz="1500">
+                <a:solidFill>
+                  <a:srgbClr val="E8EEFC"/>
+                </a:solidFill>
+                <a:latin typeface="DejaVu Sans Mono"/>
+              </a:defRPr>
+            </a:pPr>
+          </a:p>
+          <a:p>
+            <a:pPr>
+              <a:spcBef>
+                <a:spcPts val="0"/>
+              </a:spcBef>
+              <a:spcAft>
+                <a:spcPts val="300"/>
+              </a:spcAft>
+              <a:defRPr sz="1500">
+                <a:solidFill>
+                  <a:srgbClr val="E8EEFC"/>
+                </a:solidFill>
+                <a:latin typeface="DejaVu Sans Mono"/>
+              </a:defRPr>
+            </a:pPr>
+            <a:r>
+              <a:t># Weekly review checklist</a:t>
+            </a:r>
+          </a:p>
+          <a:p>
+            <a:pPr>
+              <a:spcBef>
+                <a:spcPts val="0"/>
+              </a:spcBef>
+              <a:spcAft>
+                <a:spcPts val="300"/>
+              </a:spcAft>
+              <a:defRPr sz="1500">
+                <a:solidFill>
+                  <a:srgbClr val="E8EEFC"/>
+                </a:solidFill>
+                <a:latin typeface="DejaVu Sans Mono"/>
+              </a:defRPr>
+            </a:pPr>
+            <a:r>
+              <a:t>echo 'Review failed automations, stale skills, and permission scope' &gt; logs/weekly_review.txt</a:t>
+            </a:r>
+          </a:p>
+          <a:p>
+            <a:pPr>
+              <a:spcBef>
+                <a:spcPts val="0"/>
+              </a:spcBef>
+              <a:spcAft>
+                <a:spcPts val="300"/>
+              </a:spcAft>
+              <a:defRPr sz="1500">
+                <a:solidFill>
+                  <a:srgbClr val="E8EEFC"/>
+                </a:solidFill>
+                <a:latin typeface="DejaVu Sans Mono"/>
+              </a:defRPr>
+            </a:pPr>
+            <a:r>
+              <a:t>echo 'Approve next sprint improvements based on KPI trends' &gt;&gt; logs/weekly_review.txt</a:t>
+            </a:r>
+          </a:p>
+        </p:txBody>
+      </p:sp>
+    </p:spTree>
+  </p:cSld>
+  <p:clrMapOvr>
+    <a:masterClrMapping/>
+  </p:clrMapOvr>
+</p:sld>
+</file>
+
+<file path=ppt/slides/slide18.xml><?xml version="1.0" encoding="utf-8"?>
+<p:sld xmlns:a="http://schemas.openxmlformats.org/drawingml/2006/main" xmlns:p="http://schemas.openxmlformats.org/presentationml/2006/main" xmlns:r="http://schemas.openxmlformats.org/officeDocument/2006/relationships">
+  <p:cSld>
+    <p:spTree>
+      <p:nvGrpSpPr>
+        <p:cNvPr id="1" name=""/>
+        <p:cNvGrpSpPr/>
+        <p:nvPr/>
+      </p:nvGrpSpPr>
+      <p:grpSpPr/>
+      <p:sp>
+        <p:nvSpPr>
+          <p:cNvPr id="2" name="TextBox 1"/>
+          <p:cNvSpPr txBox="1"/>
+          <p:nvPr/>
+        </p:nvSpPr>
+        <p:spPr>
+          <a:xfrm>
+            <a:off x="411480" y="146304"/>
+            <a:ext cx="11155680" cy="640080"/>
+          </a:xfrm>
+          <a:prstGeom prst="rect">
+            <a:avLst/>
+          </a:prstGeom>
+          <a:noFill/>
+        </p:spPr>
+        <p:txBody>
+          <a:bodyPr wrap="none">
+            <a:spAutoFit/>
+          </a:bodyPr>
+          <a:lstStyle/>
+          <a:p>
+            <a:pPr algn="l"/>
+            <a:r>
+              <a:rPr sz="3400" b="1">
+                <a:solidFill>
+                  <a:srgbClr val="152A4B"/>
+                </a:solidFill>
+              </a:rPr>
+              <a:t>Risk Management and Governance Controls</a:t>
+            </a:r>
+          </a:p>
+        </p:txBody>
+      </p:sp>
+      <p:sp>
+        <p:nvSpPr>
+          <p:cNvPr id="3" name="TextBox 2"/>
+          <p:cNvSpPr txBox="1"/>
+          <p:nvPr/>
+        </p:nvSpPr>
+        <p:spPr>
+          <a:xfrm>
+            <a:off x="502920" y="1234440"/>
+            <a:ext cx="5029200" cy="5166360"/>
+          </a:xfrm>
+          <a:prstGeom prst="rect">
+            <a:avLst/>
+          </a:prstGeom>
+          <a:noFill/>
+        </p:spPr>
+        <p:txBody>
           <a:bodyPr wrap="square">
             <a:spAutoFit/>
           </a:bodyPr>
@@ -3697,7 +6028,7 @@
               </a:defRPr>
             </a:pPr>
             <a:r>
-              <a:t>Approve pilot scope and select 2-3 candidate squads.</a:t>
+              <a:t>Top risks: over-permissioned tokens, unreviewed write actions, and prompt drift.</a:t>
             </a:r>
           </a:p>
           <a:p>
@@ -3715,7 +6046,7 @@
               </a:defRPr>
             </a:pPr>
             <a:r>
-              <a:t>Assign owners for MCP platform, security controls, and skill registry.</a:t>
+              <a:t>Controls: RBAC, approval checkpoints, central logs, and benchmark test suites.</a:t>
             </a:r>
           </a:p>
           <a:p>
@@ -3733,7 +6064,7 @@
               </a:defRPr>
             </a:pPr>
             <a:r>
-              <a:t>Start weekly steering reviews using KPI dashboard outputs.</a:t>
+              <a:t>Security baseline: vault secrets, rotate credentials every 90 days, anomaly alerts.</a:t>
             </a:r>
           </a:p>
           <a:p>
@@ -3751,47 +6082,14 @@
               </a:defRPr>
             </a:pPr>
             <a:r>
-              <a:t>Plan executive checkpoint at day 45 and day 90.</a:t>
-            </a:r>
-          </a:p>
-          <a:p>
-            <a:pPr>
-              <a:spcBef>
-                <a:spcPts val="200"/>
-              </a:spcBef>
-              <a:spcAft>
-                <a:spcPts val="1000"/>
-              </a:spcAft>
-              <a:defRPr sz="2200">
-                <a:solidFill>
-                  <a:srgbClr val="233452"/>
-                </a:solidFill>
-              </a:defRPr>
-            </a:pPr>
-          </a:p>
-          <a:p>
-            <a:pPr>
-              <a:spcBef>
-                <a:spcPts val="200"/>
-              </a:spcBef>
-              <a:spcAft>
-                <a:spcPts val="1000"/>
-              </a:spcAft>
-              <a:defRPr sz="2200">
-                <a:solidFill>
-                  <a:srgbClr val="233452"/>
-                </a:solidFill>
-              </a:defRPr>
-            </a:pPr>
-            <a:r>
-              <a:t>Q&amp;A</a:t>
+              <a:t>Ownership: platform team manages MCP; squad leads manage skill effectiveness.</a:t>
             </a:r>
           </a:p>
         </p:txBody>
       </p:sp>
       <p:pic>
         <p:nvPicPr>
-          <p:cNvPr id="4" name="Picture 3" descr="title_visual.png"/>
+          <p:cNvPr id="4" name="Picture 3" descr="risk_heatmap.png"/>
           <p:cNvPicPr>
             <a:picLocks noChangeAspect="1"/>
           </p:cNvPicPr>
@@ -3805,8 +6103,179 @@
         </p:blipFill>
         <p:spPr>
           <a:xfrm>
-            <a:off x="5486400" y="1234440"/>
-            <a:ext cx="6309360" cy="3549015"/>
+            <a:off x="5440680" y="1143000"/>
+            <a:ext cx="6492240" cy="3650082"/>
+          </a:xfrm>
+          <a:prstGeom prst="rect">
+            <a:avLst/>
+          </a:prstGeom>
+        </p:spPr>
+      </p:pic>
+    </p:spTree>
+  </p:cSld>
+  <p:clrMapOvr>
+    <a:masterClrMapping/>
+  </p:clrMapOvr>
+</p:sld>
+</file>
+
+<file path=ppt/slides/slide19.xml><?xml version="1.0" encoding="utf-8"?>
+<p:sld xmlns:a="http://schemas.openxmlformats.org/drawingml/2006/main" xmlns:p="http://schemas.openxmlformats.org/presentationml/2006/main" xmlns:r="http://schemas.openxmlformats.org/officeDocument/2006/relationships">
+  <p:cSld>
+    <p:spTree>
+      <p:nvGrpSpPr>
+        <p:cNvPr id="1" name=""/>
+        <p:cNvGrpSpPr/>
+        <p:nvPr/>
+      </p:nvGrpSpPr>
+      <p:grpSpPr/>
+      <p:sp>
+        <p:nvSpPr>
+          <p:cNvPr id="2" name="TextBox 1"/>
+          <p:cNvSpPr txBox="1"/>
+          <p:nvPr/>
+        </p:nvSpPr>
+        <p:spPr>
+          <a:xfrm>
+            <a:off x="411480" y="146304"/>
+            <a:ext cx="11155680" cy="640080"/>
+          </a:xfrm>
+          <a:prstGeom prst="rect">
+            <a:avLst/>
+          </a:prstGeom>
+          <a:noFill/>
+        </p:spPr>
+        <p:txBody>
+          <a:bodyPr wrap="none">
+            <a:spAutoFit/>
+          </a:bodyPr>
+          <a:lstStyle/>
+          <a:p>
+            <a:pPr algn="l"/>
+            <a:r>
+              <a:rPr sz="3400" b="1">
+                <a:solidFill>
+                  <a:srgbClr val="152A4B"/>
+                </a:solidFill>
+              </a:rPr>
+              <a:t>90-Day Rollout Roadmap</a:t>
+            </a:r>
+          </a:p>
+        </p:txBody>
+      </p:sp>
+      <p:sp>
+        <p:nvSpPr>
+          <p:cNvPr id="3" name="TextBox 2"/>
+          <p:cNvSpPr txBox="1"/>
+          <p:nvPr/>
+        </p:nvSpPr>
+        <p:spPr>
+          <a:xfrm>
+            <a:off x="502920" y="1234440"/>
+            <a:ext cx="5029200" cy="5166360"/>
+          </a:xfrm>
+          <a:prstGeom prst="rect">
+            <a:avLst/>
+          </a:prstGeom>
+          <a:noFill/>
+        </p:spPr>
+        <p:txBody>
+          <a:bodyPr wrap="square">
+            <a:spAutoFit/>
+          </a:bodyPr>
+          <a:lstStyle/>
+          <a:p>
+            <a:pPr>
+              <a:spcBef>
+                <a:spcPts val="200"/>
+              </a:spcBef>
+              <a:spcAft>
+                <a:spcPts val="1000"/>
+              </a:spcAft>
+              <a:defRPr sz="2200">
+                <a:solidFill>
+                  <a:srgbClr val="233452"/>
+                </a:solidFill>
+              </a:defRPr>
+            </a:pPr>
+            <a:r>
+              <a:t>Days 0-30: establish MCP connectors, security controls, and baseline metrics.</a:t>
+            </a:r>
+          </a:p>
+          <a:p>
+            <a:pPr>
+              <a:spcBef>
+                <a:spcPts val="200"/>
+              </a:spcBef>
+              <a:spcAft>
+                <a:spcPts val="1000"/>
+              </a:spcAft>
+              <a:defRPr sz="2200">
+                <a:solidFill>
+                  <a:srgbClr val="233452"/>
+                </a:solidFill>
+              </a:defRPr>
+            </a:pPr>
+            <a:r>
+              <a:t>Days 31-60: publish high-value skills, add CI quality gates, and train champions.</a:t>
+            </a:r>
+          </a:p>
+          <a:p>
+            <a:pPr>
+              <a:spcBef>
+                <a:spcPts val="200"/>
+              </a:spcBef>
+              <a:spcAft>
+                <a:spcPts val="1000"/>
+              </a:spcAft>
+              <a:defRPr sz="2200">
+                <a:solidFill>
+                  <a:srgbClr val="233452"/>
+                </a:solidFill>
+              </a:defRPr>
+            </a:pPr>
+            <a:r>
+              <a:t>Days 61-90: scale to additional squads and report quantified business impact.</a:t>
+            </a:r>
+          </a:p>
+          <a:p>
+            <a:pPr>
+              <a:spcBef>
+                <a:spcPts val="200"/>
+              </a:spcBef>
+              <a:spcAft>
+                <a:spcPts val="1000"/>
+              </a:spcAft>
+              <a:defRPr sz="2200">
+                <a:solidFill>
+                  <a:srgbClr val="233452"/>
+                </a:solidFill>
+              </a:defRPr>
+            </a:pPr>
+            <a:r>
+              <a:t>Success target: &gt;20% cycle-time improvement without governance incidents.</a:t>
+            </a:r>
+          </a:p>
+        </p:txBody>
+      </p:sp>
+      <p:pic>
+        <p:nvPicPr>
+          <p:cNvPr id="4" name="Picture 3" descr="roadmap.png"/>
+          <p:cNvPicPr>
+            <a:picLocks noChangeAspect="1"/>
+          </p:cNvPicPr>
+          <p:nvPr/>
+        </p:nvPicPr>
+        <p:blipFill>
+          <a:blip r:embed="rId2"/>
+          <a:stretch>
+            <a:fillRect/>
+          </a:stretch>
+        </p:blipFill>
+        <p:spPr>
+          <a:xfrm>
+            <a:off x="5440680" y="1143000"/>
+            <a:ext cx="6492240" cy="3650082"/>
           </a:xfrm>
           <a:prstGeom prst="rect">
             <a:avLst/>
@@ -3901,7 +6370,7 @@
               </a:defRPr>
             </a:pPr>
             <a:r>
-              <a:t>1) Assessment scope and current maturity baseline</a:t>
+              <a:t>1) Capability assessment and current maturity baseline</a:t>
             </a:r>
           </a:p>
           <a:p>
@@ -3919,7 +6388,7 @@
               </a:defRPr>
             </a:pPr>
             <a:r>
-              <a:t>2) Cursor AI capability findings and fit for delivery teams</a:t>
+              <a:t>2) MCP integration patterns for Jira, Figma, and Bitbucket</a:t>
             </a:r>
           </a:p>
           <a:p>
@@ -3937,7 +6406,7 @@
               </a:defRPr>
             </a:pPr>
             <a:r>
-              <a:t>3) MCP integration patterns for Jira, Figma, and Bitbucket</a:t>
+              <a:t>3) Effective usage model for developers and team leads</a:t>
             </a:r>
           </a:p>
           <a:p>
@@ -3955,7 +6424,7 @@
               </a:defRPr>
             </a:pPr>
             <a:r>
-              <a:t>4) How to use Cursor effectively in day-to-day workflows</a:t>
+              <a:t>4) Hands-on tutorial with setup and commands</a:t>
             </a:r>
           </a:p>
           <a:p>
@@ -3973,7 +6442,7 @@
               </a:defRPr>
             </a:pPr>
             <a:r>
-              <a:t>5) How to add and govern agent skills for repeatability</a:t>
+              <a:t>5) How to add and maintain agent skills</a:t>
             </a:r>
           </a:p>
           <a:p>
@@ -3991,11 +6460,215 @@
               </a:defRPr>
             </a:pPr>
             <a:r>
-              <a:t>6) 90-day rollout roadmap, risks, and KPI tracking model</a:t>
-            </a:r>
-          </a:p>
-        </p:txBody>
-      </p:sp>
+              <a:t>6) Governance controls, KPI tracking, and 90-day roadmap</a:t>
+            </a:r>
+          </a:p>
+        </p:txBody>
+      </p:sp>
+    </p:spTree>
+  </p:cSld>
+  <p:clrMapOvr>
+    <a:masterClrMapping/>
+  </p:clrMapOvr>
+</p:sld>
+</file>
+
+<file path=ppt/slides/slide20.xml><?xml version="1.0" encoding="utf-8"?>
+<p:sld xmlns:a="http://schemas.openxmlformats.org/drawingml/2006/main" xmlns:p="http://schemas.openxmlformats.org/presentationml/2006/main" xmlns:r="http://schemas.openxmlformats.org/officeDocument/2006/relationships">
+  <p:cSld>
+    <p:spTree>
+      <p:nvGrpSpPr>
+        <p:cNvPr id="1" name=""/>
+        <p:cNvGrpSpPr/>
+        <p:nvPr/>
+      </p:nvGrpSpPr>
+      <p:grpSpPr/>
+      <p:sp>
+        <p:nvSpPr>
+          <p:cNvPr id="2" name="TextBox 1"/>
+          <p:cNvSpPr txBox="1"/>
+          <p:nvPr/>
+        </p:nvSpPr>
+        <p:spPr>
+          <a:xfrm>
+            <a:off x="411480" y="146304"/>
+            <a:ext cx="11155680" cy="640080"/>
+          </a:xfrm>
+          <a:prstGeom prst="rect">
+            <a:avLst/>
+          </a:prstGeom>
+          <a:noFill/>
+        </p:spPr>
+        <p:txBody>
+          <a:bodyPr wrap="none">
+            <a:spAutoFit/>
+          </a:bodyPr>
+          <a:lstStyle/>
+          <a:p>
+            <a:pPr algn="l"/>
+            <a:r>
+              <a:rPr sz="3400" b="1">
+                <a:solidFill>
+                  <a:srgbClr val="152A4B"/>
+                </a:solidFill>
+              </a:rPr>
+              <a:t>Recommended Next Steps</a:t>
+            </a:r>
+          </a:p>
+        </p:txBody>
+      </p:sp>
+      <p:sp>
+        <p:nvSpPr>
+          <p:cNvPr id="3" name="TextBox 2"/>
+          <p:cNvSpPr txBox="1"/>
+          <p:nvPr/>
+        </p:nvSpPr>
+        <p:spPr>
+          <a:xfrm>
+            <a:off x="822960" y="1463040"/>
+            <a:ext cx="5029200" cy="4937760"/>
+          </a:xfrm>
+          <a:prstGeom prst="rect">
+            <a:avLst/>
+          </a:prstGeom>
+          <a:noFill/>
+        </p:spPr>
+        <p:txBody>
+          <a:bodyPr wrap="square">
+            <a:spAutoFit/>
+          </a:bodyPr>
+          <a:lstStyle/>
+          <a:p>
+            <a:pPr>
+              <a:spcBef>
+                <a:spcPts val="200"/>
+              </a:spcBef>
+              <a:spcAft>
+                <a:spcPts val="1000"/>
+              </a:spcAft>
+              <a:defRPr sz="2200">
+                <a:solidFill>
+                  <a:srgbClr val="233452"/>
+                </a:solidFill>
+              </a:defRPr>
+            </a:pPr>
+            <a:r>
+              <a:t>Approve pilot scope and select 2-3 candidate squads.</a:t>
+            </a:r>
+          </a:p>
+          <a:p>
+            <a:pPr>
+              <a:spcBef>
+                <a:spcPts val="200"/>
+              </a:spcBef>
+              <a:spcAft>
+                <a:spcPts val="1000"/>
+              </a:spcAft>
+              <a:defRPr sz="2200">
+                <a:solidFill>
+                  <a:srgbClr val="233452"/>
+                </a:solidFill>
+              </a:defRPr>
+            </a:pPr>
+            <a:r>
+              <a:t>Assign owners for MCP platform, security controls, and skill registry.</a:t>
+            </a:r>
+          </a:p>
+          <a:p>
+            <a:pPr>
+              <a:spcBef>
+                <a:spcPts val="200"/>
+              </a:spcBef>
+              <a:spcAft>
+                <a:spcPts val="1000"/>
+              </a:spcAft>
+              <a:defRPr sz="2200">
+                <a:solidFill>
+                  <a:srgbClr val="233452"/>
+                </a:solidFill>
+              </a:defRPr>
+            </a:pPr>
+            <a:r>
+              <a:t>Start weekly steering reviews using KPI dashboard outputs.</a:t>
+            </a:r>
+          </a:p>
+          <a:p>
+            <a:pPr>
+              <a:spcBef>
+                <a:spcPts val="200"/>
+              </a:spcBef>
+              <a:spcAft>
+                <a:spcPts val="1000"/>
+              </a:spcAft>
+              <a:defRPr sz="2200">
+                <a:solidFill>
+                  <a:srgbClr val="233452"/>
+                </a:solidFill>
+              </a:defRPr>
+            </a:pPr>
+            <a:r>
+              <a:t>Plan executive checkpoint at day 45 and day 90.</a:t>
+            </a:r>
+          </a:p>
+          <a:p>
+            <a:pPr>
+              <a:spcBef>
+                <a:spcPts val="200"/>
+              </a:spcBef>
+              <a:spcAft>
+                <a:spcPts val="1000"/>
+              </a:spcAft>
+              <a:defRPr sz="2200">
+                <a:solidFill>
+                  <a:srgbClr val="233452"/>
+                </a:solidFill>
+              </a:defRPr>
+            </a:pPr>
+          </a:p>
+          <a:p>
+            <a:pPr>
+              <a:spcBef>
+                <a:spcPts val="200"/>
+              </a:spcBef>
+              <a:spcAft>
+                <a:spcPts val="1000"/>
+              </a:spcAft>
+              <a:defRPr sz="2200">
+                <a:solidFill>
+                  <a:srgbClr val="233452"/>
+                </a:solidFill>
+              </a:defRPr>
+            </a:pPr>
+            <a:r>
+              <a:t>Q&amp;A</a:t>
+            </a:r>
+          </a:p>
+        </p:txBody>
+      </p:sp>
+      <p:pic>
+        <p:nvPicPr>
+          <p:cNvPr id="4" name="Picture 3" descr="title_visual.png"/>
+          <p:cNvPicPr>
+            <a:picLocks noChangeAspect="1"/>
+          </p:cNvPicPr>
+          <p:nvPr/>
+        </p:nvPicPr>
+        <p:blipFill>
+          <a:blip r:embed="rId2"/>
+          <a:stretch>
+            <a:fillRect/>
+          </a:stretch>
+        </p:blipFill>
+        <p:spPr>
+          <a:xfrm>
+            <a:off x="5440680" y="1143000"/>
+            <a:ext cx="6492240" cy="3650082"/>
+          </a:xfrm>
+          <a:prstGeom prst="rect">
+            <a:avLst/>
+          </a:prstGeom>
+        </p:spPr>
+      </p:pic>
     </p:spTree>
   </p:cSld>
   <p:clrMapOvr>
@@ -4043,7 +6716,7 @@
                   <a:srgbClr val="152A4B"/>
                 </a:solidFill>
               </a:rPr>
-              <a:t>Assessment Snapshot: Cursor AI Capability Maturity</a:t>
+              <a:t>Developer Training Approach (Easy Adoption)</a:t>
             </a:r>
           </a:p>
         </p:txBody>
@@ -4056,8 +6729,8 @@
         </p:nvSpPr>
         <p:spPr>
           <a:xfrm>
-            <a:off x="502920" y="1234440"/>
-            <a:ext cx="5029200" cy="5166360"/>
+            <a:off x="438912" y="749808"/>
+            <a:ext cx="10972800" cy="411480"/>
           </a:xfrm>
           <a:prstGeom prst="rect">
             <a:avLst/>
@@ -4065,6 +6738,39 @@
           <a:noFill/>
         </p:spPr>
         <p:txBody>
+          <a:bodyPr wrap="none">
+            <a:spAutoFit/>
+          </a:bodyPr>
+          <a:lstStyle/>
+          <a:p>
+            <a:r>
+              <a:rPr sz="1800">
+                <a:solidFill>
+                  <a:srgbClr val="465876"/>
+                </a:solidFill>
+              </a:rPr>
+              <a:t>Run this as a 4-week plan: 20% concepts + 80% practical labs.</a:t>
+            </a:r>
+          </a:p>
+        </p:txBody>
+      </p:sp>
+      <p:sp>
+        <p:nvSpPr>
+          <p:cNvPr id="4" name="TextBox 3"/>
+          <p:cNvSpPr txBox="1"/>
+          <p:nvPr/>
+        </p:nvSpPr>
+        <p:spPr>
+          <a:xfrm>
+            <a:off x="502920" y="1234440"/>
+            <a:ext cx="5029200" cy="5166360"/>
+          </a:xfrm>
+          <a:prstGeom prst="rect">
+            <a:avLst/>
+          </a:prstGeom>
+          <a:noFill/>
+        </p:spPr>
+        <p:txBody>
           <a:bodyPr wrap="square">
             <a:spAutoFit/>
           </a:bodyPr>
@@ -4084,7 +6790,7 @@
               </a:defRPr>
             </a:pPr>
             <a:r>
-              <a:t>Overall readiness is strong for a controlled pilot: 3.8 / 5.0.</a:t>
+              <a:t>Week 1: foundation and MCP setup by each developer.</a:t>
             </a:r>
           </a:p>
           <a:p>
@@ -4102,7 +6808,7 @@
               </a:defRPr>
             </a:pPr>
             <a:r>
-              <a:t>Strongest dimensions: code generation, refactoring, and context-aware assistance.</a:t>
+              <a:t>Week 2: Jira, Figma, and Bitbucket workflow labs.</a:t>
             </a:r>
           </a:p>
           <a:p>
@@ -4120,7 +6826,7 @@
               </a:defRPr>
             </a:pPr>
             <a:r>
-              <a:t>Main gaps: standardized workflow recipes, governance instrumentation, and skill reuse.</a:t>
+              <a:t>Week 3: prompt standardization and quality gates.</a:t>
             </a:r>
           </a:p>
           <a:p>
@@ -4138,14 +6844,14 @@
               </a:defRPr>
             </a:pPr>
             <a:r>
-              <a:t>Recommendation: pilot with two squads and centralized enablement support.</a:t>
+              <a:t>Week 4: skill creation, versioning, and team rollout.</a:t>
             </a:r>
           </a:p>
         </p:txBody>
       </p:sp>
       <p:pic>
         <p:nvPicPr>
-          <p:cNvPr id="4" name="Picture 3" descr="capability_chart.png"/>
+          <p:cNvPr id="5" name="Picture 4" descr="tutorial_flow.png"/>
           <p:cNvPicPr>
             <a:picLocks noChangeAspect="1"/>
           </p:cNvPicPr>
@@ -4159,8 +6865,8 @@
         </p:blipFill>
         <p:spPr>
           <a:xfrm>
-            <a:off x="5669280" y="1188720"/>
-            <a:ext cx="6217920" cy="3497580"/>
+            <a:off x="5532120" y="1143000"/>
+            <a:ext cx="6400800" cy="3598672"/>
           </a:xfrm>
           <a:prstGeom prst="rect">
             <a:avLst/>
@@ -4214,7 +6920,7 @@
                   <a:srgbClr val="152A4B"/>
                 </a:solidFill>
               </a:rPr>
-              <a:t>Target Integration Architecture (MCP + Cursor Agents)</a:t>
+              <a:t>Assessment Snapshot: Cursor AI Capability Maturity</a:t>
             </a:r>
           </a:p>
         </p:txBody>
@@ -4255,7 +6961,7 @@
               </a:defRPr>
             </a:pPr>
             <a:r>
-              <a:t>MCP servers expose enterprise tools using normalized schemas for agents.</a:t>
+              <a:t>Overall readiness is strong for a controlled pilot: 3.8 / 5.0.</a:t>
             </a:r>
           </a:p>
           <a:p>
@@ -4273,7 +6979,7 @@
               </a:defRPr>
             </a:pPr>
             <a:r>
-              <a:t>Use least-privilege service accounts and repository/project allow-lists.</a:t>
+              <a:t>Strongest dimensions: code generation, refactoring, and context-aware assistance.</a:t>
             </a:r>
           </a:p>
           <a:p>
@@ -4291,7 +6997,7 @@
               </a:defRPr>
             </a:pPr>
             <a:r>
-              <a:t>Require human approval for state-changing actions (status updates, merges).</a:t>
+              <a:t>Main gaps: standardized workflow recipes, governance instrumentation, and skill reuse.</a:t>
             </a:r>
           </a:p>
           <a:p>
@@ -4309,14 +7015,14 @@
               </a:defRPr>
             </a:pPr>
             <a:r>
-              <a:t>Log prompts, tool calls, and outputs for audit and compliance traceability.</a:t>
+              <a:t>Recommendation: pilot with two squads and centralized enablement support.</a:t>
             </a:r>
           </a:p>
         </p:txBody>
       </p:sp>
       <p:pic>
         <p:nvPicPr>
-          <p:cNvPr id="4" name="Picture 3" descr="architecture.png"/>
+          <p:cNvPr id="4" name="Picture 3" descr="capability_chart.png"/>
           <p:cNvPicPr>
             <a:picLocks noChangeAspect="1"/>
           </p:cNvPicPr>
@@ -4330,8 +7036,8 @@
         </p:blipFill>
         <p:spPr>
           <a:xfrm>
-            <a:off x="5669280" y="1188720"/>
-            <a:ext cx="6217920" cy="3497580"/>
+            <a:off x="5440680" y="1143000"/>
+            <a:ext cx="6492240" cy="3650082"/>
           </a:xfrm>
           <a:prstGeom prst="rect">
             <a:avLst/>
@@ -4385,7 +7091,7 @@
                   <a:srgbClr val="152A4B"/>
                 </a:solidFill>
               </a:rPr>
-              <a:t>MCP for Jira: Workflow Automation Opportunities</a:t>
+              <a:t>Target Integration Architecture (MCP + Cursor Agents)</a:t>
             </a:r>
           </a:p>
         </p:txBody>
@@ -4426,7 +7132,7 @@
               </a:defRPr>
             </a:pPr>
             <a:r>
-              <a:t>Use cases: ticket summarization, acceptance criteria drafting, and test scenario generation.</a:t>
+              <a:t>MCP servers expose enterprise tools using normalized schemas for agents.</a:t>
             </a:r>
           </a:p>
           <a:p>
@@ -4444,7 +7150,7 @@
               </a:defRPr>
             </a:pPr>
             <a:r>
-              <a:t>Setup: Jira token, MCP Jira server configuration, project and issue filters.</a:t>
+              <a:t>Use least-privilege service accounts and repository/project allow-lists.</a:t>
             </a:r>
           </a:p>
           <a:p>
@@ -4462,7 +7168,7 @@
               </a:defRPr>
             </a:pPr>
             <a:r>
-              <a:t>Guardrails: no automatic status transitions without explicit user confirmation.</a:t>
+              <a:t>Require human approval for state-changing actions (status updates, merges).</a:t>
             </a:r>
           </a:p>
           <a:p>
@@ -4480,14 +7186,14 @@
               </a:defRPr>
             </a:pPr>
             <a:r>
-              <a:t>KPIs: grooming time, cycle time, reopen rate, and requirement clarity.</a:t>
+              <a:t>Log prompts, tool calls, and outputs for audit and compliance traceability.</a:t>
             </a:r>
           </a:p>
         </p:txBody>
       </p:sp>
       <p:pic>
         <p:nvPicPr>
-          <p:cNvPr id="4" name="Picture 3" descr="jira_mcp.png"/>
+          <p:cNvPr id="4" name="Picture 3" descr="architecture.png"/>
           <p:cNvPicPr>
             <a:picLocks noChangeAspect="1"/>
           </p:cNvPicPr>
@@ -4501,8 +7207,8 @@
         </p:blipFill>
         <p:spPr>
           <a:xfrm>
-            <a:off x="5669280" y="1188720"/>
-            <a:ext cx="6217920" cy="3497580"/>
+            <a:off x="5440680" y="1143000"/>
+            <a:ext cx="6492240" cy="3650082"/>
           </a:xfrm>
           <a:prstGeom prst="rect">
             <a:avLst/>
@@ -4556,7 +7262,7 @@
                   <a:srgbClr val="152A4B"/>
                 </a:solidFill>
               </a:rPr>
-              <a:t>MCP for Figma: Design-to-Code Acceleration</a:t>
+              <a:t>MCP for Jira: Workflow Automation Opportunities</a:t>
             </a:r>
           </a:p>
         </p:txBody>
@@ -4597,7 +7303,7 @@
               </a:defRPr>
             </a:pPr>
             <a:r>
-              <a:t>Use cases: extract design tokens, generate implementation notes, map components to stories.</a:t>
+              <a:t>Use cases: ticket summarization, acceptance criteria drafting, and test scenario generation.</a:t>
             </a:r>
           </a:p>
           <a:p>
@@ -4615,7 +7321,7 @@
               </a:defRPr>
             </a:pPr>
             <a:r>
-              <a:t>Setup: scoped Figma token, design-system mapping, and project-level permissions.</a:t>
+              <a:t>Setup: Jira token, MCP Jira server configuration, project and issue filters.</a:t>
             </a:r>
           </a:p>
           <a:p>
@@ -4633,7 +7339,7 @@
               </a:defRPr>
             </a:pPr>
             <a:r>
-              <a:t>Guardrails: read-only access in production design files; write only in sandbox.</a:t>
+              <a:t>Guardrails: no automatic status transitions without explicit user confirmation.</a:t>
             </a:r>
           </a:p>
           <a:p>
@@ -4651,14 +7357,14 @@
               </a:defRPr>
             </a:pPr>
             <a:r>
-              <a:t>KPIs: handoff defects, UI rework effort, and design implementation lead time.</a:t>
+              <a:t>KPIs: grooming time, cycle time, reopen rate, and requirement clarity.</a:t>
             </a:r>
           </a:p>
         </p:txBody>
       </p:sp>
       <p:pic>
         <p:nvPicPr>
-          <p:cNvPr id="4" name="Picture 3" descr="figma_mcp.png"/>
+          <p:cNvPr id="4" name="Picture 3" descr="jira_mcp.png"/>
           <p:cNvPicPr>
             <a:picLocks noChangeAspect="1"/>
           </p:cNvPicPr>
@@ -4672,8 +7378,8 @@
         </p:blipFill>
         <p:spPr>
           <a:xfrm>
-            <a:off x="5669280" y="1188720"/>
-            <a:ext cx="6217920" cy="3497580"/>
+            <a:off x="5440680" y="1143000"/>
+            <a:ext cx="6492240" cy="3650082"/>
           </a:xfrm>
           <a:prstGeom prst="rect">
             <a:avLst/>
@@ -4727,7 +7433,7 @@
                   <a:srgbClr val="152A4B"/>
                 </a:solidFill>
               </a:rPr>
-              <a:t>MCP for Bitbucket: Source Control Intelligence</a:t>
+              <a:t>MCP for Figma: Design-to-Code Acceleration</a:t>
             </a:r>
           </a:p>
         </p:txBody>
@@ -4768,7 +7474,7 @@
               </a:defRPr>
             </a:pPr>
             <a:r>
-              <a:t>Use cases: repository analysis, PR description drafts, and review checklist generation.</a:t>
+              <a:t>Use cases: extract design tokens, generate implementation notes, map components to stories.</a:t>
             </a:r>
           </a:p>
           <a:p>
@@ -4786,7 +7492,7 @@
               </a:defRPr>
             </a:pPr>
             <a:r>
-              <a:t>Setup: OAuth/app password, branch protections, and repository allow-list.</a:t>
+              <a:t>Setup: scoped Figma token, design-system mapping, and project-level permissions.</a:t>
             </a:r>
           </a:p>
           <a:p>
@@ -4804,7 +7510,7 @@
               </a:defRPr>
             </a:pPr>
             <a:r>
-              <a:t>Guardrails: protected branches, mandatory reviewer, and CI pass before merge.</a:t>
+              <a:t>Guardrails: read-only access in production design files; write only in sandbox.</a:t>
             </a:r>
           </a:p>
           <a:p>
@@ -4822,14 +7528,14 @@
               </a:defRPr>
             </a:pPr>
             <a:r>
-              <a:t>KPIs: PR lead time, review latency, escaped defect rate, and release quality.</a:t>
+              <a:t>KPIs: handoff defects, UI rework effort, and design implementation lead time.</a:t>
             </a:r>
           </a:p>
         </p:txBody>
       </p:sp>
       <p:pic>
         <p:nvPicPr>
-          <p:cNvPr id="4" name="Picture 3" descr="bitbucket_mcp.png"/>
+          <p:cNvPr id="4" name="Picture 3" descr="figma_mcp.png"/>
           <p:cNvPicPr>
             <a:picLocks noChangeAspect="1"/>
           </p:cNvPicPr>
@@ -4843,8 +7549,8 @@
         </p:blipFill>
         <p:spPr>
           <a:xfrm>
-            <a:off x="5669280" y="1188720"/>
-            <a:ext cx="6217920" cy="3497580"/>
+            <a:off x="5440680" y="1143000"/>
+            <a:ext cx="6492240" cy="3650082"/>
           </a:xfrm>
           <a:prstGeom prst="rect">
             <a:avLst/>
@@ -4898,7 +7604,7 @@
                   <a:srgbClr val="152A4B"/>
                 </a:solidFill>
               </a:rPr>
-              <a:t>How to Use Cursor + MCP Effectively</a:t>
+              <a:t>MCP for Bitbucket: Source Control Intelligence</a:t>
             </a:r>
           </a:p>
         </p:txBody>
@@ -4939,7 +7645,7 @@
               </a:defRPr>
             </a:pPr>
             <a:r>
-              <a:t>Standardize prompts as reusable recipes for common engineering tasks.</a:t>
+              <a:t>Use cases: repository analysis, PR description drafts, and review checklist generation.</a:t>
             </a:r>
           </a:p>
           <a:p>
@@ -4957,7 +7663,7 @@
               </a:defRPr>
             </a:pPr>
             <a:r>
-              <a:t>Start with assistant mode, then scale to agent actions with approval checkpoints.</a:t>
+              <a:t>Setup: OAuth/app password, branch protections, and repository allow-list.</a:t>
             </a:r>
           </a:p>
           <a:p>
@@ -4975,7 +7681,7 @@
               </a:defRPr>
             </a:pPr>
             <a:r>
-              <a:t>Attach each workflow to quality gates and a clear Definition of Done.</a:t>
+              <a:t>Guardrails: protected branches, mandatory reviewer, and CI pass before merge.</a:t>
             </a:r>
           </a:p>
           <a:p>
@@ -4993,14 +7699,14 @@
               </a:defRPr>
             </a:pPr>
             <a:r>
-              <a:t>Review adoption and quality metrics weekly; retire low-value automations quickly.</a:t>
+              <a:t>KPIs: PR lead time, review latency, escaped defect rate, and release quality.</a:t>
             </a:r>
           </a:p>
         </p:txBody>
       </p:sp>
       <p:pic>
         <p:nvPicPr>
-          <p:cNvPr id="4" name="Picture 3" descr="effectiveness_matrix.png"/>
+          <p:cNvPr id="4" name="Picture 3" descr="bitbucket_mcp.png"/>
           <p:cNvPicPr>
             <a:picLocks noChangeAspect="1"/>
           </p:cNvPicPr>
@@ -5014,8 +7720,8 @@
         </p:blipFill>
         <p:spPr>
           <a:xfrm>
-            <a:off x="5669280" y="1188720"/>
-            <a:ext cx="6217920" cy="3497580"/>
+            <a:off x="5440680" y="1143000"/>
+            <a:ext cx="6492240" cy="3650082"/>
           </a:xfrm>
           <a:prstGeom prst="rect">
             <a:avLst/>
@@ -5069,7 +7775,7 @@
                   <a:srgbClr val="152A4B"/>
                 </a:solidFill>
               </a:rPr>
-              <a:t>How to Add Agent Skills</a:t>
+              <a:t>How to Use Cursor + MCP Effectively</a:t>
             </a:r>
           </a:p>
         </p:txBody>
@@ -5110,7 +7816,7 @@
               </a:defRPr>
             </a:pPr>
             <a:r>
-              <a:t>A skill package should include metadata, prompts, tools, and validation tests.</a:t>
+              <a:t>Standardize prompts as reusable recipes for common engineering tasks.</a:t>
             </a:r>
           </a:p>
           <a:p>
@@ -5128,7 +7834,7 @@
               </a:defRPr>
             </a:pPr>
             <a:r>
-              <a:t>Use a versioned registry and changelog for transparent rollout and rollback.</a:t>
+              <a:t>Start with assistant mode, then scale to agent actions with approval checkpoints.</a:t>
             </a:r>
           </a:p>
           <a:p>
@@ -5146,7 +7852,7 @@
               </a:defRPr>
             </a:pPr>
             <a:r>
-              <a:t>Test each skill on golden tasks before publishing to teams.</a:t>
+              <a:t>Attach each workflow to quality gates and a clear Definition of Done.</a:t>
             </a:r>
           </a:p>
           <a:p>
@@ -5164,14 +7870,14 @@
               </a:defRPr>
             </a:pPr>
             <a:r>
-              <a:t>Run monthly quality reviews to improve prompts and remove stale skills.</a:t>
+              <a:t>Review adoption and quality metrics weekly; retire low-value automations quickly.</a:t>
             </a:r>
           </a:p>
         </p:txBody>
       </p:sp>
       <p:pic>
         <p:nvPicPr>
-          <p:cNvPr id="4" name="Picture 3" descr="skill_lifecycle.png"/>
+          <p:cNvPr id="4" name="Picture 3" descr="effectiveness_matrix.png"/>
           <p:cNvPicPr>
             <a:picLocks noChangeAspect="1"/>
           </p:cNvPicPr>
@@ -5185,8 +7891,8 @@
         </p:blipFill>
         <p:spPr>
           <a:xfrm>
-            <a:off x="5669280" y="1188720"/>
-            <a:ext cx="6217920" cy="3497580"/>
+            <a:off x="5440680" y="1143000"/>
+            <a:ext cx="6492240" cy="3650082"/>
           </a:xfrm>
           <a:prstGeom prst="rect">
             <a:avLst/>

</xml_diff>

<commit_message>
Add trainer aid slides and troubleshooting guides to MCP deck
Co-authored-by: hassanahmedfoodservicesdirectunilever <hassanahmedfoodservicesdirectunilever@users.noreply.github.com>
</commit_message>
<xml_diff>
--- a/Solution_Assessment_Cursor_AI_Capabilities_Integration_Review.pptx
+++ b/Solution_Assessment_Cursor_AI_Capabilities_Integration_Review.pptx
@@ -24,6 +24,10 @@
     <p:sldId id="272" r:id="rId23"/>
     <p:sldId id="273" r:id="rId24"/>
     <p:sldId id="274" r:id="rId25"/>
+    <p:sldId id="275" r:id="rId26"/>
+    <p:sldId id="276" r:id="rId27"/>
+    <p:sldId id="277" r:id="rId28"/>
+    <p:sldId id="278" r:id="rId29"/>
   </p:sldIdLst>
   <p:sldSz cx="12191695" cy="6858000" type="screen4x3"/>
   <p:notesSz cx="6858000" cy="9144000"/>
@@ -3357,89 +3361,21 @@
                   <a:srgbClr val="14284A"/>
                 </a:solidFill>
               </a:rPr>
-              <a:t>Step 3: Add mcp.json config in Cursor</a:t>
-            </a:r>
-          </a:p>
-        </p:txBody>
-      </p:sp>
-      <p:sp>
-        <p:nvSpPr>
-          <p:cNvPr id="3" name="TextBox 2"/>
-          <p:cNvSpPr txBox="1"/>
-          <p:nvPr/>
-        </p:nvSpPr>
-        <p:spPr>
-          <a:xfrm>
-            <a:off x="502920" y="1280160"/>
-            <a:ext cx="4754880" cy="1645920"/>
-          </a:xfrm>
-          <a:prstGeom prst="rect">
-            <a:avLst/>
-          </a:prstGeom>
-          <a:noFill/>
-        </p:spPr>
-        <p:txBody>
-          <a:bodyPr wrap="square">
-            <a:spAutoFit/>
-          </a:bodyPr>
-          <a:lstStyle/>
-          <a:p>
-            <a:pPr>
-              <a:spcAft>
-                <a:spcPts val="800"/>
-              </a:spcAft>
-              <a:defRPr sz="2200">
-                <a:solidFill>
-                  <a:srgbClr val="233554"/>
-                </a:solidFill>
-              </a:defRPr>
-            </a:pPr>
-            <a:r>
-              <a:t>Paste this config in .cursor/mcp.json:</a:t>
-            </a:r>
-          </a:p>
-          <a:p>
-            <a:pPr>
-              <a:spcAft>
-                <a:spcPts val="800"/>
-              </a:spcAft>
-              <a:defRPr sz="2200">
-                <a:solidFill>
-                  <a:srgbClr val="233554"/>
-                </a:solidFill>
-              </a:defRPr>
-            </a:pPr>
-            <a:r>
-              <a:t>Use your own server script paths.</a:t>
-            </a:r>
-          </a:p>
-          <a:p>
-            <a:pPr>
-              <a:spcAft>
-                <a:spcPts val="800"/>
-              </a:spcAft>
-              <a:defRPr sz="2200">
-                <a:solidFill>
-                  <a:srgbClr val="233554"/>
-                </a:solidFill>
-              </a:defRPr>
-            </a:pPr>
-            <a:r>
-              <a:t>Save file and restart Cursor.</a:t>
-            </a:r>
-          </a:p>
-        </p:txBody>
-      </p:sp>
-      <p:sp>
-        <p:nvSpPr>
-          <p:cNvPr id="4" name="Rounded Rectangle 3"/>
+              <a:t>Step 1: Prepare local machine (copy and run)</a:t>
+            </a:r>
+          </a:p>
+        </p:txBody>
+      </p:sp>
+      <p:sp>
+        <p:nvSpPr>
+          <p:cNvPr id="3" name="Rounded Rectangle 2"/>
           <p:cNvSpPr/>
           <p:nvPr/>
         </p:nvSpPr>
         <p:spPr>
           <a:xfrm>
-            <a:off x="502920" y="2743200"/>
-            <a:ext cx="4754880" cy="3611880"/>
+            <a:off x="502920" y="1417320"/>
+            <a:ext cx="11155680" cy="5303520"/>
           </a:xfrm>
           <a:prstGeom prst="roundRect">
             <a:avLst/>
@@ -3478,7 +3414,7 @@
               <a:spcAft>
                 <a:spcPts val="100"/>
               </a:spcAft>
-              <a:defRPr sz="1300">
+              <a:defRPr sz="1400">
                 <a:solidFill>
                   <a:srgbClr val="E4ECFC"/>
                 </a:solidFill>
@@ -3486,7 +3422,7 @@
               </a:defRPr>
             </a:pPr>
             <a:r>
-              <a:t>{</a:t>
+              <a:t>mkdir -p ~/cursor-mcp-training/{servers,skills,logs} &amp;&amp; cd ~/cursor-mcp-training</a:t>
             </a:r>
           </a:p>
           <a:p>
@@ -3497,7 +3433,7 @@
               <a:spcAft>
                 <a:spcPts val="100"/>
               </a:spcAft>
-              <a:defRPr sz="1300">
+              <a:defRPr sz="1400">
                 <a:solidFill>
                   <a:srgbClr val="E4ECFC"/>
                 </a:solidFill>
@@ -3505,7 +3441,7 @@
               </a:defRPr>
             </a:pPr>
             <a:r>
-              <a:t>  "mcpServers": {</a:t>
+              <a:t>python3 -m venv .venv</a:t>
             </a:r>
           </a:p>
           <a:p>
@@ -3516,7 +3452,7 @@
               <a:spcAft>
                 <a:spcPts val="100"/>
               </a:spcAft>
-              <a:defRPr sz="1300">
+              <a:defRPr sz="1400">
                 <a:solidFill>
                   <a:srgbClr val="E4ECFC"/>
                 </a:solidFill>
@@ -3524,7 +3460,7 @@
               </a:defRPr>
             </a:pPr>
             <a:r>
-              <a:t>    "jira": {"command":"python","args":["servers/jira_server.py"],"envFile":".env"},</a:t>
+              <a:t>source .venv/bin/activate</a:t>
             </a:r>
           </a:p>
           <a:p>
@@ -3535,7 +3471,7 @@
               <a:spcAft>
                 <a:spcPts val="100"/>
               </a:spcAft>
-              <a:defRPr sz="1300">
+              <a:defRPr sz="1400">
                 <a:solidFill>
                   <a:srgbClr val="E4ECFC"/>
                 </a:solidFill>
@@ -3543,7 +3479,7 @@
               </a:defRPr>
             </a:pPr>
             <a:r>
-              <a:t>    "figma": {"command":"python","args":["servers/figma_server.py"],"envFile":".env"},</a:t>
+              <a:t>python -m pip install --upgrade pip</a:t>
             </a:r>
           </a:p>
           <a:p>
@@ -3554,7 +3490,7 @@
               <a:spcAft>
                 <a:spcPts val="100"/>
               </a:spcAft>
-              <a:defRPr sz="1300">
+              <a:defRPr sz="1400">
                 <a:solidFill>
                   <a:srgbClr val="E4ECFC"/>
                 </a:solidFill>
@@ -3562,7 +3498,7 @@
               </a:defRPr>
             </a:pPr>
             <a:r>
-              <a:t>    "bitbucket": {"command":"python","args":["servers/bitbucket_server.py"],"envFile":".env"}</a:t>
+              <a:t>pip install mcp httpx python-dotenv pyyaml</a:t>
             </a:r>
           </a:p>
           <a:p>
@@ -3573,7 +3509,7 @@
               <a:spcAft>
                 <a:spcPts val="100"/>
               </a:spcAft>
-              <a:defRPr sz="1300">
+              <a:defRPr sz="1400">
                 <a:solidFill>
                   <a:srgbClr val="E4ECFC"/>
                 </a:solidFill>
@@ -3581,7 +3517,7 @@
               </a:defRPr>
             </a:pPr>
             <a:r>
-              <a:t>  }</a:t>
+              <a:t>python --version &amp;&amp; node --version &amp;&amp; npm --version</a:t>
             </a:r>
           </a:p>
           <a:p>
@@ -3592,7 +3528,7 @@
               <a:spcAft>
                 <a:spcPts val="100"/>
               </a:spcAft>
-              <a:defRPr sz="1300">
+              <a:defRPr sz="1400">
                 <a:solidFill>
                   <a:srgbClr val="E4ECFC"/>
                 </a:solidFill>
@@ -3600,35 +3536,217 @@
               </a:defRPr>
             </a:pPr>
             <a:r>
-              <a:t>}</a:t>
-            </a:r>
-          </a:p>
-        </p:txBody>
-      </p:sp>
-      <p:pic>
-        <p:nvPicPr>
-          <p:cNvPr id="5" name="Picture 4" descr="cursor_mcp_json_screen.png"/>
-          <p:cNvPicPr>
-            <a:picLocks noChangeAspect="1"/>
-          </p:cNvPicPr>
-          <p:nvPr/>
-        </p:nvPicPr>
-        <p:blipFill>
-          <a:blip r:embed="rId2"/>
-          <a:stretch>
-            <a:fillRect/>
-          </a:stretch>
-        </p:blipFill>
-        <p:spPr>
-          <a:xfrm>
-            <a:off x="5440680" y="1115568"/>
-            <a:ext cx="6537960" cy="3677602"/>
-          </a:xfrm>
-          <a:prstGeom prst="rect">
-            <a:avLst/>
-          </a:prstGeom>
-        </p:spPr>
-      </p:pic>
+              <a:t>sudo apt-get update &amp;&amp; sudo apt-get install -y jq</a:t>
+            </a:r>
+          </a:p>
+          <a:p>
+            <a:pPr>
+              <a:spcBef>
+                <a:spcPts val="0"/>
+              </a:spcBef>
+              <a:spcAft>
+                <a:spcPts val="100"/>
+              </a:spcAft>
+              <a:defRPr sz="1400">
+                <a:solidFill>
+                  <a:srgbClr val="E4ECFC"/>
+                </a:solidFill>
+                <a:latin typeface="DejaVu Sans Mono"/>
+              </a:defRPr>
+            </a:pPr>
+          </a:p>
+          <a:p>
+            <a:pPr>
+              <a:spcBef>
+                <a:spcPts val="0"/>
+              </a:spcBef>
+              <a:spcAft>
+                <a:spcPts val="100"/>
+              </a:spcAft>
+              <a:defRPr sz="1400">
+                <a:solidFill>
+                  <a:srgbClr val="E4ECFC"/>
+                </a:solidFill>
+                <a:latin typeface="DejaVu Sans Mono"/>
+              </a:defRPr>
+            </a:pPr>
+            <a:r>
+              <a:t># Create environment file for tokens</a:t>
+            </a:r>
+          </a:p>
+          <a:p>
+            <a:pPr>
+              <a:spcBef>
+                <a:spcPts val="0"/>
+              </a:spcBef>
+              <a:spcAft>
+                <a:spcPts val="100"/>
+              </a:spcAft>
+              <a:defRPr sz="1400">
+                <a:solidFill>
+                  <a:srgbClr val="E4ECFC"/>
+                </a:solidFill>
+                <a:latin typeface="DejaVu Sans Mono"/>
+              </a:defRPr>
+            </a:pPr>
+            <a:r>
+              <a:t>cat &gt; .env &lt;&lt;'EOF'</a:t>
+            </a:r>
+          </a:p>
+          <a:p>
+            <a:pPr>
+              <a:spcBef>
+                <a:spcPts val="0"/>
+              </a:spcBef>
+              <a:spcAft>
+                <a:spcPts val="100"/>
+              </a:spcAft>
+              <a:defRPr sz="1400">
+                <a:solidFill>
+                  <a:srgbClr val="E4ECFC"/>
+                </a:solidFill>
+                <a:latin typeface="DejaVu Sans Mono"/>
+              </a:defRPr>
+            </a:pPr>
+            <a:r>
+              <a:t>JIRA_BASE_URL=https://your-company.atlassian.net</a:t>
+            </a:r>
+          </a:p>
+          <a:p>
+            <a:pPr>
+              <a:spcBef>
+                <a:spcPts val="0"/>
+              </a:spcBef>
+              <a:spcAft>
+                <a:spcPts val="100"/>
+              </a:spcAft>
+              <a:defRPr sz="1400">
+                <a:solidFill>
+                  <a:srgbClr val="E4ECFC"/>
+                </a:solidFill>
+                <a:latin typeface="DejaVu Sans Mono"/>
+              </a:defRPr>
+            </a:pPr>
+            <a:r>
+              <a:t>JIRA_EMAIL=you@company.com</a:t>
+            </a:r>
+          </a:p>
+          <a:p>
+            <a:pPr>
+              <a:spcBef>
+                <a:spcPts val="0"/>
+              </a:spcBef>
+              <a:spcAft>
+                <a:spcPts val="100"/>
+              </a:spcAft>
+              <a:defRPr sz="1400">
+                <a:solidFill>
+                  <a:srgbClr val="E4ECFC"/>
+                </a:solidFill>
+                <a:latin typeface="DejaVu Sans Mono"/>
+              </a:defRPr>
+            </a:pPr>
+            <a:r>
+              <a:t>JIRA_API_TOKEN=&lt;jira_token&gt;</a:t>
+            </a:r>
+          </a:p>
+          <a:p>
+            <a:pPr>
+              <a:spcBef>
+                <a:spcPts val="0"/>
+              </a:spcBef>
+              <a:spcAft>
+                <a:spcPts val="100"/>
+              </a:spcAft>
+              <a:defRPr sz="1400">
+                <a:solidFill>
+                  <a:srgbClr val="E4ECFC"/>
+                </a:solidFill>
+                <a:latin typeface="DejaVu Sans Mono"/>
+              </a:defRPr>
+            </a:pPr>
+            <a:r>
+              <a:t>FIGMA_TOKEN=&lt;figma_token&gt;</a:t>
+            </a:r>
+          </a:p>
+          <a:p>
+            <a:pPr>
+              <a:spcBef>
+                <a:spcPts val="0"/>
+              </a:spcBef>
+              <a:spcAft>
+                <a:spcPts val="100"/>
+              </a:spcAft>
+              <a:defRPr sz="1400">
+                <a:solidFill>
+                  <a:srgbClr val="E4ECFC"/>
+                </a:solidFill>
+                <a:latin typeface="DejaVu Sans Mono"/>
+              </a:defRPr>
+            </a:pPr>
+            <a:r>
+              <a:t>BITBUCKET_WORKSPACE=&lt;workspace&gt;</a:t>
+            </a:r>
+          </a:p>
+          <a:p>
+            <a:pPr>
+              <a:spcBef>
+                <a:spcPts val="0"/>
+              </a:spcBef>
+              <a:spcAft>
+                <a:spcPts val="100"/>
+              </a:spcAft>
+              <a:defRPr sz="1400">
+                <a:solidFill>
+                  <a:srgbClr val="E4ECFC"/>
+                </a:solidFill>
+                <a:latin typeface="DejaVu Sans Mono"/>
+              </a:defRPr>
+            </a:pPr>
+            <a:r>
+              <a:t>BITBUCKET_USERNAME=&lt;username&gt;</a:t>
+            </a:r>
+          </a:p>
+          <a:p>
+            <a:pPr>
+              <a:spcBef>
+                <a:spcPts val="0"/>
+              </a:spcBef>
+              <a:spcAft>
+                <a:spcPts val="100"/>
+              </a:spcAft>
+              <a:defRPr sz="1400">
+                <a:solidFill>
+                  <a:srgbClr val="E4ECFC"/>
+                </a:solidFill>
+                <a:latin typeface="DejaVu Sans Mono"/>
+              </a:defRPr>
+            </a:pPr>
+            <a:r>
+              <a:t>BITBUCKET_APP_PASSWORD=&lt;app_password&gt;</a:t>
+            </a:r>
+          </a:p>
+          <a:p>
+            <a:pPr>
+              <a:spcBef>
+                <a:spcPts val="0"/>
+              </a:spcBef>
+              <a:spcAft>
+                <a:spcPts val="100"/>
+              </a:spcAft>
+              <a:defRPr sz="1400">
+                <a:solidFill>
+                  <a:srgbClr val="E4ECFC"/>
+                </a:solidFill>
+                <a:latin typeface="DejaVu Sans Mono"/>
+              </a:defRPr>
+            </a:pPr>
+            <a:r>
+              <a:t>EOF</a:t>
+            </a:r>
+          </a:p>
+        </p:txBody>
+      </p:sp>
     </p:spTree>
   </p:cSld>
   <p:clrMapOvr>
@@ -3676,288 +3794,21 @@
                   <a:srgbClr val="14284A"/>
                 </a:solidFill>
               </a:rPr>
-              <a:t>Step 4: Add tokens in .env file</a:t>
-            </a:r>
-          </a:p>
-        </p:txBody>
-      </p:sp>
-      <p:sp>
-        <p:nvSpPr>
-          <p:cNvPr id="3" name="Rounded Rectangle 2"/>
-          <p:cNvSpPr/>
-          <p:nvPr/>
-        </p:nvSpPr>
-        <p:spPr>
-          <a:xfrm>
-            <a:off x="502920" y="1737360"/>
-            <a:ext cx="11155680" cy="4526280"/>
-          </a:xfrm>
-          <a:prstGeom prst="roundRect">
-            <a:avLst/>
-          </a:prstGeom>
-          <a:solidFill>
-            <a:srgbClr val="161F31"/>
-          </a:solidFill>
-          <a:ln>
-            <a:solidFill>
-              <a:srgbClr val="161F31"/>
-            </a:solidFill>
-          </a:ln>
-        </p:spPr>
-        <p:style>
-          <a:lnRef idx="1">
-            <a:schemeClr val="accent1"/>
-          </a:lnRef>
-          <a:fillRef idx="3">
-            <a:schemeClr val="accent1"/>
-          </a:fillRef>
-          <a:effectRef idx="2">
-            <a:schemeClr val="accent1"/>
-          </a:effectRef>
-          <a:fontRef idx="minor">
-            <a:schemeClr val="lt1"/>
-          </a:fontRef>
-        </p:style>
-        <p:txBody>
-          <a:bodyPr rtlCol="0" anchor="ctr" wrap="square"/>
-          <a:lstStyle/>
-          <a:p>
-            <a:pPr algn="ctr">
-              <a:spcBef>
-                <a:spcPts val="0"/>
-              </a:spcBef>
-              <a:spcAft>
-                <a:spcPts val="100"/>
-              </a:spcAft>
-              <a:defRPr sz="1500">
-                <a:solidFill>
-                  <a:srgbClr val="E4ECFC"/>
-                </a:solidFill>
-                <a:latin typeface="DejaVu Sans Mono"/>
-              </a:defRPr>
-            </a:pPr>
-            <a:r>
-              <a:t>cat &gt; .env &lt;&lt;'EOF'</a:t>
-            </a:r>
-          </a:p>
-          <a:p>
-            <a:pPr>
-              <a:spcBef>
-                <a:spcPts val="0"/>
-              </a:spcBef>
-              <a:spcAft>
-                <a:spcPts val="100"/>
-              </a:spcAft>
-              <a:defRPr sz="1500">
-                <a:solidFill>
-                  <a:srgbClr val="E4ECFC"/>
-                </a:solidFill>
-                <a:latin typeface="DejaVu Sans Mono"/>
-              </a:defRPr>
-            </a:pPr>
-            <a:r>
-              <a:t>JIRA_BASE_URL=https://your-company.atlassian.net</a:t>
-            </a:r>
-          </a:p>
-          <a:p>
-            <a:pPr>
-              <a:spcBef>
-                <a:spcPts val="0"/>
-              </a:spcBef>
-              <a:spcAft>
-                <a:spcPts val="100"/>
-              </a:spcAft>
-              <a:defRPr sz="1500">
-                <a:solidFill>
-                  <a:srgbClr val="E4ECFC"/>
-                </a:solidFill>
-                <a:latin typeface="DejaVu Sans Mono"/>
-              </a:defRPr>
-            </a:pPr>
-            <a:r>
-              <a:t>JIRA_EMAIL=you@company.com</a:t>
-            </a:r>
-          </a:p>
-          <a:p>
-            <a:pPr>
-              <a:spcBef>
-                <a:spcPts val="0"/>
-              </a:spcBef>
-              <a:spcAft>
-                <a:spcPts val="100"/>
-              </a:spcAft>
-              <a:defRPr sz="1500">
-                <a:solidFill>
-                  <a:srgbClr val="E4ECFC"/>
-                </a:solidFill>
-                <a:latin typeface="DejaVu Sans Mono"/>
-              </a:defRPr>
-            </a:pPr>
-            <a:r>
-              <a:t>JIRA_API_TOKEN=&lt;jira_token&gt;</a:t>
-            </a:r>
-          </a:p>
-          <a:p>
-            <a:pPr>
-              <a:spcBef>
-                <a:spcPts val="0"/>
-              </a:spcBef>
-              <a:spcAft>
-                <a:spcPts val="100"/>
-              </a:spcAft>
-              <a:defRPr sz="1500">
-                <a:solidFill>
-                  <a:srgbClr val="E4ECFC"/>
-                </a:solidFill>
-                <a:latin typeface="DejaVu Sans Mono"/>
-              </a:defRPr>
-            </a:pPr>
-            <a:r>
-              <a:t>FIGMA_TOKEN=&lt;figma_token&gt;</a:t>
-            </a:r>
-          </a:p>
-          <a:p>
-            <a:pPr>
-              <a:spcBef>
-                <a:spcPts val="0"/>
-              </a:spcBef>
-              <a:spcAft>
-                <a:spcPts val="100"/>
-              </a:spcAft>
-              <a:defRPr sz="1500">
-                <a:solidFill>
-                  <a:srgbClr val="E4ECFC"/>
-                </a:solidFill>
-                <a:latin typeface="DejaVu Sans Mono"/>
-              </a:defRPr>
-            </a:pPr>
-            <a:r>
-              <a:t>BITBUCKET_WORKSPACE=&lt;workspace&gt;</a:t>
-            </a:r>
-          </a:p>
-          <a:p>
-            <a:pPr>
-              <a:spcBef>
-                <a:spcPts val="0"/>
-              </a:spcBef>
-              <a:spcAft>
-                <a:spcPts val="100"/>
-              </a:spcAft>
-              <a:defRPr sz="1500">
-                <a:solidFill>
-                  <a:srgbClr val="E4ECFC"/>
-                </a:solidFill>
-                <a:latin typeface="DejaVu Sans Mono"/>
-              </a:defRPr>
-            </a:pPr>
-            <a:r>
-              <a:t>BITBUCKET_USERNAME=&lt;username&gt;</a:t>
-            </a:r>
-          </a:p>
-          <a:p>
-            <a:pPr>
-              <a:spcBef>
-                <a:spcPts val="0"/>
-              </a:spcBef>
-              <a:spcAft>
-                <a:spcPts val="100"/>
-              </a:spcAft>
-              <a:defRPr sz="1500">
-                <a:solidFill>
-                  <a:srgbClr val="E4ECFC"/>
-                </a:solidFill>
-                <a:latin typeface="DejaVu Sans Mono"/>
-              </a:defRPr>
-            </a:pPr>
-            <a:r>
-              <a:t>BITBUCKET_APP_PASSWORD=&lt;app_password&gt;</a:t>
-            </a:r>
-          </a:p>
-          <a:p>
-            <a:pPr>
-              <a:spcBef>
-                <a:spcPts val="0"/>
-              </a:spcBef>
-              <a:spcAft>
-                <a:spcPts val="100"/>
-              </a:spcAft>
-              <a:defRPr sz="1500">
-                <a:solidFill>
-                  <a:srgbClr val="E4ECFC"/>
-                </a:solidFill>
-                <a:latin typeface="DejaVu Sans Mono"/>
-              </a:defRPr>
-            </a:pPr>
-            <a:r>
-              <a:t>EOF</a:t>
-            </a:r>
-          </a:p>
-          <a:p>
-            <a:pPr>
-              <a:spcBef>
-                <a:spcPts val="0"/>
-              </a:spcBef>
-              <a:spcAft>
-                <a:spcPts val="100"/>
-              </a:spcAft>
-              <a:defRPr sz="1500">
-                <a:solidFill>
-                  <a:srgbClr val="E4ECFC"/>
-                </a:solidFill>
-                <a:latin typeface="DejaVu Sans Mono"/>
-              </a:defRPr>
-            </a:pPr>
-          </a:p>
-          <a:p>
-            <a:pPr>
-              <a:spcBef>
-                <a:spcPts val="0"/>
-              </a:spcBef>
-              <a:spcAft>
-                <a:spcPts val="100"/>
-              </a:spcAft>
-              <a:defRPr sz="1500">
-                <a:solidFill>
-                  <a:srgbClr val="E4ECFC"/>
-                </a:solidFill>
-                <a:latin typeface="DejaVu Sans Mono"/>
-              </a:defRPr>
-            </a:pPr>
-            <a:r>
-              <a:t># Keep .env out of git</a:t>
-            </a:r>
-          </a:p>
-          <a:p>
-            <a:pPr>
-              <a:spcBef>
-                <a:spcPts val="0"/>
-              </a:spcBef>
-              <a:spcAft>
-                <a:spcPts val="100"/>
-              </a:spcAft>
-              <a:defRPr sz="1500">
-                <a:solidFill>
-                  <a:srgbClr val="E4ECFC"/>
-                </a:solidFill>
-                <a:latin typeface="DejaVu Sans Mono"/>
-              </a:defRPr>
-            </a:pPr>
-            <a:r>
-              <a:t>echo '.env' &gt;&gt; .gitignore</a:t>
-            </a:r>
-          </a:p>
-        </p:txBody>
-      </p:sp>
-      <p:sp>
-        <p:nvSpPr>
-          <p:cNvPr id="4" name="TextBox 3"/>
+              <a:t>Step 2: Open Cursor settings and go to MCP</a:t>
+            </a:r>
+          </a:p>
+        </p:txBody>
+      </p:sp>
+      <p:sp>
+        <p:nvSpPr>
+          <p:cNvPr id="3" name="TextBox 2"/>
           <p:cNvSpPr txBox="1"/>
           <p:nvPr/>
         </p:nvSpPr>
         <p:spPr>
           <a:xfrm>
-            <a:off x="594360" y="6355080"/>
-            <a:ext cx="10972800" cy="457200"/>
+            <a:off x="502920" y="1417320"/>
+            <a:ext cx="4389120" cy="5029200"/>
           </a:xfrm>
           <a:prstGeom prst="rect">
             <a:avLst/>
@@ -3974,48 +3825,102 @@
               <a:spcAft>
                 <a:spcPts val="800"/>
               </a:spcAft>
-              <a:defRPr sz="1700">
-                <a:solidFill>
-                  <a:srgbClr val="233554"/>
-                </a:solidFill>
-              </a:defRPr>
-            </a:pPr>
-            <a:r>
-              <a:t>Important:</a:t>
-            </a:r>
-          </a:p>
-          <a:p>
-            <a:pPr lvl="1">
-              <a:spcAft>
-                <a:spcPts val="800"/>
-              </a:spcAft>
-              <a:defRPr sz="1500">
-                <a:solidFill>
-                  <a:srgbClr val="233554"/>
-                </a:solidFill>
-              </a:defRPr>
-            </a:pPr>
-            <a:r>
-              <a:t>Never commit .env to repository.</a:t>
-            </a:r>
-          </a:p>
-          <a:p>
-            <a:pPr lvl="1">
-              <a:spcAft>
-                <a:spcPts val="800"/>
-              </a:spcAft>
-              <a:defRPr sz="1500">
-                <a:solidFill>
-                  <a:srgbClr val="233554"/>
-                </a:solidFill>
-              </a:defRPr>
-            </a:pPr>
-            <a:r>
-              <a:t>Rotate tokens every 90 days.</a:t>
-            </a:r>
-          </a:p>
-        </p:txBody>
-      </p:sp>
+              <a:defRPr sz="2500">
+                <a:solidFill>
+                  <a:srgbClr val="233554"/>
+                </a:solidFill>
+              </a:defRPr>
+            </a:pPr>
+            <a:r>
+              <a:t>Click Settings in Cursor.</a:t>
+            </a:r>
+          </a:p>
+          <a:p>
+            <a:pPr>
+              <a:spcAft>
+                <a:spcPts val="800"/>
+              </a:spcAft>
+              <a:defRPr sz="2500">
+                <a:solidFill>
+                  <a:srgbClr val="233554"/>
+                </a:solidFill>
+              </a:defRPr>
+            </a:pPr>
+            <a:r>
+              <a:t>Open Features tab.</a:t>
+            </a:r>
+          </a:p>
+          <a:p>
+            <a:pPr>
+              <a:spcAft>
+                <a:spcPts val="800"/>
+              </a:spcAft>
+              <a:defRPr sz="2500">
+                <a:solidFill>
+                  <a:srgbClr val="233554"/>
+                </a:solidFill>
+              </a:defRPr>
+            </a:pPr>
+            <a:r>
+              <a:t>Open MCP section.</a:t>
+            </a:r>
+          </a:p>
+          <a:p>
+            <a:pPr>
+              <a:spcAft>
+                <a:spcPts val="800"/>
+              </a:spcAft>
+              <a:defRPr sz="2500">
+                <a:solidFill>
+                  <a:srgbClr val="233554"/>
+                </a:solidFill>
+              </a:defRPr>
+            </a:pPr>
+            <a:r>
+              <a:t>Turn MCP ON.</a:t>
+            </a:r>
+          </a:p>
+          <a:p>
+            <a:pPr>
+              <a:spcAft>
+                <a:spcPts val="800"/>
+              </a:spcAft>
+              <a:defRPr sz="2500">
+                <a:solidFill>
+                  <a:srgbClr val="233554"/>
+                </a:solidFill>
+              </a:defRPr>
+            </a:pPr>
+            <a:r>
+              <a:t>Click Open mcp.json.</a:t>
+            </a:r>
+          </a:p>
+        </p:txBody>
+      </p:sp>
+      <p:pic>
+        <p:nvPicPr>
+          <p:cNvPr id="4" name="Picture 3" descr="cursor_settings_screen.png"/>
+          <p:cNvPicPr>
+            <a:picLocks noChangeAspect="1"/>
+          </p:cNvPicPr>
+          <p:nvPr/>
+        </p:nvPicPr>
+        <p:blipFill>
+          <a:blip r:embed="rId2"/>
+          <a:stretch>
+            <a:fillRect/>
+          </a:stretch>
+        </p:blipFill>
+        <p:spPr>
+          <a:xfrm>
+            <a:off x="4892040" y="1115568"/>
+            <a:ext cx="7086600" cy="3986212"/>
+          </a:xfrm>
+          <a:prstGeom prst="rect">
+            <a:avLst/>
+          </a:prstGeom>
+        </p:spPr>
+      </p:pic>
     </p:spTree>
   </p:cSld>
   <p:clrMapOvr>
@@ -4063,7 +3968,7 @@
                   <a:srgbClr val="14284A"/>
                 </a:solidFill>
               </a:rPr>
-              <a:t>Step 5: Test Jira connection</a:t>
+              <a:t>Step 3: Add mcp.json config in Cursor</a:t>
             </a:r>
           </a:p>
         </p:txBody>
@@ -4076,8 +3981,8 @@
         </p:nvSpPr>
         <p:spPr>
           <a:xfrm>
-            <a:off x="502920" y="1417320"/>
-            <a:ext cx="4754880" cy="4754880"/>
+            <a:off x="502920" y="1280160"/>
+            <a:ext cx="4754880" cy="1645920"/>
           </a:xfrm>
           <a:prstGeom prst="rect">
             <a:avLst/>
@@ -4101,22 +4006,7 @@
               </a:defRPr>
             </a:pPr>
             <a:r>
-              <a:t>Run test command:</a:t>
-            </a:r>
-          </a:p>
-          <a:p>
-            <a:pPr lvl="1">
-              <a:spcAft>
-                <a:spcPts val="800"/>
-              </a:spcAft>
-              <a:defRPr sz="1500">
-                <a:solidFill>
-                  <a:srgbClr val="233554"/>
-                </a:solidFill>
-              </a:defRPr>
-            </a:pPr>
-            <a:r>
-              <a:t>curl -s -u "$JIRA_EMAIL:$JIRA_API_TOKEN" "$JIRA_BASE_URL/rest/api/3/myself" | jq '.displayName'</a:t>
+              <a:t>Paste this config in .cursor/mcp.json:</a:t>
             </a:r>
           </a:p>
           <a:p>
@@ -4131,29 +4021,204 @@
               </a:defRPr>
             </a:pPr>
             <a:r>
-              <a:t>Then ask in Cursor:</a:t>
-            </a:r>
-          </a:p>
-          <a:p>
-            <a:pPr lvl="1">
-              <a:spcAft>
-                <a:spcPts val="800"/>
-              </a:spcAft>
-              <a:defRPr sz="1500">
-                <a:solidFill>
-                  <a:srgbClr val="233554"/>
-                </a:solidFill>
-              </a:defRPr>
-            </a:pPr>
-            <a:r>
-              <a:t>"Using Jira MCP, summarize PROJ-101 and draft acceptance criteria."</a:t>
+              <a:t>Use your own server script paths.</a:t>
+            </a:r>
+          </a:p>
+          <a:p>
+            <a:pPr>
+              <a:spcAft>
+                <a:spcPts val="800"/>
+              </a:spcAft>
+              <a:defRPr sz="2200">
+                <a:solidFill>
+                  <a:srgbClr val="233554"/>
+                </a:solidFill>
+              </a:defRPr>
+            </a:pPr>
+            <a:r>
+              <a:t>Save file and restart Cursor.</a:t>
+            </a:r>
+          </a:p>
+        </p:txBody>
+      </p:sp>
+      <p:sp>
+        <p:nvSpPr>
+          <p:cNvPr id="4" name="Rounded Rectangle 3"/>
+          <p:cNvSpPr/>
+          <p:nvPr/>
+        </p:nvSpPr>
+        <p:spPr>
+          <a:xfrm>
+            <a:off x="502920" y="2743200"/>
+            <a:ext cx="4754880" cy="3611880"/>
+          </a:xfrm>
+          <a:prstGeom prst="roundRect">
+            <a:avLst/>
+          </a:prstGeom>
+          <a:solidFill>
+            <a:srgbClr val="161F31"/>
+          </a:solidFill>
+          <a:ln>
+            <a:solidFill>
+              <a:srgbClr val="161F31"/>
+            </a:solidFill>
+          </a:ln>
+        </p:spPr>
+        <p:style>
+          <a:lnRef idx="1">
+            <a:schemeClr val="accent1"/>
+          </a:lnRef>
+          <a:fillRef idx="3">
+            <a:schemeClr val="accent1"/>
+          </a:fillRef>
+          <a:effectRef idx="2">
+            <a:schemeClr val="accent1"/>
+          </a:effectRef>
+          <a:fontRef idx="minor">
+            <a:schemeClr val="lt1"/>
+          </a:fontRef>
+        </p:style>
+        <p:txBody>
+          <a:bodyPr rtlCol="0" anchor="ctr" wrap="square"/>
+          <a:lstStyle/>
+          <a:p>
+            <a:pPr algn="ctr">
+              <a:spcBef>
+                <a:spcPts val="0"/>
+              </a:spcBef>
+              <a:spcAft>
+                <a:spcPts val="100"/>
+              </a:spcAft>
+              <a:defRPr sz="1300">
+                <a:solidFill>
+                  <a:srgbClr val="E4ECFC"/>
+                </a:solidFill>
+                <a:latin typeface="DejaVu Sans Mono"/>
+              </a:defRPr>
+            </a:pPr>
+            <a:r>
+              <a:t>{</a:t>
+            </a:r>
+          </a:p>
+          <a:p>
+            <a:pPr>
+              <a:spcBef>
+                <a:spcPts val="0"/>
+              </a:spcBef>
+              <a:spcAft>
+                <a:spcPts val="100"/>
+              </a:spcAft>
+              <a:defRPr sz="1300">
+                <a:solidFill>
+                  <a:srgbClr val="E4ECFC"/>
+                </a:solidFill>
+                <a:latin typeface="DejaVu Sans Mono"/>
+              </a:defRPr>
+            </a:pPr>
+            <a:r>
+              <a:t>  "mcpServers": {</a:t>
+            </a:r>
+          </a:p>
+          <a:p>
+            <a:pPr>
+              <a:spcBef>
+                <a:spcPts val="0"/>
+              </a:spcBef>
+              <a:spcAft>
+                <a:spcPts val="100"/>
+              </a:spcAft>
+              <a:defRPr sz="1300">
+                <a:solidFill>
+                  <a:srgbClr val="E4ECFC"/>
+                </a:solidFill>
+                <a:latin typeface="DejaVu Sans Mono"/>
+              </a:defRPr>
+            </a:pPr>
+            <a:r>
+              <a:t>    "jira": {"command":"python","args":["servers/jira_server.py"],"envFile":".env"},</a:t>
+            </a:r>
+          </a:p>
+          <a:p>
+            <a:pPr>
+              <a:spcBef>
+                <a:spcPts val="0"/>
+              </a:spcBef>
+              <a:spcAft>
+                <a:spcPts val="100"/>
+              </a:spcAft>
+              <a:defRPr sz="1300">
+                <a:solidFill>
+                  <a:srgbClr val="E4ECFC"/>
+                </a:solidFill>
+                <a:latin typeface="DejaVu Sans Mono"/>
+              </a:defRPr>
+            </a:pPr>
+            <a:r>
+              <a:t>    "figma": {"command":"python","args":["servers/figma_server.py"],"envFile":".env"},</a:t>
+            </a:r>
+          </a:p>
+          <a:p>
+            <a:pPr>
+              <a:spcBef>
+                <a:spcPts val="0"/>
+              </a:spcBef>
+              <a:spcAft>
+                <a:spcPts val="100"/>
+              </a:spcAft>
+              <a:defRPr sz="1300">
+                <a:solidFill>
+                  <a:srgbClr val="E4ECFC"/>
+                </a:solidFill>
+                <a:latin typeface="DejaVu Sans Mono"/>
+              </a:defRPr>
+            </a:pPr>
+            <a:r>
+              <a:t>    "bitbucket": {"command":"python","args":["servers/bitbucket_server.py"],"envFile":".env"}</a:t>
+            </a:r>
+          </a:p>
+          <a:p>
+            <a:pPr>
+              <a:spcBef>
+                <a:spcPts val="0"/>
+              </a:spcBef>
+              <a:spcAft>
+                <a:spcPts val="100"/>
+              </a:spcAft>
+              <a:defRPr sz="1300">
+                <a:solidFill>
+                  <a:srgbClr val="E4ECFC"/>
+                </a:solidFill>
+                <a:latin typeface="DejaVu Sans Mono"/>
+              </a:defRPr>
+            </a:pPr>
+            <a:r>
+              <a:t>  }</a:t>
+            </a:r>
+          </a:p>
+          <a:p>
+            <a:pPr>
+              <a:spcBef>
+                <a:spcPts val="0"/>
+              </a:spcBef>
+              <a:spcAft>
+                <a:spcPts val="100"/>
+              </a:spcAft>
+              <a:defRPr sz="1300">
+                <a:solidFill>
+                  <a:srgbClr val="E4ECFC"/>
+                </a:solidFill>
+                <a:latin typeface="DejaVu Sans Mono"/>
+              </a:defRPr>
+            </a:pPr>
+            <a:r>
+              <a:t>}</a:t>
             </a:r>
           </a:p>
         </p:txBody>
       </p:sp>
       <p:pic>
         <p:nvPicPr>
-          <p:cNvPr id="4" name="Picture 3" descr="cursor_status_screen.png"/>
+          <p:cNvPr id="5" name="Picture 4" descr="cursor_mcp_json_screen.png"/>
           <p:cNvPicPr>
             <a:picLocks noChangeAspect="1"/>
           </p:cNvPicPr>
@@ -4222,7 +4287,7 @@
                   <a:srgbClr val="14284A"/>
                 </a:solidFill>
               </a:rPr>
-              <a:t>Step 6: Test Figma connection</a:t>
+              <a:t>Step 4: Add tokens in .env file</a:t>
             </a:r>
           </a:p>
         </p:txBody>
@@ -4235,8 +4300,8 @@
         </p:nvSpPr>
         <p:spPr>
           <a:xfrm>
-            <a:off x="502920" y="1783080"/>
-            <a:ext cx="4754880" cy="4480560"/>
+            <a:off x="502920" y="1737360"/>
+            <a:ext cx="11155680" cy="4526280"/>
           </a:xfrm>
           <a:prstGeom prst="roundRect">
             <a:avLst/>
@@ -4275,7 +4340,7 @@
               <a:spcAft>
                 <a:spcPts val="100"/>
               </a:spcAft>
-              <a:defRPr sz="1400">
+              <a:defRPr sz="1500">
                 <a:solidFill>
                   <a:srgbClr val="E4ECFC"/>
                 </a:solidFill>
@@ -4283,7 +4348,7 @@
               </a:defRPr>
             </a:pPr>
             <a:r>
-              <a:t>source .venv/bin/activate &amp;&amp; source .env</a:t>
+              <a:t>cat &gt; .env &lt;&lt;'EOF'</a:t>
             </a:r>
           </a:p>
           <a:p>
@@ -4294,7 +4359,7 @@
               <a:spcAft>
                 <a:spcPts val="100"/>
               </a:spcAft>
-              <a:defRPr sz="1400">
+              <a:defRPr sz="1500">
                 <a:solidFill>
                   <a:srgbClr val="E4ECFC"/>
                 </a:solidFill>
@@ -4302,7 +4367,7 @@
               </a:defRPr>
             </a:pPr>
             <a:r>
-              <a:t>export FIGMA_FILE_KEY=&lt;file_key&gt;</a:t>
+              <a:t>JIRA_BASE_URL=https://your-company.atlassian.net</a:t>
             </a:r>
           </a:p>
           <a:p>
@@ -4313,7 +4378,7 @@
               <a:spcAft>
                 <a:spcPts val="100"/>
               </a:spcAft>
-              <a:defRPr sz="1400">
+              <a:defRPr sz="1500">
                 <a:solidFill>
                   <a:srgbClr val="E4ECFC"/>
                 </a:solidFill>
@@ -4321,7 +4386,7 @@
               </a:defRPr>
             </a:pPr>
             <a:r>
-              <a:t>curl -s -H "X-Figma-Token: $FIGMA_TOKEN" "https://api.figma.com/v1/files/$FIGMA_FILE_KEY" | jq '.name'</a:t>
+              <a:t>JIRA_EMAIL=you@company.com</a:t>
             </a:r>
           </a:p>
           <a:p>
@@ -4332,13 +4397,16 @@
               <a:spcAft>
                 <a:spcPts val="100"/>
               </a:spcAft>
-              <a:defRPr sz="1400">
+              <a:defRPr sz="1500">
                 <a:solidFill>
                   <a:srgbClr val="E4ECFC"/>
                 </a:solidFill>
                 <a:latin typeface="DejaVu Sans Mono"/>
               </a:defRPr>
             </a:pPr>
+            <a:r>
+              <a:t>JIRA_API_TOKEN=&lt;jira_token&gt;</a:t>
+            </a:r>
           </a:p>
           <a:p>
             <a:pPr>
@@ -4348,7 +4416,7 @@
               <a:spcAft>
                 <a:spcPts val="100"/>
               </a:spcAft>
-              <a:defRPr sz="1400">
+              <a:defRPr sz="1500">
                 <a:solidFill>
                   <a:srgbClr val="E4ECFC"/>
                 </a:solidFill>
@@ -4356,7 +4424,7 @@
               </a:defRPr>
             </a:pPr>
             <a:r>
-              <a:t># Prompt in Cursor</a:t>
+              <a:t>FIGMA_TOKEN=&lt;figma_token&gt;</a:t>
             </a:r>
           </a:p>
           <a:p>
@@ -4367,7 +4435,7 @@
               <a:spcAft>
                 <a:spcPts val="100"/>
               </a:spcAft>
-              <a:defRPr sz="1400">
+              <a:defRPr sz="1500">
                 <a:solidFill>
                   <a:srgbClr val="E4ECFC"/>
                 </a:solidFill>
@@ -4375,35 +4443,190 @@
               </a:defRPr>
             </a:pPr>
             <a:r>
-              <a:t>Using Figma MCP, extract design tokens and map components to frontend stories.</a:t>
-            </a:r>
-          </a:p>
-        </p:txBody>
-      </p:sp>
-      <p:pic>
-        <p:nvPicPr>
-          <p:cNvPr id="4" name="Picture 3" descr="cursor_status_screen.png"/>
-          <p:cNvPicPr>
-            <a:picLocks noChangeAspect="1"/>
-          </p:cNvPicPr>
+              <a:t>BITBUCKET_WORKSPACE=&lt;workspace&gt;</a:t>
+            </a:r>
+          </a:p>
+          <a:p>
+            <a:pPr>
+              <a:spcBef>
+                <a:spcPts val="0"/>
+              </a:spcBef>
+              <a:spcAft>
+                <a:spcPts val="100"/>
+              </a:spcAft>
+              <a:defRPr sz="1500">
+                <a:solidFill>
+                  <a:srgbClr val="E4ECFC"/>
+                </a:solidFill>
+                <a:latin typeface="DejaVu Sans Mono"/>
+              </a:defRPr>
+            </a:pPr>
+            <a:r>
+              <a:t>BITBUCKET_USERNAME=&lt;username&gt;</a:t>
+            </a:r>
+          </a:p>
+          <a:p>
+            <a:pPr>
+              <a:spcBef>
+                <a:spcPts val="0"/>
+              </a:spcBef>
+              <a:spcAft>
+                <a:spcPts val="100"/>
+              </a:spcAft>
+              <a:defRPr sz="1500">
+                <a:solidFill>
+                  <a:srgbClr val="E4ECFC"/>
+                </a:solidFill>
+                <a:latin typeface="DejaVu Sans Mono"/>
+              </a:defRPr>
+            </a:pPr>
+            <a:r>
+              <a:t>BITBUCKET_APP_PASSWORD=&lt;app_password&gt;</a:t>
+            </a:r>
+          </a:p>
+          <a:p>
+            <a:pPr>
+              <a:spcBef>
+                <a:spcPts val="0"/>
+              </a:spcBef>
+              <a:spcAft>
+                <a:spcPts val="100"/>
+              </a:spcAft>
+              <a:defRPr sz="1500">
+                <a:solidFill>
+                  <a:srgbClr val="E4ECFC"/>
+                </a:solidFill>
+                <a:latin typeface="DejaVu Sans Mono"/>
+              </a:defRPr>
+            </a:pPr>
+            <a:r>
+              <a:t>EOF</a:t>
+            </a:r>
+          </a:p>
+          <a:p>
+            <a:pPr>
+              <a:spcBef>
+                <a:spcPts val="0"/>
+              </a:spcBef>
+              <a:spcAft>
+                <a:spcPts val="100"/>
+              </a:spcAft>
+              <a:defRPr sz="1500">
+                <a:solidFill>
+                  <a:srgbClr val="E4ECFC"/>
+                </a:solidFill>
+                <a:latin typeface="DejaVu Sans Mono"/>
+              </a:defRPr>
+            </a:pPr>
+          </a:p>
+          <a:p>
+            <a:pPr>
+              <a:spcBef>
+                <a:spcPts val="0"/>
+              </a:spcBef>
+              <a:spcAft>
+                <a:spcPts val="100"/>
+              </a:spcAft>
+              <a:defRPr sz="1500">
+                <a:solidFill>
+                  <a:srgbClr val="E4ECFC"/>
+                </a:solidFill>
+                <a:latin typeface="DejaVu Sans Mono"/>
+              </a:defRPr>
+            </a:pPr>
+            <a:r>
+              <a:t># Keep .env out of git</a:t>
+            </a:r>
+          </a:p>
+          <a:p>
+            <a:pPr>
+              <a:spcBef>
+                <a:spcPts val="0"/>
+              </a:spcBef>
+              <a:spcAft>
+                <a:spcPts val="100"/>
+              </a:spcAft>
+              <a:defRPr sz="1500">
+                <a:solidFill>
+                  <a:srgbClr val="E4ECFC"/>
+                </a:solidFill>
+                <a:latin typeface="DejaVu Sans Mono"/>
+              </a:defRPr>
+            </a:pPr>
+            <a:r>
+              <a:t>echo '.env' &gt;&gt; .gitignore</a:t>
+            </a:r>
+          </a:p>
+        </p:txBody>
+      </p:sp>
+      <p:sp>
+        <p:nvSpPr>
+          <p:cNvPr id="4" name="TextBox 3"/>
+          <p:cNvSpPr txBox="1"/>
           <p:nvPr/>
-        </p:nvPicPr>
-        <p:blipFill>
-          <a:blip r:embed="rId2"/>
-          <a:stretch>
-            <a:fillRect/>
-          </a:stretch>
-        </p:blipFill>
-        <p:spPr>
-          <a:xfrm>
-            <a:off x="5440680" y="1115568"/>
-            <a:ext cx="6537960" cy="3677602"/>
+        </p:nvSpPr>
+        <p:spPr>
+          <a:xfrm>
+            <a:off x="594360" y="6355080"/>
+            <a:ext cx="10972800" cy="457200"/>
           </a:xfrm>
           <a:prstGeom prst="rect">
             <a:avLst/>
           </a:prstGeom>
-        </p:spPr>
-      </p:pic>
+          <a:noFill/>
+        </p:spPr>
+        <p:txBody>
+          <a:bodyPr wrap="square">
+            <a:spAutoFit/>
+          </a:bodyPr>
+          <a:lstStyle/>
+          <a:p>
+            <a:pPr>
+              <a:spcAft>
+                <a:spcPts val="800"/>
+              </a:spcAft>
+              <a:defRPr sz="1700">
+                <a:solidFill>
+                  <a:srgbClr val="233554"/>
+                </a:solidFill>
+              </a:defRPr>
+            </a:pPr>
+            <a:r>
+              <a:t>Important:</a:t>
+            </a:r>
+          </a:p>
+          <a:p>
+            <a:pPr lvl="1">
+              <a:spcAft>
+                <a:spcPts val="800"/>
+              </a:spcAft>
+              <a:defRPr sz="1500">
+                <a:solidFill>
+                  <a:srgbClr val="233554"/>
+                </a:solidFill>
+              </a:defRPr>
+            </a:pPr>
+            <a:r>
+              <a:t>Never commit .env to repository.</a:t>
+            </a:r>
+          </a:p>
+          <a:p>
+            <a:pPr lvl="1">
+              <a:spcAft>
+                <a:spcPts val="800"/>
+              </a:spcAft>
+              <a:defRPr sz="1500">
+                <a:solidFill>
+                  <a:srgbClr val="233554"/>
+                </a:solidFill>
+              </a:defRPr>
+            </a:pPr>
+            <a:r>
+              <a:t>Rotate tokens every 90 days.</a:t>
+            </a:r>
+          </a:p>
+        </p:txBody>
+      </p:sp>
     </p:spTree>
   </p:cSld>
   <p:clrMapOvr>
@@ -4451,160 +4674,90 @@
                   <a:srgbClr val="14284A"/>
                 </a:solidFill>
               </a:rPr>
-              <a:t>Step 7: Test Bitbucket connection</a:t>
-            </a:r>
-          </a:p>
-        </p:txBody>
-      </p:sp>
-      <p:sp>
-        <p:nvSpPr>
-          <p:cNvPr id="3" name="Rounded Rectangle 2"/>
-          <p:cNvSpPr/>
+              <a:t>Step 5: Test Jira connection</a:t>
+            </a:r>
+          </a:p>
+        </p:txBody>
+      </p:sp>
+      <p:sp>
+        <p:nvSpPr>
+          <p:cNvPr id="3" name="TextBox 2"/>
+          <p:cNvSpPr txBox="1"/>
           <p:nvPr/>
         </p:nvSpPr>
         <p:spPr>
           <a:xfrm>
-            <a:off x="502920" y="1783080"/>
-            <a:ext cx="4754880" cy="4480560"/>
-          </a:xfrm>
-          <a:prstGeom prst="roundRect">
+            <a:off x="502920" y="1417320"/>
+            <a:ext cx="4754880" cy="4754880"/>
+          </a:xfrm>
+          <a:prstGeom prst="rect">
             <a:avLst/>
           </a:prstGeom>
-          <a:solidFill>
-            <a:srgbClr val="161F31"/>
-          </a:solidFill>
-          <a:ln>
-            <a:solidFill>
-              <a:srgbClr val="161F31"/>
-            </a:solidFill>
-          </a:ln>
-        </p:spPr>
-        <p:style>
-          <a:lnRef idx="1">
-            <a:schemeClr val="accent1"/>
-          </a:lnRef>
-          <a:fillRef idx="3">
-            <a:schemeClr val="accent1"/>
-          </a:fillRef>
-          <a:effectRef idx="2">
-            <a:schemeClr val="accent1"/>
-          </a:effectRef>
-          <a:fontRef idx="minor">
-            <a:schemeClr val="lt1"/>
-          </a:fontRef>
-        </p:style>
-        <p:txBody>
-          <a:bodyPr rtlCol="0" anchor="ctr" wrap="square"/>
-          <a:lstStyle/>
-          <a:p>
-            <a:pPr algn="ctr">
-              <a:spcBef>
-                <a:spcPts val="0"/>
-              </a:spcBef>
-              <a:spcAft>
-                <a:spcPts val="100"/>
-              </a:spcAft>
-              <a:defRPr sz="1400">
-                <a:solidFill>
-                  <a:srgbClr val="E4ECFC"/>
-                </a:solidFill>
-                <a:latin typeface="DejaVu Sans Mono"/>
-              </a:defRPr>
-            </a:pPr>
-            <a:r>
-              <a:t>source .venv/bin/activate &amp;&amp; source .env</a:t>
-            </a:r>
-          </a:p>
-          <a:p>
-            <a:pPr>
-              <a:spcBef>
-                <a:spcPts val="0"/>
-              </a:spcBef>
-              <a:spcAft>
-                <a:spcPts val="100"/>
-              </a:spcAft>
-              <a:defRPr sz="1400">
-                <a:solidFill>
-                  <a:srgbClr val="E4ECFC"/>
-                </a:solidFill>
-                <a:latin typeface="DejaVu Sans Mono"/>
-              </a:defRPr>
-            </a:pPr>
-            <a:r>
-              <a:t>curl -s -u "$BITBUCKET_USERNAME:$BITBUCKET_APP_PASSWORD" \</a:t>
-            </a:r>
-          </a:p>
-          <a:p>
-            <a:pPr>
-              <a:spcBef>
-                <a:spcPts val="0"/>
-              </a:spcBef>
-              <a:spcAft>
-                <a:spcPts val="100"/>
-              </a:spcAft>
-              <a:defRPr sz="1400">
-                <a:solidFill>
-                  <a:srgbClr val="E4ECFC"/>
-                </a:solidFill>
-                <a:latin typeface="DejaVu Sans Mono"/>
-              </a:defRPr>
-            </a:pPr>
-            <a:r>
-              <a:t>  "https://api.bitbucket.org/2.0/repositories/$BITBUCKET_WORKSPACE" | jq '.values[0].full_name'</a:t>
-            </a:r>
-          </a:p>
-          <a:p>
-            <a:pPr>
-              <a:spcBef>
-                <a:spcPts val="0"/>
-              </a:spcBef>
-              <a:spcAft>
-                <a:spcPts val="100"/>
-              </a:spcAft>
-              <a:defRPr sz="1400">
-                <a:solidFill>
-                  <a:srgbClr val="E4ECFC"/>
-                </a:solidFill>
-                <a:latin typeface="DejaVu Sans Mono"/>
-              </a:defRPr>
-            </a:pPr>
-          </a:p>
-          <a:p>
-            <a:pPr>
-              <a:spcBef>
-                <a:spcPts val="0"/>
-              </a:spcBef>
-              <a:spcAft>
-                <a:spcPts val="100"/>
-              </a:spcAft>
-              <a:defRPr sz="1400">
-                <a:solidFill>
-                  <a:srgbClr val="E4ECFC"/>
-                </a:solidFill>
-                <a:latin typeface="DejaVu Sans Mono"/>
-              </a:defRPr>
-            </a:pPr>
-            <a:r>
-              <a:t># Prompt in Cursor</a:t>
-            </a:r>
-          </a:p>
-          <a:p>
-            <a:pPr>
-              <a:spcBef>
-                <a:spcPts val="0"/>
-              </a:spcBef>
-              <a:spcAft>
-                <a:spcPts val="100"/>
-              </a:spcAft>
-              <a:defRPr sz="1400">
-                <a:solidFill>
-                  <a:srgbClr val="E4ECFC"/>
-                </a:solidFill>
-                <a:latin typeface="DejaVu Sans Mono"/>
-              </a:defRPr>
-            </a:pPr>
-            <a:r>
-              <a:t>Using Bitbucket MCP, summarize PR #123 and create review checklist.</a:t>
+          <a:noFill/>
+        </p:spPr>
+        <p:txBody>
+          <a:bodyPr wrap="square">
+            <a:spAutoFit/>
+          </a:bodyPr>
+          <a:lstStyle/>
+          <a:p>
+            <a:pPr>
+              <a:spcAft>
+                <a:spcPts val="800"/>
+              </a:spcAft>
+              <a:defRPr sz="2200">
+                <a:solidFill>
+                  <a:srgbClr val="233554"/>
+                </a:solidFill>
+              </a:defRPr>
+            </a:pPr>
+            <a:r>
+              <a:t>Run test command:</a:t>
+            </a:r>
+          </a:p>
+          <a:p>
+            <a:pPr lvl="1">
+              <a:spcAft>
+                <a:spcPts val="800"/>
+              </a:spcAft>
+              <a:defRPr sz="1500">
+                <a:solidFill>
+                  <a:srgbClr val="233554"/>
+                </a:solidFill>
+              </a:defRPr>
+            </a:pPr>
+            <a:r>
+              <a:t>curl -s -u "$JIRA_EMAIL:$JIRA_API_TOKEN" "$JIRA_BASE_URL/rest/api/3/myself" | jq '.displayName'</a:t>
+            </a:r>
+          </a:p>
+          <a:p>
+            <a:pPr>
+              <a:spcAft>
+                <a:spcPts val="800"/>
+              </a:spcAft>
+              <a:defRPr sz="2200">
+                <a:solidFill>
+                  <a:srgbClr val="233554"/>
+                </a:solidFill>
+              </a:defRPr>
+            </a:pPr>
+            <a:r>
+              <a:t>Then ask in Cursor:</a:t>
+            </a:r>
+          </a:p>
+          <a:p>
+            <a:pPr lvl="1">
+              <a:spcAft>
+                <a:spcPts val="800"/>
+              </a:spcAft>
+              <a:defRPr sz="1500">
+                <a:solidFill>
+                  <a:srgbClr val="233554"/>
+                </a:solidFill>
+              </a:defRPr>
+            </a:pPr>
+            <a:r>
+              <a:t>"Using Jira MCP, summarize PROJ-101 and draft acceptance criteria."</a:t>
             </a:r>
           </a:p>
         </p:txBody>
@@ -4680,7 +4833,7 @@
                   <a:srgbClr val="14284A"/>
                 </a:solidFill>
               </a:rPr>
-              <a:t>Step 8: Build your first agent skill</a:t>
+              <a:t>Step 6: Test Figma connection</a:t>
             </a:r>
           </a:p>
         </p:txBody>
@@ -4693,8 +4846,8 @@
         </p:nvSpPr>
         <p:spPr>
           <a:xfrm>
-            <a:off x="502920" y="1600200"/>
-            <a:ext cx="11155680" cy="5029200"/>
+            <a:off x="502920" y="1783080"/>
+            <a:ext cx="4754880" cy="4480560"/>
           </a:xfrm>
           <a:prstGeom prst="roundRect">
             <a:avLst/>
@@ -4741,7 +4894,7 @@
               </a:defRPr>
             </a:pPr>
             <a:r>
-              <a:t>mkdir -p skills/jira-ticket-triage &amp;&amp; cd skills/jira-ticket-triage</a:t>
+              <a:t>source .venv/bin/activate &amp;&amp; source .env</a:t>
             </a:r>
           </a:p>
           <a:p>
@@ -4760,7 +4913,7 @@
               </a:defRPr>
             </a:pPr>
             <a:r>
-              <a:t>cat &gt; skill.yaml &lt;&lt;'YAML'</a:t>
+              <a:t>export FIGMA_FILE_KEY=&lt;file_key&gt;</a:t>
             </a:r>
           </a:p>
           <a:p>
@@ -4779,7 +4932,7 @@
               </a:defRPr>
             </a:pPr>
             <a:r>
-              <a:t>name: jira-ticket-triage</a:t>
+              <a:t>curl -s -H "X-Figma-Token: $FIGMA_TOKEN" "https://api.figma.com/v1/files/$FIGMA_FILE_KEY" | jq '.name'</a:t>
             </a:r>
           </a:p>
           <a:p>
@@ -4797,9 +4950,6 @@
                 <a:latin typeface="DejaVu Sans Mono"/>
               </a:defRPr>
             </a:pPr>
-            <a:r>
-              <a:t>version: 1.0.0</a:t>
-            </a:r>
           </a:p>
           <a:p>
             <a:pPr>
@@ -4817,7 +4967,7 @@
               </a:defRPr>
             </a:pPr>
             <a:r>
-              <a:t>description: Triage issue and return action plan</a:t>
+              <a:t># Prompt in Cursor</a:t>
             </a:r>
           </a:p>
           <a:p>
@@ -4836,157 +4986,35 @@
               </a:defRPr>
             </a:pPr>
             <a:r>
-              <a:t>tools: [jira.search, jira.get_issue]</a:t>
-            </a:r>
-          </a:p>
-          <a:p>
-            <a:pPr>
-              <a:spcBef>
-                <a:spcPts val="0"/>
-              </a:spcBef>
-              <a:spcAft>
-                <a:spcPts val="100"/>
-              </a:spcAft>
-              <a:defRPr sz="1400">
-                <a:solidFill>
-                  <a:srgbClr val="E4ECFC"/>
-                </a:solidFill>
-                <a:latin typeface="DejaVu Sans Mono"/>
-              </a:defRPr>
-            </a:pPr>
-            <a:r>
-              <a:t>YAML</a:t>
-            </a:r>
-          </a:p>
-          <a:p>
-            <a:pPr>
-              <a:spcBef>
-                <a:spcPts val="0"/>
-              </a:spcBef>
-              <a:spcAft>
-                <a:spcPts val="100"/>
-              </a:spcAft>
-              <a:defRPr sz="1400">
-                <a:solidFill>
-                  <a:srgbClr val="E4ECFC"/>
-                </a:solidFill>
-                <a:latin typeface="DejaVu Sans Mono"/>
-              </a:defRPr>
-            </a:pPr>
-          </a:p>
-          <a:p>
-            <a:pPr>
-              <a:spcBef>
-                <a:spcPts val="0"/>
-              </a:spcBef>
-              <a:spcAft>
-                <a:spcPts val="100"/>
-              </a:spcAft>
-              <a:defRPr sz="1400">
-                <a:solidFill>
-                  <a:srgbClr val="E4ECFC"/>
-                </a:solidFill>
-                <a:latin typeface="DejaVu Sans Mono"/>
-              </a:defRPr>
-            </a:pPr>
-            <a:r>
-              <a:t>cat &gt; prompts.md &lt;&lt;'MD'</a:t>
-            </a:r>
-          </a:p>
-          <a:p>
-            <a:pPr>
-              <a:spcBef>
-                <a:spcPts val="0"/>
-              </a:spcBef>
-              <a:spcAft>
-                <a:spcPts val="100"/>
-              </a:spcAft>
-              <a:defRPr sz="1400">
-                <a:solidFill>
-                  <a:srgbClr val="E4ECFC"/>
-                </a:solidFill>
-                <a:latin typeface="DejaVu Sans Mono"/>
-              </a:defRPr>
-            </a:pPr>
-            <a:r>
-              <a:t># Inputs: issue_key, team_context, done_definition</a:t>
-            </a:r>
-          </a:p>
-          <a:p>
-            <a:pPr>
-              <a:spcBef>
-                <a:spcPts val="0"/>
-              </a:spcBef>
-              <a:spcAft>
-                <a:spcPts val="100"/>
-              </a:spcAft>
-              <a:defRPr sz="1400">
-                <a:solidFill>
-                  <a:srgbClr val="E4ECFC"/>
-                </a:solidFill>
-                <a:latin typeface="DejaVu Sans Mono"/>
-              </a:defRPr>
-            </a:pPr>
-            <a:r>
-              <a:t># Output: summary, acceptance criteria, test cases</a:t>
-            </a:r>
-          </a:p>
-          <a:p>
-            <a:pPr>
-              <a:spcBef>
-                <a:spcPts val="0"/>
-              </a:spcBef>
-              <a:spcAft>
-                <a:spcPts val="100"/>
-              </a:spcAft>
-              <a:defRPr sz="1400">
-                <a:solidFill>
-                  <a:srgbClr val="E4ECFC"/>
-                </a:solidFill>
-                <a:latin typeface="DejaVu Sans Mono"/>
-              </a:defRPr>
-            </a:pPr>
-            <a:r>
-              <a:t>MD</a:t>
-            </a:r>
-          </a:p>
-          <a:p>
-            <a:pPr>
-              <a:spcBef>
-                <a:spcPts val="0"/>
-              </a:spcBef>
-              <a:spcAft>
-                <a:spcPts val="100"/>
-              </a:spcAft>
-              <a:defRPr sz="1400">
-                <a:solidFill>
-                  <a:srgbClr val="E4ECFC"/>
-                </a:solidFill>
-                <a:latin typeface="DejaVu Sans Mono"/>
-              </a:defRPr>
-            </a:pPr>
-          </a:p>
-          <a:p>
-            <a:pPr>
-              <a:spcBef>
-                <a:spcPts val="0"/>
-              </a:spcBef>
-              <a:spcAft>
-                <a:spcPts val="100"/>
-              </a:spcAft>
-              <a:defRPr sz="1400">
-                <a:solidFill>
-                  <a:srgbClr val="E4ECFC"/>
-                </a:solidFill>
-                <a:latin typeface="DejaVu Sans Mono"/>
-              </a:defRPr>
-            </a:pPr>
-            <a:r>
-              <a:t>echo '[{"input":"PROJ-101","assert_contains":["Summary","Acceptance"]}]' &gt; tests.json</a:t>
-            </a:r>
-          </a:p>
-        </p:txBody>
-      </p:sp>
+              <a:t>Using Figma MCP, extract design tokens and map components to frontend stories.</a:t>
+            </a:r>
+          </a:p>
+        </p:txBody>
+      </p:sp>
+      <p:pic>
+        <p:nvPicPr>
+          <p:cNvPr id="4" name="Picture 3" descr="cursor_status_screen.png"/>
+          <p:cNvPicPr>
+            <a:picLocks noChangeAspect="1"/>
+          </p:cNvPicPr>
+          <p:nvPr/>
+        </p:nvPicPr>
+        <p:blipFill>
+          <a:blip r:embed="rId2"/>
+          <a:stretch>
+            <a:fillRect/>
+          </a:stretch>
+        </p:blipFill>
+        <p:spPr>
+          <a:xfrm>
+            <a:off x="5440680" y="1115568"/>
+            <a:ext cx="6537960" cy="3677602"/>
+          </a:xfrm>
+          <a:prstGeom prst="rect">
+            <a:avLst/>
+          </a:prstGeom>
+        </p:spPr>
+      </p:pic>
     </p:spTree>
   </p:cSld>
   <p:clrMapOvr>
@@ -5034,97 +5062,167 @@
                   <a:srgbClr val="14284A"/>
                 </a:solidFill>
               </a:rPr>
-              <a:t>Daily workflow your team can follow</a:t>
-            </a:r>
-          </a:p>
-        </p:txBody>
-      </p:sp>
-      <p:sp>
-        <p:nvSpPr>
-          <p:cNvPr id="3" name="TextBox 2"/>
-          <p:cNvSpPr txBox="1"/>
+              <a:t>Step 7: Test Bitbucket connection</a:t>
+            </a:r>
+          </a:p>
+        </p:txBody>
+      </p:sp>
+      <p:sp>
+        <p:nvSpPr>
+          <p:cNvPr id="3" name="Rounded Rectangle 2"/>
+          <p:cNvSpPr/>
           <p:nvPr/>
         </p:nvSpPr>
         <p:spPr>
           <a:xfrm>
-            <a:off x="502920" y="1280160"/>
-            <a:ext cx="4937760" cy="5120640"/>
-          </a:xfrm>
-          <a:prstGeom prst="rect">
+            <a:off x="502920" y="1783080"/>
+            <a:ext cx="4754880" cy="4480560"/>
+          </a:xfrm>
+          <a:prstGeom prst="roundRect">
             <a:avLst/>
           </a:prstGeom>
-          <a:noFill/>
-        </p:spPr>
-        <p:txBody>
-          <a:bodyPr wrap="square">
-            <a:spAutoFit/>
-          </a:bodyPr>
-          <a:lstStyle/>
-          <a:p>
-            <a:pPr>
-              <a:spcAft>
-                <a:spcPts val="800"/>
-              </a:spcAft>
-              <a:defRPr sz="2100">
-                <a:solidFill>
-                  <a:srgbClr val="233554"/>
-                </a:solidFill>
-              </a:defRPr>
-            </a:pPr>
-            <a:r>
-              <a:t>Keep it simple:</a:t>
-            </a:r>
-          </a:p>
-          <a:p>
-            <a:pPr lvl="1">
-              <a:spcAft>
-                <a:spcPts val="800"/>
-              </a:spcAft>
-              <a:defRPr sz="1700">
-                <a:solidFill>
-                  <a:srgbClr val="233554"/>
-                </a:solidFill>
-              </a:defRPr>
-            </a:pPr>
-            <a:r>
-              <a:t>Morning plan -&gt; Build -&gt; Review -&gt; Close</a:t>
-            </a:r>
-          </a:p>
-          <a:p>
-            <a:pPr lvl="1">
-              <a:spcAft>
-                <a:spcPts val="800"/>
-              </a:spcAft>
-              <a:defRPr sz="1700">
-                <a:solidFill>
-                  <a:srgbClr val="233554"/>
-                </a:solidFill>
-              </a:defRPr>
-            </a:pPr>
-            <a:r>
-              <a:t>Save good prompts as team skills</a:t>
-            </a:r>
-          </a:p>
-          <a:p>
-            <a:pPr lvl="1">
-              <a:spcAft>
-                <a:spcPts val="800"/>
-              </a:spcAft>
-              <a:defRPr sz="1700">
-                <a:solidFill>
-                  <a:srgbClr val="233554"/>
-                </a:solidFill>
-              </a:defRPr>
-            </a:pPr>
-            <a:r>
-              <a:t>Do weekly quality review</a:t>
+          <a:solidFill>
+            <a:srgbClr val="161F31"/>
+          </a:solidFill>
+          <a:ln>
+            <a:solidFill>
+              <a:srgbClr val="161F31"/>
+            </a:solidFill>
+          </a:ln>
+        </p:spPr>
+        <p:style>
+          <a:lnRef idx="1">
+            <a:schemeClr val="accent1"/>
+          </a:lnRef>
+          <a:fillRef idx="3">
+            <a:schemeClr val="accent1"/>
+          </a:fillRef>
+          <a:effectRef idx="2">
+            <a:schemeClr val="accent1"/>
+          </a:effectRef>
+          <a:fontRef idx="minor">
+            <a:schemeClr val="lt1"/>
+          </a:fontRef>
+        </p:style>
+        <p:txBody>
+          <a:bodyPr rtlCol="0" anchor="ctr" wrap="square"/>
+          <a:lstStyle/>
+          <a:p>
+            <a:pPr algn="ctr">
+              <a:spcBef>
+                <a:spcPts val="0"/>
+              </a:spcBef>
+              <a:spcAft>
+                <a:spcPts val="100"/>
+              </a:spcAft>
+              <a:defRPr sz="1400">
+                <a:solidFill>
+                  <a:srgbClr val="E4ECFC"/>
+                </a:solidFill>
+                <a:latin typeface="DejaVu Sans Mono"/>
+              </a:defRPr>
+            </a:pPr>
+            <a:r>
+              <a:t>source .venv/bin/activate &amp;&amp; source .env</a:t>
+            </a:r>
+          </a:p>
+          <a:p>
+            <a:pPr>
+              <a:spcBef>
+                <a:spcPts val="0"/>
+              </a:spcBef>
+              <a:spcAft>
+                <a:spcPts val="100"/>
+              </a:spcAft>
+              <a:defRPr sz="1400">
+                <a:solidFill>
+                  <a:srgbClr val="E4ECFC"/>
+                </a:solidFill>
+                <a:latin typeface="DejaVu Sans Mono"/>
+              </a:defRPr>
+            </a:pPr>
+            <a:r>
+              <a:t>curl -s -u "$BITBUCKET_USERNAME:$BITBUCKET_APP_PASSWORD" \</a:t>
+            </a:r>
+          </a:p>
+          <a:p>
+            <a:pPr>
+              <a:spcBef>
+                <a:spcPts val="0"/>
+              </a:spcBef>
+              <a:spcAft>
+                <a:spcPts val="100"/>
+              </a:spcAft>
+              <a:defRPr sz="1400">
+                <a:solidFill>
+                  <a:srgbClr val="E4ECFC"/>
+                </a:solidFill>
+                <a:latin typeface="DejaVu Sans Mono"/>
+              </a:defRPr>
+            </a:pPr>
+            <a:r>
+              <a:t>  "https://api.bitbucket.org/2.0/repositories/$BITBUCKET_WORKSPACE" | jq '.values[0].full_name'</a:t>
+            </a:r>
+          </a:p>
+          <a:p>
+            <a:pPr>
+              <a:spcBef>
+                <a:spcPts val="0"/>
+              </a:spcBef>
+              <a:spcAft>
+                <a:spcPts val="100"/>
+              </a:spcAft>
+              <a:defRPr sz="1400">
+                <a:solidFill>
+                  <a:srgbClr val="E4ECFC"/>
+                </a:solidFill>
+                <a:latin typeface="DejaVu Sans Mono"/>
+              </a:defRPr>
+            </a:pPr>
+          </a:p>
+          <a:p>
+            <a:pPr>
+              <a:spcBef>
+                <a:spcPts val="0"/>
+              </a:spcBef>
+              <a:spcAft>
+                <a:spcPts val="100"/>
+              </a:spcAft>
+              <a:defRPr sz="1400">
+                <a:solidFill>
+                  <a:srgbClr val="E4ECFC"/>
+                </a:solidFill>
+                <a:latin typeface="DejaVu Sans Mono"/>
+              </a:defRPr>
+            </a:pPr>
+            <a:r>
+              <a:t># Prompt in Cursor</a:t>
+            </a:r>
+          </a:p>
+          <a:p>
+            <a:pPr>
+              <a:spcBef>
+                <a:spcPts val="0"/>
+              </a:spcBef>
+              <a:spcAft>
+                <a:spcPts val="100"/>
+              </a:spcAft>
+              <a:defRPr sz="1400">
+                <a:solidFill>
+                  <a:srgbClr val="E4ECFC"/>
+                </a:solidFill>
+                <a:latin typeface="DejaVu Sans Mono"/>
+              </a:defRPr>
+            </a:pPr>
+            <a:r>
+              <a:t>Using Bitbucket MCP, summarize PR #123 and create review checklist.</a:t>
             </a:r>
           </a:p>
         </p:txBody>
       </p:sp>
       <p:pic>
         <p:nvPicPr>
-          <p:cNvPr id="4" name="Picture 3" descr="daily_workflow.png"/>
+          <p:cNvPr id="4" name="Picture 3" descr="cursor_status_screen.png"/>
           <p:cNvPicPr>
             <a:picLocks noChangeAspect="1"/>
           </p:cNvPicPr>
@@ -5138,7 +5236,7 @@
         </p:blipFill>
         <p:spPr>
           <a:xfrm>
-            <a:off x="5440680" y="1124712"/>
+            <a:off x="5440680" y="1115568"/>
             <a:ext cx="6537960" cy="3677602"/>
           </a:xfrm>
           <a:prstGeom prst="rect">
@@ -5193,133 +5291,313 @@
                   <a:srgbClr val="14284A"/>
                 </a:solidFill>
               </a:rPr>
-              <a:t>Risk Management and Governance Controls (simple)</a:t>
-            </a:r>
-          </a:p>
-        </p:txBody>
-      </p:sp>
-      <p:sp>
-        <p:nvSpPr>
-          <p:cNvPr id="3" name="TextBox 2"/>
-          <p:cNvSpPr txBox="1"/>
+              <a:t>Step 8: Build your first agent skill</a:t>
+            </a:r>
+          </a:p>
+        </p:txBody>
+      </p:sp>
+      <p:sp>
+        <p:nvSpPr>
+          <p:cNvPr id="3" name="Rounded Rectangle 2"/>
+          <p:cNvSpPr/>
           <p:nvPr/>
         </p:nvSpPr>
         <p:spPr>
           <a:xfrm>
-            <a:off x="502920" y="1280160"/>
-            <a:ext cx="4937760" cy="5120640"/>
-          </a:xfrm>
-          <a:prstGeom prst="rect">
+            <a:off x="502920" y="1600200"/>
+            <a:ext cx="11155680" cy="5029200"/>
+          </a:xfrm>
+          <a:prstGeom prst="roundRect">
             <a:avLst/>
           </a:prstGeom>
-          <a:noFill/>
-        </p:spPr>
-        <p:txBody>
-          <a:bodyPr wrap="square">
-            <a:spAutoFit/>
-          </a:bodyPr>
-          <a:lstStyle/>
-          <a:p>
-            <a:pPr>
-              <a:spcAft>
-                <a:spcPts val="800"/>
-              </a:spcAft>
-              <a:defRPr sz="2100">
-                <a:solidFill>
-                  <a:srgbClr val="233554"/>
-                </a:solidFill>
-              </a:defRPr>
-            </a:pPr>
-            <a:r>
-              <a:t>Four must-have controls:</a:t>
-            </a:r>
-          </a:p>
-          <a:p>
-            <a:pPr lvl="1">
-              <a:spcAft>
-                <a:spcPts val="800"/>
-              </a:spcAft>
-              <a:defRPr sz="1700">
-                <a:solidFill>
-                  <a:srgbClr val="233554"/>
-                </a:solidFill>
-              </a:defRPr>
-            </a:pPr>
-            <a:r>
-              <a:t>1) Low-access tokens</a:t>
-            </a:r>
-          </a:p>
-          <a:p>
-            <a:pPr lvl="1">
-              <a:spcAft>
-                <a:spcPts val="800"/>
-              </a:spcAft>
-              <a:defRPr sz="1700">
-                <a:solidFill>
-                  <a:srgbClr val="233554"/>
-                </a:solidFill>
-              </a:defRPr>
-            </a:pPr>
-            <a:r>
-              <a:t>2) Human approval for write actions</a:t>
-            </a:r>
-          </a:p>
-          <a:p>
-            <a:pPr lvl="1">
-              <a:spcAft>
-                <a:spcPts val="800"/>
-              </a:spcAft>
-              <a:defRPr sz="1700">
-                <a:solidFill>
-                  <a:srgbClr val="233554"/>
-                </a:solidFill>
-              </a:defRPr>
-            </a:pPr>
-            <a:r>
-              <a:t>3) Audit logs for every automation</a:t>
-            </a:r>
-          </a:p>
-          <a:p>
-            <a:pPr lvl="1">
-              <a:spcAft>
-                <a:spcPts val="800"/>
-              </a:spcAft>
-              <a:defRPr sz="1700">
-                <a:solidFill>
-                  <a:srgbClr val="233554"/>
-                </a:solidFill>
-              </a:defRPr>
-            </a:pPr>
-            <a:r>
-              <a:t>4) Weekly KPI and failure review</a:t>
-            </a:r>
-          </a:p>
-        </p:txBody>
-      </p:sp>
-      <p:pic>
-        <p:nvPicPr>
-          <p:cNvPr id="4" name="Picture 3" descr="risk_controls_simple.png"/>
-          <p:cNvPicPr>
-            <a:picLocks noChangeAspect="1"/>
-          </p:cNvPicPr>
-          <p:nvPr/>
-        </p:nvPicPr>
-        <p:blipFill>
-          <a:blip r:embed="rId2"/>
-          <a:stretch>
-            <a:fillRect/>
-          </a:stretch>
-        </p:blipFill>
-        <p:spPr>
-          <a:xfrm>
-            <a:off x="5440680" y="1124712"/>
-            <a:ext cx="6537960" cy="3677602"/>
-          </a:xfrm>
-          <a:prstGeom prst="rect">
-            <a:avLst/>
-          </a:prstGeom>
-        </p:spPr>
-      </p:pic>
+          <a:solidFill>
+            <a:srgbClr val="161F31"/>
+          </a:solidFill>
+          <a:ln>
+            <a:solidFill>
+              <a:srgbClr val="161F31"/>
+            </a:solidFill>
+          </a:ln>
+        </p:spPr>
+        <p:style>
+          <a:lnRef idx="1">
+            <a:schemeClr val="accent1"/>
+          </a:lnRef>
+          <a:fillRef idx="3">
+            <a:schemeClr val="accent1"/>
+          </a:fillRef>
+          <a:effectRef idx="2">
+            <a:schemeClr val="accent1"/>
+          </a:effectRef>
+          <a:fontRef idx="minor">
+            <a:schemeClr val="lt1"/>
+          </a:fontRef>
+        </p:style>
+        <p:txBody>
+          <a:bodyPr rtlCol="0" anchor="ctr" wrap="square"/>
+          <a:lstStyle/>
+          <a:p>
+            <a:pPr algn="ctr">
+              <a:spcBef>
+                <a:spcPts val="0"/>
+              </a:spcBef>
+              <a:spcAft>
+                <a:spcPts val="100"/>
+              </a:spcAft>
+              <a:defRPr sz="1400">
+                <a:solidFill>
+                  <a:srgbClr val="E4ECFC"/>
+                </a:solidFill>
+                <a:latin typeface="DejaVu Sans Mono"/>
+              </a:defRPr>
+            </a:pPr>
+            <a:r>
+              <a:t>mkdir -p skills/jira-ticket-triage &amp;&amp; cd skills/jira-ticket-triage</a:t>
+            </a:r>
+          </a:p>
+          <a:p>
+            <a:pPr>
+              <a:spcBef>
+                <a:spcPts val="0"/>
+              </a:spcBef>
+              <a:spcAft>
+                <a:spcPts val="100"/>
+              </a:spcAft>
+              <a:defRPr sz="1400">
+                <a:solidFill>
+                  <a:srgbClr val="E4ECFC"/>
+                </a:solidFill>
+                <a:latin typeface="DejaVu Sans Mono"/>
+              </a:defRPr>
+            </a:pPr>
+            <a:r>
+              <a:t>cat &gt; skill.yaml &lt;&lt;'YAML'</a:t>
+            </a:r>
+          </a:p>
+          <a:p>
+            <a:pPr>
+              <a:spcBef>
+                <a:spcPts val="0"/>
+              </a:spcBef>
+              <a:spcAft>
+                <a:spcPts val="100"/>
+              </a:spcAft>
+              <a:defRPr sz="1400">
+                <a:solidFill>
+                  <a:srgbClr val="E4ECFC"/>
+                </a:solidFill>
+                <a:latin typeface="DejaVu Sans Mono"/>
+              </a:defRPr>
+            </a:pPr>
+            <a:r>
+              <a:t>name: jira-ticket-triage</a:t>
+            </a:r>
+          </a:p>
+          <a:p>
+            <a:pPr>
+              <a:spcBef>
+                <a:spcPts val="0"/>
+              </a:spcBef>
+              <a:spcAft>
+                <a:spcPts val="100"/>
+              </a:spcAft>
+              <a:defRPr sz="1400">
+                <a:solidFill>
+                  <a:srgbClr val="E4ECFC"/>
+                </a:solidFill>
+                <a:latin typeface="DejaVu Sans Mono"/>
+              </a:defRPr>
+            </a:pPr>
+            <a:r>
+              <a:t>version: 1.0.0</a:t>
+            </a:r>
+          </a:p>
+          <a:p>
+            <a:pPr>
+              <a:spcBef>
+                <a:spcPts val="0"/>
+              </a:spcBef>
+              <a:spcAft>
+                <a:spcPts val="100"/>
+              </a:spcAft>
+              <a:defRPr sz="1400">
+                <a:solidFill>
+                  <a:srgbClr val="E4ECFC"/>
+                </a:solidFill>
+                <a:latin typeface="DejaVu Sans Mono"/>
+              </a:defRPr>
+            </a:pPr>
+            <a:r>
+              <a:t>description: Triage issue and return action plan</a:t>
+            </a:r>
+          </a:p>
+          <a:p>
+            <a:pPr>
+              <a:spcBef>
+                <a:spcPts val="0"/>
+              </a:spcBef>
+              <a:spcAft>
+                <a:spcPts val="100"/>
+              </a:spcAft>
+              <a:defRPr sz="1400">
+                <a:solidFill>
+                  <a:srgbClr val="E4ECFC"/>
+                </a:solidFill>
+                <a:latin typeface="DejaVu Sans Mono"/>
+              </a:defRPr>
+            </a:pPr>
+            <a:r>
+              <a:t>tools: [jira.search, jira.get_issue]</a:t>
+            </a:r>
+          </a:p>
+          <a:p>
+            <a:pPr>
+              <a:spcBef>
+                <a:spcPts val="0"/>
+              </a:spcBef>
+              <a:spcAft>
+                <a:spcPts val="100"/>
+              </a:spcAft>
+              <a:defRPr sz="1400">
+                <a:solidFill>
+                  <a:srgbClr val="E4ECFC"/>
+                </a:solidFill>
+                <a:latin typeface="DejaVu Sans Mono"/>
+              </a:defRPr>
+            </a:pPr>
+            <a:r>
+              <a:t>YAML</a:t>
+            </a:r>
+          </a:p>
+          <a:p>
+            <a:pPr>
+              <a:spcBef>
+                <a:spcPts val="0"/>
+              </a:spcBef>
+              <a:spcAft>
+                <a:spcPts val="100"/>
+              </a:spcAft>
+              <a:defRPr sz="1400">
+                <a:solidFill>
+                  <a:srgbClr val="E4ECFC"/>
+                </a:solidFill>
+                <a:latin typeface="DejaVu Sans Mono"/>
+              </a:defRPr>
+            </a:pPr>
+          </a:p>
+          <a:p>
+            <a:pPr>
+              <a:spcBef>
+                <a:spcPts val="0"/>
+              </a:spcBef>
+              <a:spcAft>
+                <a:spcPts val="100"/>
+              </a:spcAft>
+              <a:defRPr sz="1400">
+                <a:solidFill>
+                  <a:srgbClr val="E4ECFC"/>
+                </a:solidFill>
+                <a:latin typeface="DejaVu Sans Mono"/>
+              </a:defRPr>
+            </a:pPr>
+            <a:r>
+              <a:t>cat &gt; prompts.md &lt;&lt;'MD'</a:t>
+            </a:r>
+          </a:p>
+          <a:p>
+            <a:pPr>
+              <a:spcBef>
+                <a:spcPts val="0"/>
+              </a:spcBef>
+              <a:spcAft>
+                <a:spcPts val="100"/>
+              </a:spcAft>
+              <a:defRPr sz="1400">
+                <a:solidFill>
+                  <a:srgbClr val="E4ECFC"/>
+                </a:solidFill>
+                <a:latin typeface="DejaVu Sans Mono"/>
+              </a:defRPr>
+            </a:pPr>
+            <a:r>
+              <a:t># Inputs: issue_key, team_context, done_definition</a:t>
+            </a:r>
+          </a:p>
+          <a:p>
+            <a:pPr>
+              <a:spcBef>
+                <a:spcPts val="0"/>
+              </a:spcBef>
+              <a:spcAft>
+                <a:spcPts val="100"/>
+              </a:spcAft>
+              <a:defRPr sz="1400">
+                <a:solidFill>
+                  <a:srgbClr val="E4ECFC"/>
+                </a:solidFill>
+                <a:latin typeface="DejaVu Sans Mono"/>
+              </a:defRPr>
+            </a:pPr>
+            <a:r>
+              <a:t># Output: summary, acceptance criteria, test cases</a:t>
+            </a:r>
+          </a:p>
+          <a:p>
+            <a:pPr>
+              <a:spcBef>
+                <a:spcPts val="0"/>
+              </a:spcBef>
+              <a:spcAft>
+                <a:spcPts val="100"/>
+              </a:spcAft>
+              <a:defRPr sz="1400">
+                <a:solidFill>
+                  <a:srgbClr val="E4ECFC"/>
+                </a:solidFill>
+                <a:latin typeface="DejaVu Sans Mono"/>
+              </a:defRPr>
+            </a:pPr>
+            <a:r>
+              <a:t>MD</a:t>
+            </a:r>
+          </a:p>
+          <a:p>
+            <a:pPr>
+              <a:spcBef>
+                <a:spcPts val="0"/>
+              </a:spcBef>
+              <a:spcAft>
+                <a:spcPts val="100"/>
+              </a:spcAft>
+              <a:defRPr sz="1400">
+                <a:solidFill>
+                  <a:srgbClr val="E4ECFC"/>
+                </a:solidFill>
+                <a:latin typeface="DejaVu Sans Mono"/>
+              </a:defRPr>
+            </a:pPr>
+          </a:p>
+          <a:p>
+            <a:pPr>
+              <a:spcBef>
+                <a:spcPts val="0"/>
+              </a:spcBef>
+              <a:spcAft>
+                <a:spcPts val="100"/>
+              </a:spcAft>
+              <a:defRPr sz="1400">
+                <a:solidFill>
+                  <a:srgbClr val="E4ECFC"/>
+                </a:solidFill>
+                <a:latin typeface="DejaVu Sans Mono"/>
+              </a:defRPr>
+            </a:pPr>
+            <a:r>
+              <a:t>echo '[{"input":"PROJ-101","assert_contains":["Summary","Acceptance"]}]' &gt; tests.json</a:t>
+            </a:r>
+          </a:p>
+        </p:txBody>
+      </p:sp>
     </p:spTree>
   </p:cSld>
   <p:clrMapOvr>
@@ -5367,7 +5645,7 @@
                   <a:srgbClr val="14284A"/>
                 </a:solidFill>
               </a:rPr>
-              <a:t>30-60-90 day adoption roadmap</a:t>
+              <a:t>Common errors and fixes (use in live training)</a:t>
             </a:r>
           </a:p>
         </p:txBody>
@@ -5398,66 +5676,81 @@
               <a:spcAft>
                 <a:spcPts val="800"/>
               </a:spcAft>
-              <a:defRPr sz="2100">
-                <a:solidFill>
-                  <a:srgbClr val="233554"/>
-                </a:solidFill>
-              </a:defRPr>
-            </a:pPr>
-            <a:r>
-              <a:t>0-30 days: connect tools and train first squad.</a:t>
-            </a:r>
-          </a:p>
-          <a:p>
-            <a:pPr>
-              <a:spcAft>
-                <a:spcPts val="800"/>
-              </a:spcAft>
-              <a:defRPr sz="2100">
-                <a:solidFill>
-                  <a:srgbClr val="233554"/>
-                </a:solidFill>
-              </a:defRPr>
-            </a:pPr>
-            <a:r>
-              <a:t>31-60 days: publish top skills and run office hours.</a:t>
-            </a:r>
-          </a:p>
-          <a:p>
-            <a:pPr>
-              <a:spcAft>
-                <a:spcPts val="800"/>
-              </a:spcAft>
-              <a:defRPr sz="2100">
-                <a:solidFill>
-                  <a:srgbClr val="233554"/>
-                </a:solidFill>
-              </a:defRPr>
-            </a:pPr>
-            <a:r>
-              <a:t>61-90 days: scale to more teams and report KPI impact.</a:t>
-            </a:r>
-          </a:p>
-          <a:p>
-            <a:pPr>
-              <a:spcAft>
-                <a:spcPts val="800"/>
-              </a:spcAft>
-              <a:defRPr sz="2100">
-                <a:solidFill>
-                  <a:srgbClr val="233554"/>
-                </a:solidFill>
-              </a:defRPr>
-            </a:pPr>
-            <a:r>
-              <a:t>Target: 20% faster delivery with safe controls.</a:t>
+              <a:defRPr sz="2000">
+                <a:solidFill>
+                  <a:srgbClr val="233554"/>
+                </a:solidFill>
+              </a:defRPr>
+            </a:pPr>
+            <a:r>
+              <a:t>Most common issues:</a:t>
+            </a:r>
+          </a:p>
+          <a:p>
+            <a:pPr lvl="1">
+              <a:spcAft>
+                <a:spcPts val="800"/>
+              </a:spcAft>
+              <a:defRPr sz="1600">
+                <a:solidFill>
+                  <a:srgbClr val="233554"/>
+                </a:solidFill>
+              </a:defRPr>
+            </a:pPr>
+            <a:r>
+              <a:t>401: token expired or wrong</a:t>
+            </a:r>
+          </a:p>
+          <a:p>
+            <a:pPr lvl="1">
+              <a:spcAft>
+                <a:spcPts val="800"/>
+              </a:spcAft>
+              <a:defRPr sz="1600">
+                <a:solidFill>
+                  <a:srgbClr val="233554"/>
+                </a:solidFill>
+              </a:defRPr>
+            </a:pPr>
+            <a:r>
+              <a:t>403: missing project/file permission</a:t>
+            </a:r>
+          </a:p>
+          <a:p>
+            <a:pPr lvl="1">
+              <a:spcAft>
+                <a:spcPts val="800"/>
+              </a:spcAft>
+              <a:defRPr sz="1600">
+                <a:solidFill>
+                  <a:srgbClr val="233554"/>
+                </a:solidFill>
+              </a:defRPr>
+            </a:pPr>
+            <a:r>
+              <a:t>404: wrong key or URL</a:t>
+            </a:r>
+          </a:p>
+          <a:p>
+            <a:pPr lvl="1">
+              <a:spcAft>
+                <a:spcPts val="800"/>
+              </a:spcAft>
+              <a:defRPr sz="1600">
+                <a:solidFill>
+                  <a:srgbClr val="233554"/>
+                </a:solidFill>
+              </a:defRPr>
+            </a:pPr>
+            <a:r>
+              <a:t>MCP not showing: restart Cursor after save</a:t>
             </a:r>
           </a:p>
         </p:txBody>
       </p:sp>
       <p:pic>
         <p:nvPicPr>
-          <p:cNvPr id="4" name="Picture 3" descr="roadmap_30_60_90.png"/>
+          <p:cNvPr id="4" name="Picture 3" descr="common_errors_fixes.png"/>
           <p:cNvPicPr>
             <a:picLocks noChangeAspect="1"/>
           </p:cNvPicPr>
@@ -5526,7 +5819,7 @@
                   <a:srgbClr val="14284A"/>
                 </a:solidFill>
               </a:rPr>
-              <a:t>Final checklist for trainer and team</a:t>
+              <a:t>5-minute daily routine (adoption booster)</a:t>
             </a:r>
           </a:p>
         </p:txBody>
@@ -5539,8 +5832,8 @@
         </p:nvSpPr>
         <p:spPr>
           <a:xfrm>
-            <a:off x="822960" y="1417320"/>
-            <a:ext cx="4754880" cy="5303520"/>
+            <a:off x="502920" y="1280160"/>
+            <a:ext cx="4937760" cy="5120640"/>
           </a:xfrm>
           <a:prstGeom prst="rect">
             <a:avLst/>
@@ -5557,14 +5850,14 @@
               <a:spcAft>
                 <a:spcPts val="800"/>
               </a:spcAft>
-              <a:defRPr sz="2100">
-                <a:solidFill>
-                  <a:srgbClr val="233554"/>
-                </a:solidFill>
-              </a:defRPr>
-            </a:pPr>
-            <a:r>
-              <a:t>Before session:</a:t>
+              <a:defRPr sz="2000">
+                <a:solidFill>
+                  <a:srgbClr val="233554"/>
+                </a:solidFill>
+              </a:defRPr>
+            </a:pPr>
+            <a:r>
+              <a:t>Do this daily:</a:t>
             </a:r>
           </a:p>
           <a:p>
@@ -5572,14 +5865,14 @@
               <a:spcAft>
                 <a:spcPts val="800"/>
               </a:spcAft>
-              <a:defRPr sz="1700">
-                <a:solidFill>
-                  <a:srgbClr val="233554"/>
-                </a:solidFill>
-              </a:defRPr>
-            </a:pPr>
-            <a:r>
-              <a:t>Tokens ready and mcp.json template prepared</a:t>
+              <a:defRPr sz="1600">
+                <a:solidFill>
+                  <a:srgbClr val="233554"/>
+                </a:solidFill>
+              </a:defRPr>
+            </a:pPr>
+            <a:r>
+              <a:t>Minute 1: pick top task</a:t>
             </a:r>
           </a:p>
           <a:p>
@@ -5587,29 +5880,14 @@
               <a:spcAft>
                 <a:spcPts val="800"/>
               </a:spcAft>
-              <a:defRPr sz="1700">
-                <a:solidFill>
-                  <a:srgbClr val="233554"/>
-                </a:solidFill>
-              </a:defRPr>
-            </a:pPr>
-            <a:r>
-              <a:t>Pilot repo, Jira project, and Figma file selected</a:t>
-            </a:r>
-          </a:p>
-          <a:p>
-            <a:pPr>
-              <a:spcAft>
-                <a:spcPts val="800"/>
-              </a:spcAft>
-              <a:defRPr sz="2100">
-                <a:solidFill>
-                  <a:srgbClr val="233554"/>
-                </a:solidFill>
-              </a:defRPr>
-            </a:pPr>
-            <a:r>
-              <a:t>During session:</a:t>
+              <a:defRPr sz="1600">
+                <a:solidFill>
+                  <a:srgbClr val="233554"/>
+                </a:solidFill>
+              </a:defRPr>
+            </a:pPr>
+            <a:r>
+              <a:t>Minute 2: ask Cursor for plan</a:t>
             </a:r>
           </a:p>
           <a:p>
@@ -5617,14 +5895,14 @@
               <a:spcAft>
                 <a:spcPts val="800"/>
               </a:spcAft>
-              <a:defRPr sz="1700">
-                <a:solidFill>
-                  <a:srgbClr val="233554"/>
-                </a:solidFill>
-              </a:defRPr>
-            </a:pPr>
-            <a:r>
-              <a:t>Everyone completes one end-to-end workflow</a:t>
+              <a:defRPr sz="1600">
+                <a:solidFill>
+                  <a:srgbClr val="233554"/>
+                </a:solidFill>
+              </a:defRPr>
+            </a:pPr>
+            <a:r>
+              <a:t>Minute 3: run quality skill</a:t>
             </a:r>
           </a:p>
           <a:p>
@@ -5632,29 +5910,14 @@
               <a:spcAft>
                 <a:spcPts val="800"/>
               </a:spcAft>
-              <a:defRPr sz="1700">
-                <a:solidFill>
-                  <a:srgbClr val="233554"/>
-                </a:solidFill>
-              </a:defRPr>
-            </a:pPr>
-            <a:r>
-              <a:t>Everyone creates at least one simple skill</a:t>
-            </a:r>
-          </a:p>
-          <a:p>
-            <a:pPr>
-              <a:spcAft>
-                <a:spcPts val="800"/>
-              </a:spcAft>
-              <a:defRPr sz="2100">
-                <a:solidFill>
-                  <a:srgbClr val="233554"/>
-                </a:solidFill>
-              </a:defRPr>
-            </a:pPr>
-            <a:r>
-              <a:t>After session:</a:t>
+              <a:defRPr sz="1600">
+                <a:solidFill>
+                  <a:srgbClr val="233554"/>
+                </a:solidFill>
+              </a:defRPr>
+            </a:pPr>
+            <a:r>
+              <a:t>Minute 4: update status</a:t>
             </a:r>
           </a:p>
           <a:p>
@@ -5662,48 +5925,21 @@
               <a:spcAft>
                 <a:spcPts val="800"/>
               </a:spcAft>
-              <a:defRPr sz="1700">
-                <a:solidFill>
-                  <a:srgbClr val="233554"/>
-                </a:solidFill>
-              </a:defRPr>
-            </a:pPr>
-            <a:r>
-              <a:t>Review KPIs and improve weak prompts weekly</a:t>
-            </a:r>
-          </a:p>
-          <a:p>
-            <a:pPr>
-              <a:spcAft>
-                <a:spcPts val="800"/>
-              </a:spcAft>
-              <a:defRPr sz="2100">
-                <a:solidFill>
-                  <a:srgbClr val="233554"/>
-                </a:solidFill>
-              </a:defRPr>
-            </a:pPr>
-          </a:p>
-          <a:p>
-            <a:pPr>
-              <a:spcAft>
-                <a:spcPts val="800"/>
-              </a:spcAft>
-              <a:defRPr sz="2100">
-                <a:solidFill>
-                  <a:srgbClr val="233554"/>
-                </a:solidFill>
-              </a:defRPr>
-            </a:pPr>
-            <a:r>
-              <a:t>Q&amp;A</a:t>
+              <a:defRPr sz="1600">
+                <a:solidFill>
+                  <a:srgbClr val="233554"/>
+                </a:solidFill>
+              </a:defRPr>
+            </a:pPr>
+            <a:r>
+              <a:t>Minute 5: save one useful prompt</a:t>
             </a:r>
           </a:p>
         </p:txBody>
       </p:sp>
       <p:pic>
         <p:nvPicPr>
-          <p:cNvPr id="4" name="Picture 3" descr="cover_visual.png"/>
+          <p:cNvPr id="4" name="Picture 3" descr="five_min_routine.png"/>
           <p:cNvPicPr>
             <a:picLocks noChangeAspect="1"/>
           </p:cNvPicPr>
@@ -5717,7 +5953,7 @@
         </p:blipFill>
         <p:spPr>
           <a:xfrm>
-            <a:off x="5440680" y="1115568"/>
+            <a:off x="5440680" y="1124712"/>
             <a:ext cx="6537960" cy="3677602"/>
           </a:xfrm>
           <a:prstGeom prst="rect">
@@ -5883,6 +6119,744 @@
 </p:sld>
 </file>
 
+<file path=ppt/slides/slide20.xml><?xml version="1.0" encoding="utf-8"?>
+<p:sld xmlns:a="http://schemas.openxmlformats.org/drawingml/2006/main" xmlns:p="http://schemas.openxmlformats.org/presentationml/2006/main" xmlns:r="http://schemas.openxmlformats.org/officeDocument/2006/relationships">
+  <p:cSld>
+    <p:spTree>
+      <p:nvGrpSpPr>
+        <p:cNvPr id="1" name=""/>
+        <p:cNvGrpSpPr/>
+        <p:nvPr/>
+      </p:nvGrpSpPr>
+      <p:grpSpPr/>
+      <p:sp>
+        <p:nvSpPr>
+          <p:cNvPr id="2" name="TextBox 1"/>
+          <p:cNvSpPr txBox="1"/>
+          <p:nvPr/>
+        </p:nvSpPr>
+        <p:spPr>
+          <a:xfrm>
+            <a:off x="411480" y="146304"/>
+            <a:ext cx="11155680" cy="658368"/>
+          </a:xfrm>
+          <a:prstGeom prst="rect">
+            <a:avLst/>
+          </a:prstGeom>
+          <a:noFill/>
+        </p:spPr>
+        <p:txBody>
+          <a:bodyPr wrap="none">
+            <a:spAutoFit/>
+          </a:bodyPr>
+          <a:lstStyle/>
+          <a:p>
+            <a:pPr algn="l"/>
+            <a:r>
+              <a:rPr sz="3400" b="1">
+                <a:solidFill>
+                  <a:srgbClr val="14284A"/>
+                </a:solidFill>
+              </a:rPr>
+              <a:t>Daily workflow your team can follow</a:t>
+            </a:r>
+          </a:p>
+        </p:txBody>
+      </p:sp>
+      <p:sp>
+        <p:nvSpPr>
+          <p:cNvPr id="3" name="TextBox 2"/>
+          <p:cNvSpPr txBox="1"/>
+          <p:nvPr/>
+        </p:nvSpPr>
+        <p:spPr>
+          <a:xfrm>
+            <a:off x="502920" y="1280160"/>
+            <a:ext cx="4937760" cy="5120640"/>
+          </a:xfrm>
+          <a:prstGeom prst="rect">
+            <a:avLst/>
+          </a:prstGeom>
+          <a:noFill/>
+        </p:spPr>
+        <p:txBody>
+          <a:bodyPr wrap="square">
+            <a:spAutoFit/>
+          </a:bodyPr>
+          <a:lstStyle/>
+          <a:p>
+            <a:pPr>
+              <a:spcAft>
+                <a:spcPts val="800"/>
+              </a:spcAft>
+              <a:defRPr sz="2100">
+                <a:solidFill>
+                  <a:srgbClr val="233554"/>
+                </a:solidFill>
+              </a:defRPr>
+            </a:pPr>
+            <a:r>
+              <a:t>Keep it simple:</a:t>
+            </a:r>
+          </a:p>
+          <a:p>
+            <a:pPr lvl="1">
+              <a:spcAft>
+                <a:spcPts val="800"/>
+              </a:spcAft>
+              <a:defRPr sz="1700">
+                <a:solidFill>
+                  <a:srgbClr val="233554"/>
+                </a:solidFill>
+              </a:defRPr>
+            </a:pPr>
+            <a:r>
+              <a:t>Morning plan -&gt; Build -&gt; Review -&gt; Close</a:t>
+            </a:r>
+          </a:p>
+          <a:p>
+            <a:pPr lvl="1">
+              <a:spcAft>
+                <a:spcPts val="800"/>
+              </a:spcAft>
+              <a:defRPr sz="1700">
+                <a:solidFill>
+                  <a:srgbClr val="233554"/>
+                </a:solidFill>
+              </a:defRPr>
+            </a:pPr>
+            <a:r>
+              <a:t>Save good prompts as team skills</a:t>
+            </a:r>
+          </a:p>
+          <a:p>
+            <a:pPr lvl="1">
+              <a:spcAft>
+                <a:spcPts val="800"/>
+              </a:spcAft>
+              <a:defRPr sz="1700">
+                <a:solidFill>
+                  <a:srgbClr val="233554"/>
+                </a:solidFill>
+              </a:defRPr>
+            </a:pPr>
+            <a:r>
+              <a:t>Do weekly quality review</a:t>
+            </a:r>
+          </a:p>
+        </p:txBody>
+      </p:sp>
+      <p:pic>
+        <p:nvPicPr>
+          <p:cNvPr id="4" name="Picture 3" descr="daily_workflow.png"/>
+          <p:cNvPicPr>
+            <a:picLocks noChangeAspect="1"/>
+          </p:cNvPicPr>
+          <p:nvPr/>
+        </p:nvPicPr>
+        <p:blipFill>
+          <a:blip r:embed="rId2"/>
+          <a:stretch>
+            <a:fillRect/>
+          </a:stretch>
+        </p:blipFill>
+        <p:spPr>
+          <a:xfrm>
+            <a:off x="5440680" y="1124712"/>
+            <a:ext cx="6537960" cy="3677602"/>
+          </a:xfrm>
+          <a:prstGeom prst="rect">
+            <a:avLst/>
+          </a:prstGeom>
+        </p:spPr>
+      </p:pic>
+    </p:spTree>
+  </p:cSld>
+  <p:clrMapOvr>
+    <a:masterClrMapping/>
+  </p:clrMapOvr>
+</p:sld>
+</file>
+
+<file path=ppt/slides/slide21.xml><?xml version="1.0" encoding="utf-8"?>
+<p:sld xmlns:a="http://schemas.openxmlformats.org/drawingml/2006/main" xmlns:p="http://schemas.openxmlformats.org/presentationml/2006/main" xmlns:r="http://schemas.openxmlformats.org/officeDocument/2006/relationships">
+  <p:cSld>
+    <p:spTree>
+      <p:nvGrpSpPr>
+        <p:cNvPr id="1" name=""/>
+        <p:cNvGrpSpPr/>
+        <p:nvPr/>
+      </p:nvGrpSpPr>
+      <p:grpSpPr/>
+      <p:sp>
+        <p:nvSpPr>
+          <p:cNvPr id="2" name="TextBox 1"/>
+          <p:cNvSpPr txBox="1"/>
+          <p:nvPr/>
+        </p:nvSpPr>
+        <p:spPr>
+          <a:xfrm>
+            <a:off x="411480" y="146304"/>
+            <a:ext cx="11155680" cy="658368"/>
+          </a:xfrm>
+          <a:prstGeom prst="rect">
+            <a:avLst/>
+          </a:prstGeom>
+          <a:noFill/>
+        </p:spPr>
+        <p:txBody>
+          <a:bodyPr wrap="none">
+            <a:spAutoFit/>
+          </a:bodyPr>
+          <a:lstStyle/>
+          <a:p>
+            <a:pPr algn="l"/>
+            <a:r>
+              <a:rPr sz="3400" b="1">
+                <a:solidFill>
+                  <a:srgbClr val="14284A"/>
+                </a:solidFill>
+              </a:rPr>
+              <a:t>Risk Management and Governance Controls (simple)</a:t>
+            </a:r>
+          </a:p>
+        </p:txBody>
+      </p:sp>
+      <p:sp>
+        <p:nvSpPr>
+          <p:cNvPr id="3" name="TextBox 2"/>
+          <p:cNvSpPr txBox="1"/>
+          <p:nvPr/>
+        </p:nvSpPr>
+        <p:spPr>
+          <a:xfrm>
+            <a:off x="502920" y="1280160"/>
+            <a:ext cx="4937760" cy="5120640"/>
+          </a:xfrm>
+          <a:prstGeom prst="rect">
+            <a:avLst/>
+          </a:prstGeom>
+          <a:noFill/>
+        </p:spPr>
+        <p:txBody>
+          <a:bodyPr wrap="square">
+            <a:spAutoFit/>
+          </a:bodyPr>
+          <a:lstStyle/>
+          <a:p>
+            <a:pPr>
+              <a:spcAft>
+                <a:spcPts val="800"/>
+              </a:spcAft>
+              <a:defRPr sz="2100">
+                <a:solidFill>
+                  <a:srgbClr val="233554"/>
+                </a:solidFill>
+              </a:defRPr>
+            </a:pPr>
+            <a:r>
+              <a:t>Four must-have controls:</a:t>
+            </a:r>
+          </a:p>
+          <a:p>
+            <a:pPr lvl="1">
+              <a:spcAft>
+                <a:spcPts val="800"/>
+              </a:spcAft>
+              <a:defRPr sz="1700">
+                <a:solidFill>
+                  <a:srgbClr val="233554"/>
+                </a:solidFill>
+              </a:defRPr>
+            </a:pPr>
+            <a:r>
+              <a:t>1) Low-access tokens</a:t>
+            </a:r>
+          </a:p>
+          <a:p>
+            <a:pPr lvl="1">
+              <a:spcAft>
+                <a:spcPts val="800"/>
+              </a:spcAft>
+              <a:defRPr sz="1700">
+                <a:solidFill>
+                  <a:srgbClr val="233554"/>
+                </a:solidFill>
+              </a:defRPr>
+            </a:pPr>
+            <a:r>
+              <a:t>2) Human approval for write actions</a:t>
+            </a:r>
+          </a:p>
+          <a:p>
+            <a:pPr lvl="1">
+              <a:spcAft>
+                <a:spcPts val="800"/>
+              </a:spcAft>
+              <a:defRPr sz="1700">
+                <a:solidFill>
+                  <a:srgbClr val="233554"/>
+                </a:solidFill>
+              </a:defRPr>
+            </a:pPr>
+            <a:r>
+              <a:t>3) Audit logs for every automation</a:t>
+            </a:r>
+          </a:p>
+          <a:p>
+            <a:pPr lvl="1">
+              <a:spcAft>
+                <a:spcPts val="800"/>
+              </a:spcAft>
+              <a:defRPr sz="1700">
+                <a:solidFill>
+                  <a:srgbClr val="233554"/>
+                </a:solidFill>
+              </a:defRPr>
+            </a:pPr>
+            <a:r>
+              <a:t>4) Weekly KPI and failure review</a:t>
+            </a:r>
+          </a:p>
+        </p:txBody>
+      </p:sp>
+      <p:pic>
+        <p:nvPicPr>
+          <p:cNvPr id="4" name="Picture 3" descr="risk_controls_simple.png"/>
+          <p:cNvPicPr>
+            <a:picLocks noChangeAspect="1"/>
+          </p:cNvPicPr>
+          <p:nvPr/>
+        </p:nvPicPr>
+        <p:blipFill>
+          <a:blip r:embed="rId2"/>
+          <a:stretch>
+            <a:fillRect/>
+          </a:stretch>
+        </p:blipFill>
+        <p:spPr>
+          <a:xfrm>
+            <a:off x="5440680" y="1124712"/>
+            <a:ext cx="6537960" cy="3677602"/>
+          </a:xfrm>
+          <a:prstGeom prst="rect">
+            <a:avLst/>
+          </a:prstGeom>
+        </p:spPr>
+      </p:pic>
+    </p:spTree>
+  </p:cSld>
+  <p:clrMapOvr>
+    <a:masterClrMapping/>
+  </p:clrMapOvr>
+</p:sld>
+</file>
+
+<file path=ppt/slides/slide22.xml><?xml version="1.0" encoding="utf-8"?>
+<p:sld xmlns:a="http://schemas.openxmlformats.org/drawingml/2006/main" xmlns:p="http://schemas.openxmlformats.org/presentationml/2006/main" xmlns:r="http://schemas.openxmlformats.org/officeDocument/2006/relationships">
+  <p:cSld>
+    <p:spTree>
+      <p:nvGrpSpPr>
+        <p:cNvPr id="1" name=""/>
+        <p:cNvGrpSpPr/>
+        <p:nvPr/>
+      </p:nvGrpSpPr>
+      <p:grpSpPr/>
+      <p:sp>
+        <p:nvSpPr>
+          <p:cNvPr id="2" name="TextBox 1"/>
+          <p:cNvSpPr txBox="1"/>
+          <p:nvPr/>
+        </p:nvSpPr>
+        <p:spPr>
+          <a:xfrm>
+            <a:off x="411480" y="146304"/>
+            <a:ext cx="11155680" cy="658368"/>
+          </a:xfrm>
+          <a:prstGeom prst="rect">
+            <a:avLst/>
+          </a:prstGeom>
+          <a:noFill/>
+        </p:spPr>
+        <p:txBody>
+          <a:bodyPr wrap="none">
+            <a:spAutoFit/>
+          </a:bodyPr>
+          <a:lstStyle/>
+          <a:p>
+            <a:pPr algn="l"/>
+            <a:r>
+              <a:rPr sz="3400" b="1">
+                <a:solidFill>
+                  <a:srgbClr val="14284A"/>
+                </a:solidFill>
+              </a:rPr>
+              <a:t>30-60-90 day adoption roadmap</a:t>
+            </a:r>
+          </a:p>
+        </p:txBody>
+      </p:sp>
+      <p:sp>
+        <p:nvSpPr>
+          <p:cNvPr id="3" name="TextBox 2"/>
+          <p:cNvSpPr txBox="1"/>
+          <p:nvPr/>
+        </p:nvSpPr>
+        <p:spPr>
+          <a:xfrm>
+            <a:off x="502920" y="1280160"/>
+            <a:ext cx="4937760" cy="5120640"/>
+          </a:xfrm>
+          <a:prstGeom prst="rect">
+            <a:avLst/>
+          </a:prstGeom>
+          <a:noFill/>
+        </p:spPr>
+        <p:txBody>
+          <a:bodyPr wrap="square">
+            <a:spAutoFit/>
+          </a:bodyPr>
+          <a:lstStyle/>
+          <a:p>
+            <a:pPr>
+              <a:spcAft>
+                <a:spcPts val="800"/>
+              </a:spcAft>
+              <a:defRPr sz="2100">
+                <a:solidFill>
+                  <a:srgbClr val="233554"/>
+                </a:solidFill>
+              </a:defRPr>
+            </a:pPr>
+            <a:r>
+              <a:t>0-30 days: connect tools and train first squad.</a:t>
+            </a:r>
+          </a:p>
+          <a:p>
+            <a:pPr>
+              <a:spcAft>
+                <a:spcPts val="800"/>
+              </a:spcAft>
+              <a:defRPr sz="2100">
+                <a:solidFill>
+                  <a:srgbClr val="233554"/>
+                </a:solidFill>
+              </a:defRPr>
+            </a:pPr>
+            <a:r>
+              <a:t>31-60 days: publish top skills and run office hours.</a:t>
+            </a:r>
+          </a:p>
+          <a:p>
+            <a:pPr>
+              <a:spcAft>
+                <a:spcPts val="800"/>
+              </a:spcAft>
+              <a:defRPr sz="2100">
+                <a:solidFill>
+                  <a:srgbClr val="233554"/>
+                </a:solidFill>
+              </a:defRPr>
+            </a:pPr>
+            <a:r>
+              <a:t>61-90 days: scale to more teams and report KPI impact.</a:t>
+            </a:r>
+          </a:p>
+          <a:p>
+            <a:pPr>
+              <a:spcAft>
+                <a:spcPts val="800"/>
+              </a:spcAft>
+              <a:defRPr sz="2100">
+                <a:solidFill>
+                  <a:srgbClr val="233554"/>
+                </a:solidFill>
+              </a:defRPr>
+            </a:pPr>
+            <a:r>
+              <a:t>Target: 20% faster delivery with safe controls.</a:t>
+            </a:r>
+          </a:p>
+        </p:txBody>
+      </p:sp>
+      <p:pic>
+        <p:nvPicPr>
+          <p:cNvPr id="4" name="Picture 3" descr="roadmap_30_60_90.png"/>
+          <p:cNvPicPr>
+            <a:picLocks noChangeAspect="1"/>
+          </p:cNvPicPr>
+          <p:nvPr/>
+        </p:nvPicPr>
+        <p:blipFill>
+          <a:blip r:embed="rId2"/>
+          <a:stretch>
+            <a:fillRect/>
+          </a:stretch>
+        </p:blipFill>
+        <p:spPr>
+          <a:xfrm>
+            <a:off x="5440680" y="1124712"/>
+            <a:ext cx="6537960" cy="3677602"/>
+          </a:xfrm>
+          <a:prstGeom prst="rect">
+            <a:avLst/>
+          </a:prstGeom>
+        </p:spPr>
+      </p:pic>
+    </p:spTree>
+  </p:cSld>
+  <p:clrMapOvr>
+    <a:masterClrMapping/>
+  </p:clrMapOvr>
+</p:sld>
+</file>
+
+<file path=ppt/slides/slide23.xml><?xml version="1.0" encoding="utf-8"?>
+<p:sld xmlns:a="http://schemas.openxmlformats.org/drawingml/2006/main" xmlns:p="http://schemas.openxmlformats.org/presentationml/2006/main" xmlns:r="http://schemas.openxmlformats.org/officeDocument/2006/relationships">
+  <p:cSld>
+    <p:spTree>
+      <p:nvGrpSpPr>
+        <p:cNvPr id="1" name=""/>
+        <p:cNvGrpSpPr/>
+        <p:nvPr/>
+      </p:nvGrpSpPr>
+      <p:grpSpPr/>
+      <p:sp>
+        <p:nvSpPr>
+          <p:cNvPr id="2" name="TextBox 1"/>
+          <p:cNvSpPr txBox="1"/>
+          <p:nvPr/>
+        </p:nvSpPr>
+        <p:spPr>
+          <a:xfrm>
+            <a:off x="411480" y="146304"/>
+            <a:ext cx="11155680" cy="658368"/>
+          </a:xfrm>
+          <a:prstGeom prst="rect">
+            <a:avLst/>
+          </a:prstGeom>
+          <a:noFill/>
+        </p:spPr>
+        <p:txBody>
+          <a:bodyPr wrap="none">
+            <a:spAutoFit/>
+          </a:bodyPr>
+          <a:lstStyle/>
+          <a:p>
+            <a:pPr algn="l"/>
+            <a:r>
+              <a:rPr sz="3400" b="1">
+                <a:solidFill>
+                  <a:srgbClr val="14284A"/>
+                </a:solidFill>
+              </a:rPr>
+              <a:t>Final checklist for trainer and team</a:t>
+            </a:r>
+          </a:p>
+        </p:txBody>
+      </p:sp>
+      <p:sp>
+        <p:nvSpPr>
+          <p:cNvPr id="3" name="TextBox 2"/>
+          <p:cNvSpPr txBox="1"/>
+          <p:nvPr/>
+        </p:nvSpPr>
+        <p:spPr>
+          <a:xfrm>
+            <a:off x="822960" y="1417320"/>
+            <a:ext cx="4754880" cy="5303520"/>
+          </a:xfrm>
+          <a:prstGeom prst="rect">
+            <a:avLst/>
+          </a:prstGeom>
+          <a:noFill/>
+        </p:spPr>
+        <p:txBody>
+          <a:bodyPr wrap="square">
+            <a:spAutoFit/>
+          </a:bodyPr>
+          <a:lstStyle/>
+          <a:p>
+            <a:pPr>
+              <a:spcAft>
+                <a:spcPts val="800"/>
+              </a:spcAft>
+              <a:defRPr sz="2100">
+                <a:solidFill>
+                  <a:srgbClr val="233554"/>
+                </a:solidFill>
+              </a:defRPr>
+            </a:pPr>
+            <a:r>
+              <a:t>Before session:</a:t>
+            </a:r>
+          </a:p>
+          <a:p>
+            <a:pPr lvl="1">
+              <a:spcAft>
+                <a:spcPts val="800"/>
+              </a:spcAft>
+              <a:defRPr sz="1700">
+                <a:solidFill>
+                  <a:srgbClr val="233554"/>
+                </a:solidFill>
+              </a:defRPr>
+            </a:pPr>
+            <a:r>
+              <a:t>Tokens ready and mcp.json template prepared</a:t>
+            </a:r>
+          </a:p>
+          <a:p>
+            <a:pPr lvl="1">
+              <a:spcAft>
+                <a:spcPts val="800"/>
+              </a:spcAft>
+              <a:defRPr sz="1700">
+                <a:solidFill>
+                  <a:srgbClr val="233554"/>
+                </a:solidFill>
+              </a:defRPr>
+            </a:pPr>
+            <a:r>
+              <a:t>Pilot repo, Jira project, and Figma file selected</a:t>
+            </a:r>
+          </a:p>
+          <a:p>
+            <a:pPr>
+              <a:spcAft>
+                <a:spcPts val="800"/>
+              </a:spcAft>
+              <a:defRPr sz="2100">
+                <a:solidFill>
+                  <a:srgbClr val="233554"/>
+                </a:solidFill>
+              </a:defRPr>
+            </a:pPr>
+            <a:r>
+              <a:t>During session:</a:t>
+            </a:r>
+          </a:p>
+          <a:p>
+            <a:pPr lvl="1">
+              <a:spcAft>
+                <a:spcPts val="800"/>
+              </a:spcAft>
+              <a:defRPr sz="1700">
+                <a:solidFill>
+                  <a:srgbClr val="233554"/>
+                </a:solidFill>
+              </a:defRPr>
+            </a:pPr>
+            <a:r>
+              <a:t>Everyone completes one end-to-end workflow</a:t>
+            </a:r>
+          </a:p>
+          <a:p>
+            <a:pPr lvl="1">
+              <a:spcAft>
+                <a:spcPts val="800"/>
+              </a:spcAft>
+              <a:defRPr sz="1700">
+                <a:solidFill>
+                  <a:srgbClr val="233554"/>
+                </a:solidFill>
+              </a:defRPr>
+            </a:pPr>
+            <a:r>
+              <a:t>Everyone creates at least one simple skill</a:t>
+            </a:r>
+          </a:p>
+          <a:p>
+            <a:pPr>
+              <a:spcAft>
+                <a:spcPts val="800"/>
+              </a:spcAft>
+              <a:defRPr sz="2100">
+                <a:solidFill>
+                  <a:srgbClr val="233554"/>
+                </a:solidFill>
+              </a:defRPr>
+            </a:pPr>
+            <a:r>
+              <a:t>After session:</a:t>
+            </a:r>
+          </a:p>
+          <a:p>
+            <a:pPr lvl="1">
+              <a:spcAft>
+                <a:spcPts val="800"/>
+              </a:spcAft>
+              <a:defRPr sz="1700">
+                <a:solidFill>
+                  <a:srgbClr val="233554"/>
+                </a:solidFill>
+              </a:defRPr>
+            </a:pPr>
+            <a:r>
+              <a:t>Review KPIs and improve weak prompts weekly</a:t>
+            </a:r>
+          </a:p>
+          <a:p>
+            <a:pPr>
+              <a:spcAft>
+                <a:spcPts val="800"/>
+              </a:spcAft>
+              <a:defRPr sz="2100">
+                <a:solidFill>
+                  <a:srgbClr val="233554"/>
+                </a:solidFill>
+              </a:defRPr>
+            </a:pPr>
+          </a:p>
+          <a:p>
+            <a:pPr>
+              <a:spcAft>
+                <a:spcPts val="800"/>
+              </a:spcAft>
+              <a:defRPr sz="2100">
+                <a:solidFill>
+                  <a:srgbClr val="233554"/>
+                </a:solidFill>
+              </a:defRPr>
+            </a:pPr>
+            <a:r>
+              <a:t>Q&amp;A</a:t>
+            </a:r>
+          </a:p>
+        </p:txBody>
+      </p:sp>
+      <p:pic>
+        <p:nvPicPr>
+          <p:cNvPr id="4" name="Picture 3" descr="cover_visual.png"/>
+          <p:cNvPicPr>
+            <a:picLocks noChangeAspect="1"/>
+          </p:cNvPicPr>
+          <p:nvPr/>
+        </p:nvPicPr>
+        <p:blipFill>
+          <a:blip r:embed="rId2"/>
+          <a:stretch>
+            <a:fillRect/>
+          </a:stretch>
+        </p:blipFill>
+        <p:spPr>
+          <a:xfrm>
+            <a:off x="5440680" y="1115568"/>
+            <a:ext cx="6537960" cy="3677602"/>
+          </a:xfrm>
+          <a:prstGeom prst="rect">
+            <a:avLst/>
+          </a:prstGeom>
+        </p:spPr>
+      </p:pic>
+    </p:spTree>
+  </p:cSld>
+  <p:clrMapOvr>
+    <a:masterClrMapping/>
+  </p:clrMapOvr>
+</p:sld>
+</file>
+
 <file path=ppt/slides/slide3.xml><?xml version="1.0" encoding="utf-8"?>
 <p:sld xmlns:a="http://schemas.openxmlformats.org/drawingml/2006/main" xmlns:p="http://schemas.openxmlformats.org/presentationml/2006/main" xmlns:r="http://schemas.openxmlformats.org/officeDocument/2006/relationships">
   <p:cSld>
@@ -5990,7 +6964,7 @@
               </a:defRPr>
             </a:pPr>
             <a:r>
-              <a:t>Part C: Step-by-step Cursor setup tutorial</a:t>
+              <a:t>Part C: Prompt formula + Do/Don't quick guide</a:t>
             </a:r>
           </a:p>
           <a:p>
@@ -6005,7 +6979,7 @@
               </a:defRPr>
             </a:pPr>
             <a:r>
-              <a:t>Part D: Daily workflow your team can follow</a:t>
+              <a:t>Part D: Step-by-step Cursor setup tutorial</a:t>
             </a:r>
           </a:p>
           <a:p>
@@ -6020,7 +6994,22 @@
               </a:defRPr>
             </a:pPr>
             <a:r>
-              <a:t>Part E: Risk controls + 30-60-90 rollout plan</a:t>
+              <a:t>Part E: Common errors and quick fixes</a:t>
+            </a:r>
+          </a:p>
+          <a:p>
+            <a:pPr>
+              <a:spcAft>
+                <a:spcPts val="800"/>
+              </a:spcAft>
+              <a:defRPr sz="2500">
+                <a:solidFill>
+                  <a:srgbClr val="233554"/>
+                </a:solidFill>
+              </a:defRPr>
+            </a:pPr>
+            <a:r>
+              <a:t>Part F: Daily routine + risk controls + roadmap</a:t>
             </a:r>
           </a:p>
         </p:txBody>
@@ -6639,7 +7628,7 @@
                   <a:srgbClr val="14284A"/>
                 </a:solidFill>
               </a:rPr>
-              <a:t>Tutorial map: follow these 8 steps</a:t>
+              <a:t>Prompt formula cheat sheet</a:t>
             </a:r>
           </a:p>
         </p:txBody>
@@ -6677,7 +7666,7 @@
               </a:defRPr>
             </a:pPr>
             <a:r>
-              <a:t>Trainer flow for one session (about 90 minutes):</a:t>
+              <a:t>Use this every time:</a:t>
             </a:r>
           </a:p>
           <a:p>
@@ -6692,7 +7681,7 @@
               </a:defRPr>
             </a:pPr>
             <a:r>
-              <a:t>10 min demo + 25 min pair lab + 15 min review</a:t>
+              <a:t>Context: where and what</a:t>
             </a:r>
           </a:p>
           <a:p>
@@ -6707,7 +7696,7 @@
               </a:defRPr>
             </a:pPr>
             <a:r>
-              <a:t>Repeat for Jira, Figma, and Bitbucket</a:t>
+              <a:t>Task: what output you need</a:t>
             </a:r>
           </a:p>
           <a:p>
@@ -6722,14 +7711,29 @@
               </a:defRPr>
             </a:pPr>
             <a:r>
-              <a:t>End with one reusable skill per developer</a:t>
+              <a:t>Constraints: limits and rules</a:t>
+            </a:r>
+          </a:p>
+          <a:p>
+            <a:pPr lvl="1">
+              <a:spcAft>
+                <a:spcPts val="800"/>
+              </a:spcAft>
+              <a:defRPr sz="1700">
+                <a:solidFill>
+                  <a:srgbClr val="233554"/>
+                </a:solidFill>
+              </a:defRPr>
+            </a:pPr>
+            <a:r>
+              <a:t>Output format: bullet/table/json</a:t>
             </a:r>
           </a:p>
         </p:txBody>
       </p:sp>
       <p:pic>
         <p:nvPicPr>
-          <p:cNvPr id="4" name="Picture 3" descr="tutorial_path.png"/>
+          <p:cNvPr id="4" name="Picture 3" descr="prompt_formula.png"/>
           <p:cNvPicPr>
             <a:picLocks noChangeAspect="1"/>
           </p:cNvPicPr>
@@ -6798,392 +7802,133 @@
                   <a:srgbClr val="14284A"/>
                 </a:solidFill>
               </a:rPr>
-              <a:t>Step 1: Prepare local machine (copy and run)</a:t>
-            </a:r>
-          </a:p>
-        </p:txBody>
-      </p:sp>
-      <p:sp>
-        <p:nvSpPr>
-          <p:cNvPr id="3" name="Rounded Rectangle 2"/>
-          <p:cNvSpPr/>
+              <a:t>Do and Don't (simple rules)</a:t>
+            </a:r>
+          </a:p>
+        </p:txBody>
+      </p:sp>
+      <p:sp>
+        <p:nvSpPr>
+          <p:cNvPr id="3" name="TextBox 2"/>
+          <p:cNvSpPr txBox="1"/>
           <p:nvPr/>
         </p:nvSpPr>
         <p:spPr>
           <a:xfrm>
-            <a:off x="502920" y="1417320"/>
-            <a:ext cx="11155680" cy="5303520"/>
-          </a:xfrm>
-          <a:prstGeom prst="roundRect">
+            <a:off x="502920" y="1280160"/>
+            <a:ext cx="4937760" cy="5120640"/>
+          </a:xfrm>
+          <a:prstGeom prst="rect">
             <a:avLst/>
           </a:prstGeom>
-          <a:solidFill>
-            <a:srgbClr val="161F31"/>
-          </a:solidFill>
-          <a:ln>
-            <a:solidFill>
-              <a:srgbClr val="161F31"/>
-            </a:solidFill>
-          </a:ln>
-        </p:spPr>
-        <p:style>
-          <a:lnRef idx="1">
-            <a:schemeClr val="accent1"/>
-          </a:lnRef>
-          <a:fillRef idx="3">
-            <a:schemeClr val="accent1"/>
-          </a:fillRef>
-          <a:effectRef idx="2">
-            <a:schemeClr val="accent1"/>
-          </a:effectRef>
-          <a:fontRef idx="minor">
-            <a:schemeClr val="lt1"/>
-          </a:fontRef>
-        </p:style>
-        <p:txBody>
-          <a:bodyPr rtlCol="0" anchor="ctr" wrap="square"/>
-          <a:lstStyle/>
-          <a:p>
-            <a:pPr algn="ctr">
-              <a:spcBef>
-                <a:spcPts val="0"/>
-              </a:spcBef>
-              <a:spcAft>
-                <a:spcPts val="100"/>
-              </a:spcAft>
-              <a:defRPr sz="1400">
-                <a:solidFill>
-                  <a:srgbClr val="E4ECFC"/>
-                </a:solidFill>
-                <a:latin typeface="DejaVu Sans Mono"/>
-              </a:defRPr>
-            </a:pPr>
-            <a:r>
-              <a:t>mkdir -p ~/cursor-mcp-training/{servers,skills,logs} &amp;&amp; cd ~/cursor-mcp-training</a:t>
-            </a:r>
-          </a:p>
-          <a:p>
-            <a:pPr>
-              <a:spcBef>
-                <a:spcPts val="0"/>
-              </a:spcBef>
-              <a:spcAft>
-                <a:spcPts val="100"/>
-              </a:spcAft>
-              <a:defRPr sz="1400">
-                <a:solidFill>
-                  <a:srgbClr val="E4ECFC"/>
-                </a:solidFill>
-                <a:latin typeface="DejaVu Sans Mono"/>
-              </a:defRPr>
-            </a:pPr>
-            <a:r>
-              <a:t>python3 -m venv .venv</a:t>
-            </a:r>
-          </a:p>
-          <a:p>
-            <a:pPr>
-              <a:spcBef>
-                <a:spcPts val="0"/>
-              </a:spcBef>
-              <a:spcAft>
-                <a:spcPts val="100"/>
-              </a:spcAft>
-              <a:defRPr sz="1400">
-                <a:solidFill>
-                  <a:srgbClr val="E4ECFC"/>
-                </a:solidFill>
-                <a:latin typeface="DejaVu Sans Mono"/>
-              </a:defRPr>
-            </a:pPr>
-            <a:r>
-              <a:t>source .venv/bin/activate</a:t>
-            </a:r>
-          </a:p>
-          <a:p>
-            <a:pPr>
-              <a:spcBef>
-                <a:spcPts val="0"/>
-              </a:spcBef>
-              <a:spcAft>
-                <a:spcPts val="100"/>
-              </a:spcAft>
-              <a:defRPr sz="1400">
-                <a:solidFill>
-                  <a:srgbClr val="E4ECFC"/>
-                </a:solidFill>
-                <a:latin typeface="DejaVu Sans Mono"/>
-              </a:defRPr>
-            </a:pPr>
-            <a:r>
-              <a:t>python -m pip install --upgrade pip</a:t>
-            </a:r>
-          </a:p>
-          <a:p>
-            <a:pPr>
-              <a:spcBef>
-                <a:spcPts val="0"/>
-              </a:spcBef>
-              <a:spcAft>
-                <a:spcPts val="100"/>
-              </a:spcAft>
-              <a:defRPr sz="1400">
-                <a:solidFill>
-                  <a:srgbClr val="E4ECFC"/>
-                </a:solidFill>
-                <a:latin typeface="DejaVu Sans Mono"/>
-              </a:defRPr>
-            </a:pPr>
-            <a:r>
-              <a:t>pip install mcp httpx python-dotenv pyyaml</a:t>
-            </a:r>
-          </a:p>
-          <a:p>
-            <a:pPr>
-              <a:spcBef>
-                <a:spcPts val="0"/>
-              </a:spcBef>
-              <a:spcAft>
-                <a:spcPts val="100"/>
-              </a:spcAft>
-              <a:defRPr sz="1400">
-                <a:solidFill>
-                  <a:srgbClr val="E4ECFC"/>
-                </a:solidFill>
-                <a:latin typeface="DejaVu Sans Mono"/>
-              </a:defRPr>
-            </a:pPr>
-            <a:r>
-              <a:t>python --version &amp;&amp; node --version &amp;&amp; npm --version</a:t>
-            </a:r>
-          </a:p>
-          <a:p>
-            <a:pPr>
-              <a:spcBef>
-                <a:spcPts val="0"/>
-              </a:spcBef>
-              <a:spcAft>
-                <a:spcPts val="100"/>
-              </a:spcAft>
-              <a:defRPr sz="1400">
-                <a:solidFill>
-                  <a:srgbClr val="E4ECFC"/>
-                </a:solidFill>
-                <a:latin typeface="DejaVu Sans Mono"/>
-              </a:defRPr>
-            </a:pPr>
-            <a:r>
-              <a:t>sudo apt-get update &amp;&amp; sudo apt-get install -y jq</a:t>
-            </a:r>
-          </a:p>
-          <a:p>
-            <a:pPr>
-              <a:spcBef>
-                <a:spcPts val="0"/>
-              </a:spcBef>
-              <a:spcAft>
-                <a:spcPts val="100"/>
-              </a:spcAft>
-              <a:defRPr sz="1400">
-                <a:solidFill>
-                  <a:srgbClr val="E4ECFC"/>
-                </a:solidFill>
-                <a:latin typeface="DejaVu Sans Mono"/>
-              </a:defRPr>
-            </a:pPr>
-          </a:p>
-          <a:p>
-            <a:pPr>
-              <a:spcBef>
-                <a:spcPts val="0"/>
-              </a:spcBef>
-              <a:spcAft>
-                <a:spcPts val="100"/>
-              </a:spcAft>
-              <a:defRPr sz="1400">
-                <a:solidFill>
-                  <a:srgbClr val="E4ECFC"/>
-                </a:solidFill>
-                <a:latin typeface="DejaVu Sans Mono"/>
-              </a:defRPr>
-            </a:pPr>
-            <a:r>
-              <a:t># Create environment file for tokens</a:t>
-            </a:r>
-          </a:p>
-          <a:p>
-            <a:pPr>
-              <a:spcBef>
-                <a:spcPts val="0"/>
-              </a:spcBef>
-              <a:spcAft>
-                <a:spcPts val="100"/>
-              </a:spcAft>
-              <a:defRPr sz="1400">
-                <a:solidFill>
-                  <a:srgbClr val="E4ECFC"/>
-                </a:solidFill>
-                <a:latin typeface="DejaVu Sans Mono"/>
-              </a:defRPr>
-            </a:pPr>
-            <a:r>
-              <a:t>cat &gt; .env &lt;&lt;'EOF'</a:t>
-            </a:r>
-          </a:p>
-          <a:p>
-            <a:pPr>
-              <a:spcBef>
-                <a:spcPts val="0"/>
-              </a:spcBef>
-              <a:spcAft>
-                <a:spcPts val="100"/>
-              </a:spcAft>
-              <a:defRPr sz="1400">
-                <a:solidFill>
-                  <a:srgbClr val="E4ECFC"/>
-                </a:solidFill>
-                <a:latin typeface="DejaVu Sans Mono"/>
-              </a:defRPr>
-            </a:pPr>
-            <a:r>
-              <a:t>JIRA_BASE_URL=https://your-company.atlassian.net</a:t>
-            </a:r>
-          </a:p>
-          <a:p>
-            <a:pPr>
-              <a:spcBef>
-                <a:spcPts val="0"/>
-              </a:spcBef>
-              <a:spcAft>
-                <a:spcPts val="100"/>
-              </a:spcAft>
-              <a:defRPr sz="1400">
-                <a:solidFill>
-                  <a:srgbClr val="E4ECFC"/>
-                </a:solidFill>
-                <a:latin typeface="DejaVu Sans Mono"/>
-              </a:defRPr>
-            </a:pPr>
-            <a:r>
-              <a:t>JIRA_EMAIL=you@company.com</a:t>
-            </a:r>
-          </a:p>
-          <a:p>
-            <a:pPr>
-              <a:spcBef>
-                <a:spcPts val="0"/>
-              </a:spcBef>
-              <a:spcAft>
-                <a:spcPts val="100"/>
-              </a:spcAft>
-              <a:defRPr sz="1400">
-                <a:solidFill>
-                  <a:srgbClr val="E4ECFC"/>
-                </a:solidFill>
-                <a:latin typeface="DejaVu Sans Mono"/>
-              </a:defRPr>
-            </a:pPr>
-            <a:r>
-              <a:t>JIRA_API_TOKEN=&lt;jira_token&gt;</a:t>
-            </a:r>
-          </a:p>
-          <a:p>
-            <a:pPr>
-              <a:spcBef>
-                <a:spcPts val="0"/>
-              </a:spcBef>
-              <a:spcAft>
-                <a:spcPts val="100"/>
-              </a:spcAft>
-              <a:defRPr sz="1400">
-                <a:solidFill>
-                  <a:srgbClr val="E4ECFC"/>
-                </a:solidFill>
-                <a:latin typeface="DejaVu Sans Mono"/>
-              </a:defRPr>
-            </a:pPr>
-            <a:r>
-              <a:t>FIGMA_TOKEN=&lt;figma_token&gt;</a:t>
-            </a:r>
-          </a:p>
-          <a:p>
-            <a:pPr>
-              <a:spcBef>
-                <a:spcPts val="0"/>
-              </a:spcBef>
-              <a:spcAft>
-                <a:spcPts val="100"/>
-              </a:spcAft>
-              <a:defRPr sz="1400">
-                <a:solidFill>
-                  <a:srgbClr val="E4ECFC"/>
-                </a:solidFill>
-                <a:latin typeface="DejaVu Sans Mono"/>
-              </a:defRPr>
-            </a:pPr>
-            <a:r>
-              <a:t>BITBUCKET_WORKSPACE=&lt;workspace&gt;</a:t>
-            </a:r>
-          </a:p>
-          <a:p>
-            <a:pPr>
-              <a:spcBef>
-                <a:spcPts val="0"/>
-              </a:spcBef>
-              <a:spcAft>
-                <a:spcPts val="100"/>
-              </a:spcAft>
-              <a:defRPr sz="1400">
-                <a:solidFill>
-                  <a:srgbClr val="E4ECFC"/>
-                </a:solidFill>
-                <a:latin typeface="DejaVu Sans Mono"/>
-              </a:defRPr>
-            </a:pPr>
-            <a:r>
-              <a:t>BITBUCKET_USERNAME=&lt;username&gt;</a:t>
-            </a:r>
-          </a:p>
-          <a:p>
-            <a:pPr>
-              <a:spcBef>
-                <a:spcPts val="0"/>
-              </a:spcBef>
-              <a:spcAft>
-                <a:spcPts val="100"/>
-              </a:spcAft>
-              <a:defRPr sz="1400">
-                <a:solidFill>
-                  <a:srgbClr val="E4ECFC"/>
-                </a:solidFill>
-                <a:latin typeface="DejaVu Sans Mono"/>
-              </a:defRPr>
-            </a:pPr>
-            <a:r>
-              <a:t>BITBUCKET_APP_PASSWORD=&lt;app_password&gt;</a:t>
-            </a:r>
-          </a:p>
-          <a:p>
-            <a:pPr>
-              <a:spcBef>
-                <a:spcPts val="0"/>
-              </a:spcBef>
-              <a:spcAft>
-                <a:spcPts val="100"/>
-              </a:spcAft>
-              <a:defRPr sz="1400">
-                <a:solidFill>
-                  <a:srgbClr val="E4ECFC"/>
-                </a:solidFill>
-                <a:latin typeface="DejaVu Sans Mono"/>
-              </a:defRPr>
-            </a:pPr>
-            <a:r>
-              <a:t>EOF</a:t>
-            </a:r>
-          </a:p>
-        </p:txBody>
-      </p:sp>
+          <a:noFill/>
+        </p:spPr>
+        <p:txBody>
+          <a:bodyPr wrap="square">
+            <a:spAutoFit/>
+          </a:bodyPr>
+          <a:lstStyle/>
+          <a:p>
+            <a:pPr>
+              <a:spcAft>
+                <a:spcPts val="800"/>
+              </a:spcAft>
+              <a:defRPr sz="2100">
+                <a:solidFill>
+                  <a:srgbClr val="233554"/>
+                </a:solidFill>
+              </a:defRPr>
+            </a:pPr>
+            <a:r>
+              <a:t>Use this for new team members:</a:t>
+            </a:r>
+          </a:p>
+          <a:p>
+            <a:pPr lvl="1">
+              <a:spcAft>
+                <a:spcPts val="800"/>
+              </a:spcAft>
+              <a:defRPr sz="1700">
+                <a:solidFill>
+                  <a:srgbClr val="233554"/>
+                </a:solidFill>
+              </a:defRPr>
+            </a:pPr>
+            <a:r>
+              <a:t>Do: read-only first, then safe write with approval</a:t>
+            </a:r>
+          </a:p>
+          <a:p>
+            <a:pPr lvl="1">
+              <a:spcAft>
+                <a:spcPts val="800"/>
+              </a:spcAft>
+              <a:defRPr sz="1700">
+                <a:solidFill>
+                  <a:srgbClr val="233554"/>
+                </a:solidFill>
+              </a:defRPr>
+            </a:pPr>
+            <a:r>
+              <a:t>Do: save good prompts as skills</a:t>
+            </a:r>
+          </a:p>
+          <a:p>
+            <a:pPr lvl="1">
+              <a:spcAft>
+                <a:spcPts val="800"/>
+              </a:spcAft>
+              <a:defRPr sz="1700">
+                <a:solidFill>
+                  <a:srgbClr val="233554"/>
+                </a:solidFill>
+              </a:defRPr>
+            </a:pPr>
+            <a:r>
+              <a:t>Don't: use admin tokens</a:t>
+            </a:r>
+          </a:p>
+          <a:p>
+            <a:pPr lvl="1">
+              <a:spcAft>
+                <a:spcPts val="800"/>
+              </a:spcAft>
+              <a:defRPr sz="1700">
+                <a:solidFill>
+                  <a:srgbClr val="233554"/>
+                </a:solidFill>
+              </a:defRPr>
+            </a:pPr>
+            <a:r>
+              <a:t>Don't: auto-merge without review</a:t>
+            </a:r>
+          </a:p>
+        </p:txBody>
+      </p:sp>
+      <p:pic>
+        <p:nvPicPr>
+          <p:cNvPr id="4" name="Picture 3" descr="do_dont.png"/>
+          <p:cNvPicPr>
+            <a:picLocks noChangeAspect="1"/>
+          </p:cNvPicPr>
+          <p:nvPr/>
+        </p:nvPicPr>
+        <p:blipFill>
+          <a:blip r:embed="rId2"/>
+          <a:stretch>
+            <a:fillRect/>
+          </a:stretch>
+        </p:blipFill>
+        <p:spPr>
+          <a:xfrm>
+            <a:off x="5440680" y="1124712"/>
+            <a:ext cx="6537960" cy="3677602"/>
+          </a:xfrm>
+          <a:prstGeom prst="rect">
+            <a:avLst/>
+          </a:prstGeom>
+        </p:spPr>
+      </p:pic>
     </p:spTree>
   </p:cSld>
   <p:clrMapOvr>
@@ -7231,7 +7976,7 @@
                   <a:srgbClr val="14284A"/>
                 </a:solidFill>
               </a:rPr>
-              <a:t>Step 2: Open Cursor settings and go to MCP</a:t>
+              <a:t>Tutorial map: follow these 8 steps</a:t>
             </a:r>
           </a:p>
         </p:txBody>
@@ -7244,8 +7989,8 @@
         </p:nvSpPr>
         <p:spPr>
           <a:xfrm>
-            <a:off x="502920" y="1417320"/>
-            <a:ext cx="4389120" cy="5029200"/>
+            <a:off x="502920" y="1280160"/>
+            <a:ext cx="4937760" cy="5120640"/>
           </a:xfrm>
           <a:prstGeom prst="rect">
             <a:avLst/>
@@ -7262,81 +8007,66 @@
               <a:spcAft>
                 <a:spcPts val="800"/>
               </a:spcAft>
-              <a:defRPr sz="2500">
-                <a:solidFill>
-                  <a:srgbClr val="233554"/>
-                </a:solidFill>
-              </a:defRPr>
-            </a:pPr>
-            <a:r>
-              <a:t>Click Settings in Cursor.</a:t>
-            </a:r>
-          </a:p>
-          <a:p>
-            <a:pPr>
-              <a:spcAft>
-                <a:spcPts val="800"/>
-              </a:spcAft>
-              <a:defRPr sz="2500">
-                <a:solidFill>
-                  <a:srgbClr val="233554"/>
-                </a:solidFill>
-              </a:defRPr>
-            </a:pPr>
-            <a:r>
-              <a:t>Open Features tab.</a:t>
-            </a:r>
-          </a:p>
-          <a:p>
-            <a:pPr>
-              <a:spcAft>
-                <a:spcPts val="800"/>
-              </a:spcAft>
-              <a:defRPr sz="2500">
-                <a:solidFill>
-                  <a:srgbClr val="233554"/>
-                </a:solidFill>
-              </a:defRPr>
-            </a:pPr>
-            <a:r>
-              <a:t>Open MCP section.</a:t>
-            </a:r>
-          </a:p>
-          <a:p>
-            <a:pPr>
-              <a:spcAft>
-                <a:spcPts val="800"/>
-              </a:spcAft>
-              <a:defRPr sz="2500">
-                <a:solidFill>
-                  <a:srgbClr val="233554"/>
-                </a:solidFill>
-              </a:defRPr>
-            </a:pPr>
-            <a:r>
-              <a:t>Turn MCP ON.</a:t>
-            </a:r>
-          </a:p>
-          <a:p>
-            <a:pPr>
-              <a:spcAft>
-                <a:spcPts val="800"/>
-              </a:spcAft>
-              <a:defRPr sz="2500">
-                <a:solidFill>
-                  <a:srgbClr val="233554"/>
-                </a:solidFill>
-              </a:defRPr>
-            </a:pPr>
-            <a:r>
-              <a:t>Click Open mcp.json.</a:t>
+              <a:defRPr sz="2100">
+                <a:solidFill>
+                  <a:srgbClr val="233554"/>
+                </a:solidFill>
+              </a:defRPr>
+            </a:pPr>
+            <a:r>
+              <a:t>Trainer flow for one session (about 90 minutes):</a:t>
+            </a:r>
+          </a:p>
+          <a:p>
+            <a:pPr lvl="1">
+              <a:spcAft>
+                <a:spcPts val="800"/>
+              </a:spcAft>
+              <a:defRPr sz="1700">
+                <a:solidFill>
+                  <a:srgbClr val="233554"/>
+                </a:solidFill>
+              </a:defRPr>
+            </a:pPr>
+            <a:r>
+              <a:t>10 min demo + 25 min pair lab + 15 min review</a:t>
+            </a:r>
+          </a:p>
+          <a:p>
+            <a:pPr lvl="1">
+              <a:spcAft>
+                <a:spcPts val="800"/>
+              </a:spcAft>
+              <a:defRPr sz="1700">
+                <a:solidFill>
+                  <a:srgbClr val="233554"/>
+                </a:solidFill>
+              </a:defRPr>
+            </a:pPr>
+            <a:r>
+              <a:t>Repeat for Jira, Figma, and Bitbucket</a:t>
+            </a:r>
+          </a:p>
+          <a:p>
+            <a:pPr lvl="1">
+              <a:spcAft>
+                <a:spcPts val="800"/>
+              </a:spcAft>
+              <a:defRPr sz="1700">
+                <a:solidFill>
+                  <a:srgbClr val="233554"/>
+                </a:solidFill>
+              </a:defRPr>
+            </a:pPr>
+            <a:r>
+              <a:t>End with one reusable skill per developer</a:t>
             </a:r>
           </a:p>
         </p:txBody>
       </p:sp>
       <p:pic>
         <p:nvPicPr>
-          <p:cNvPr id="4" name="Picture 3" descr="cursor_settings_screen.png"/>
+          <p:cNvPr id="4" name="Picture 3" descr="tutorial_path.png"/>
           <p:cNvPicPr>
             <a:picLocks noChangeAspect="1"/>
           </p:cNvPicPr>
@@ -7350,8 +8080,8 @@
         </p:blipFill>
         <p:spPr>
           <a:xfrm>
-            <a:off x="4892040" y="1115568"/>
-            <a:ext cx="7086600" cy="3986212"/>
+            <a:off x="5440680" y="1124712"/>
+            <a:ext cx="6537960" cy="3677602"/>
           </a:xfrm>
           <a:prstGeom prst="rect">
             <a:avLst/>

</xml_diff>

<commit_message>
Update trainer and participant decks with video links slides
Co-authored-by: hassanahmedfoodservicesdirectunilever <hassanahmedfoodservicesdirectunilever@users.noreply.github.com>
</commit_message>
<xml_diff>
--- a/Solution_Assessment_Cursor_AI_Capabilities_Integration_Review.pptx
+++ b/Solution_Assessment_Cursor_AI_Capabilities_Integration_Review.pptx
@@ -28,6 +28,7 @@
     <p:sldId id="276" r:id="rId27"/>
     <p:sldId id="277" r:id="rId28"/>
     <p:sldId id="278" r:id="rId29"/>
+    <p:sldId id="279" r:id="rId30"/>
   </p:sldIdLst>
   <p:sldSz cx="12191695" cy="6858000" type="screen4x3"/>
   <p:notesSz cx="6858000" cy="9144000"/>
@@ -6612,6 +6613,497 @@
 </file>
 
 <file path=ppt/slides/slide23.xml><?xml version="1.0" encoding="utf-8"?>
+<p:sld xmlns:a="http://schemas.openxmlformats.org/drawingml/2006/main" xmlns:p="http://schemas.openxmlformats.org/presentationml/2006/main" xmlns:r="http://schemas.openxmlformats.org/officeDocument/2006/relationships">
+  <p:cSld>
+    <p:spTree>
+      <p:nvGrpSpPr>
+        <p:cNvPr id="1" name=""/>
+        <p:cNvGrpSpPr/>
+        <p:nvPr/>
+      </p:nvGrpSpPr>
+      <p:grpSpPr/>
+      <p:sp>
+        <p:nvSpPr>
+          <p:cNvPr id="2" name="TextBox 1"/>
+          <p:cNvSpPr txBox="1"/>
+          <p:nvPr/>
+        </p:nvSpPr>
+        <p:spPr>
+          <a:xfrm>
+            <a:off x="411480" y="146304"/>
+            <a:ext cx="11155680" cy="658368"/>
+          </a:xfrm>
+          <a:prstGeom prst="rect">
+            <a:avLst/>
+          </a:prstGeom>
+          <a:noFill/>
+        </p:spPr>
+        <p:txBody>
+          <a:bodyPr wrap="none">
+            <a:spAutoFit/>
+          </a:bodyPr>
+          <a:lstStyle/>
+          <a:p>
+            <a:pPr algn="l"/>
+            <a:r>
+              <a:rPr sz="3400" b="1">
+                <a:solidFill>
+                  <a:srgbClr val="14284A"/>
+                </a:solidFill>
+              </a:rPr>
+              <a:t>Recommended video links for self-learning</a:t>
+            </a:r>
+          </a:p>
+        </p:txBody>
+      </p:sp>
+      <p:sp>
+        <p:nvSpPr>
+          <p:cNvPr id="3" name="TextBox 2"/>
+          <p:cNvSpPr txBox="1"/>
+          <p:nvPr/>
+        </p:nvSpPr>
+        <p:spPr>
+          <a:xfrm>
+            <a:off x="438912" y="749808"/>
+            <a:ext cx="11155680" cy="420624"/>
+          </a:xfrm>
+          <a:prstGeom prst="rect">
+            <a:avLst/>
+          </a:prstGeom>
+          <a:noFill/>
+        </p:spPr>
+        <p:txBody>
+          <a:bodyPr wrap="none">
+            <a:spAutoFit/>
+          </a:bodyPr>
+          <a:lstStyle/>
+          <a:p>
+            <a:r>
+              <a:rPr sz="1800">
+                <a:solidFill>
+                  <a:srgbClr val="445678"/>
+                </a:solidFill>
+              </a:rPr>
+              <a:t>Share these with the team after training for continued practice.</a:t>
+            </a:r>
+          </a:p>
+        </p:txBody>
+      </p:sp>
+      <p:sp>
+        <p:nvSpPr>
+          <p:cNvPr id="4" name="TextBox 3"/>
+          <p:cNvSpPr txBox="1"/>
+          <p:nvPr/>
+        </p:nvSpPr>
+        <p:spPr>
+          <a:xfrm>
+            <a:off x="502920" y="1417320"/>
+            <a:ext cx="5577840" cy="5257800"/>
+          </a:xfrm>
+          <a:prstGeom prst="rect">
+            <a:avLst/>
+          </a:prstGeom>
+          <a:noFill/>
+        </p:spPr>
+        <p:txBody>
+          <a:bodyPr wrap="square">
+            <a:spAutoFit/>
+          </a:bodyPr>
+          <a:lstStyle/>
+          <a:p>
+            <a:pPr>
+              <a:spcAft>
+                <a:spcPts val="0"/>
+              </a:spcAft>
+              <a:defRPr sz="1700" b="1">
+                <a:solidFill>
+                  <a:srgbClr val="203458"/>
+                </a:solidFill>
+              </a:defRPr>
+            </a:pPr>
+            <a:r>
+              <a:t>1. Cursor AI beginner tutorial</a:t>
+            </a:r>
+          </a:p>
+          <a:p>
+            <a:pPr>
+              <a:spcAft>
+                <a:spcPts val="800"/>
+              </a:spcAft>
+              <a:defRPr sz="1200">
+                <a:solidFill>
+                  <a:srgbClr val="1858AB"/>
+                </a:solidFill>
+              </a:defRPr>
+            </a:pPr>
+            <a:r>
+              <a:t>https://www.youtube.com/results?search_query=Cursor+AI+beginner+tutorial</a:t>
+            </a:r>
+          </a:p>
+          <a:p>
+            <a:pPr>
+              <a:spcAft>
+                <a:spcPts val="0"/>
+              </a:spcAft>
+              <a:defRPr sz="1700" b="1">
+                <a:solidFill>
+                  <a:srgbClr val="203458"/>
+                </a:solidFill>
+              </a:defRPr>
+            </a:pPr>
+            <a:r>
+              <a:t>2. Cursor MCP setup tutorial</a:t>
+            </a:r>
+          </a:p>
+          <a:p>
+            <a:pPr>
+              <a:spcAft>
+                <a:spcPts val="800"/>
+              </a:spcAft>
+              <a:defRPr sz="1200">
+                <a:solidFill>
+                  <a:srgbClr val="1858AB"/>
+                </a:solidFill>
+              </a:defRPr>
+            </a:pPr>
+            <a:r>
+              <a:t>https://www.youtube.com/results?search_query=Cursor+MCP+setup+tutorial</a:t>
+            </a:r>
+          </a:p>
+          <a:p>
+            <a:pPr>
+              <a:spcAft>
+                <a:spcPts val="0"/>
+              </a:spcAft>
+              <a:defRPr sz="1700" b="1">
+                <a:solidFill>
+                  <a:srgbClr val="203458"/>
+                </a:solidFill>
+              </a:defRPr>
+            </a:pPr>
+            <a:r>
+              <a:t>3. Model Context Protocol explained</a:t>
+            </a:r>
+          </a:p>
+          <a:p>
+            <a:pPr>
+              <a:spcAft>
+                <a:spcPts val="800"/>
+              </a:spcAft>
+              <a:defRPr sz="1200">
+                <a:solidFill>
+                  <a:srgbClr val="1858AB"/>
+                </a:solidFill>
+              </a:defRPr>
+            </a:pPr>
+            <a:r>
+              <a:t>https://www.youtube.com/results?search_query=Model+Context+Protocol+explained</a:t>
+            </a:r>
+          </a:p>
+          <a:p>
+            <a:pPr>
+              <a:spcAft>
+                <a:spcPts val="0"/>
+              </a:spcAft>
+              <a:defRPr sz="1700" b="1">
+                <a:solidFill>
+                  <a:srgbClr val="203458"/>
+                </a:solidFill>
+              </a:defRPr>
+            </a:pPr>
+            <a:r>
+              <a:t>4. Anthropic MCP tutorial</a:t>
+            </a:r>
+          </a:p>
+          <a:p>
+            <a:pPr>
+              <a:spcAft>
+                <a:spcPts val="800"/>
+              </a:spcAft>
+              <a:defRPr sz="1200">
+                <a:solidFill>
+                  <a:srgbClr val="1858AB"/>
+                </a:solidFill>
+              </a:defRPr>
+            </a:pPr>
+            <a:r>
+              <a:t>https://www.youtube.com/results?search_query=Anthropic+MCP+tutorial</a:t>
+            </a:r>
+          </a:p>
+          <a:p>
+            <a:pPr>
+              <a:spcAft>
+                <a:spcPts val="0"/>
+              </a:spcAft>
+              <a:defRPr sz="1700" b="1">
+                <a:solidFill>
+                  <a:srgbClr val="203458"/>
+                </a:solidFill>
+              </a:defRPr>
+            </a:pPr>
+            <a:r>
+              <a:t>5. Jira REST API tutorial</a:t>
+            </a:r>
+          </a:p>
+          <a:p>
+            <a:pPr>
+              <a:spcAft>
+                <a:spcPts val="800"/>
+              </a:spcAft>
+              <a:defRPr sz="1200">
+                <a:solidFill>
+                  <a:srgbClr val="1858AB"/>
+                </a:solidFill>
+              </a:defRPr>
+            </a:pPr>
+            <a:r>
+              <a:t>https://www.youtube.com/results?search_query=Jira+REST+API+tutorial+developers</a:t>
+            </a:r>
+          </a:p>
+          <a:p>
+            <a:pPr>
+              <a:spcAft>
+                <a:spcPts val="0"/>
+              </a:spcAft>
+              <a:defRPr sz="1700" b="1">
+                <a:solidFill>
+                  <a:srgbClr val="203458"/>
+                </a:solidFill>
+              </a:defRPr>
+            </a:pPr>
+            <a:r>
+              <a:t>6. Figma API tutorial</a:t>
+            </a:r>
+          </a:p>
+          <a:p>
+            <a:pPr>
+              <a:spcAft>
+                <a:spcPts val="800"/>
+              </a:spcAft>
+              <a:defRPr sz="1200">
+                <a:solidFill>
+                  <a:srgbClr val="1858AB"/>
+                </a:solidFill>
+              </a:defRPr>
+            </a:pPr>
+            <a:r>
+              <a:t>https://www.youtube.com/results?search_query=Figma+API+tutorial+for+developers</a:t>
+            </a:r>
+          </a:p>
+        </p:txBody>
+      </p:sp>
+      <p:sp>
+        <p:nvSpPr>
+          <p:cNvPr id="5" name="TextBox 4"/>
+          <p:cNvSpPr txBox="1"/>
+          <p:nvPr/>
+        </p:nvSpPr>
+        <p:spPr>
+          <a:xfrm>
+            <a:off x="6172200" y="1417320"/>
+            <a:ext cx="5532120" cy="5257800"/>
+          </a:xfrm>
+          <a:prstGeom prst="rect">
+            <a:avLst/>
+          </a:prstGeom>
+          <a:noFill/>
+        </p:spPr>
+        <p:txBody>
+          <a:bodyPr wrap="square">
+            <a:spAutoFit/>
+          </a:bodyPr>
+          <a:lstStyle/>
+          <a:p>
+            <a:pPr>
+              <a:spcAft>
+                <a:spcPts val="0"/>
+              </a:spcAft>
+              <a:defRPr sz="1700" b="1">
+                <a:solidFill>
+                  <a:srgbClr val="203458"/>
+                </a:solidFill>
+              </a:defRPr>
+            </a:pPr>
+            <a:r>
+              <a:t>7. Bitbucket API tutorial</a:t>
+            </a:r>
+          </a:p>
+          <a:p>
+            <a:pPr>
+              <a:spcAft>
+                <a:spcPts val="800"/>
+              </a:spcAft>
+              <a:defRPr sz="1200">
+                <a:solidFill>
+                  <a:srgbClr val="1858AB"/>
+                </a:solidFill>
+              </a:defRPr>
+            </a:pPr>
+            <a:r>
+              <a:t>https://www.youtube.com/results?search_query=Bitbucket+API+tutorial</a:t>
+            </a:r>
+          </a:p>
+          <a:p>
+            <a:pPr>
+              <a:spcAft>
+                <a:spcPts val="0"/>
+              </a:spcAft>
+              <a:defRPr sz="1700" b="1">
+                <a:solidFill>
+                  <a:srgbClr val="203458"/>
+                </a:solidFill>
+              </a:defRPr>
+            </a:pPr>
+            <a:r>
+              <a:t>8. Prompt engineering for developers</a:t>
+            </a:r>
+          </a:p>
+          <a:p>
+            <a:pPr>
+              <a:spcAft>
+                <a:spcPts val="800"/>
+              </a:spcAft>
+              <a:defRPr sz="1200">
+                <a:solidFill>
+                  <a:srgbClr val="1858AB"/>
+                </a:solidFill>
+              </a:defRPr>
+            </a:pPr>
+            <a:r>
+              <a:t>https://www.youtube.com/results?search_query=Prompt+engineering+for+software+developers</a:t>
+            </a:r>
+          </a:p>
+          <a:p>
+            <a:pPr>
+              <a:spcAft>
+                <a:spcPts val="0"/>
+              </a:spcAft>
+              <a:defRPr sz="1700" b="1">
+                <a:solidFill>
+                  <a:srgbClr val="203458"/>
+                </a:solidFill>
+              </a:defRPr>
+            </a:pPr>
+            <a:r>
+              <a:t>9. AI agent workflow tutorials</a:t>
+            </a:r>
+          </a:p>
+          <a:p>
+            <a:pPr>
+              <a:spcAft>
+                <a:spcPts val="800"/>
+              </a:spcAft>
+              <a:defRPr sz="1200">
+                <a:solidFill>
+                  <a:srgbClr val="1858AB"/>
+                </a:solidFill>
+              </a:defRPr>
+            </a:pPr>
+            <a:r>
+              <a:t>https://www.youtube.com/results?search_query=AI+agent+workflow+tutorial+developers</a:t>
+            </a:r>
+          </a:p>
+          <a:p>
+            <a:pPr>
+              <a:spcAft>
+                <a:spcPts val="0"/>
+              </a:spcAft>
+              <a:defRPr sz="1700" b="1">
+                <a:solidFill>
+                  <a:srgbClr val="203458"/>
+                </a:solidFill>
+              </a:defRPr>
+            </a:pPr>
+            <a:r>
+              <a:t>10. Build MCP server in Python</a:t>
+            </a:r>
+          </a:p>
+          <a:p>
+            <a:pPr>
+              <a:spcAft>
+                <a:spcPts val="800"/>
+              </a:spcAft>
+              <a:defRPr sz="1200">
+                <a:solidFill>
+                  <a:srgbClr val="1858AB"/>
+                </a:solidFill>
+              </a:defRPr>
+            </a:pPr>
+            <a:r>
+              <a:t>https://www.youtube.com/results?search_query=Build+MCP+server+Python+tutorial</a:t>
+            </a:r>
+          </a:p>
+          <a:p>
+            <a:pPr>
+              <a:spcAft>
+                <a:spcPts val="0"/>
+              </a:spcAft>
+              <a:defRPr sz="1700" b="1">
+                <a:solidFill>
+                  <a:srgbClr val="203458"/>
+                </a:solidFill>
+              </a:defRPr>
+            </a:pPr>
+            <a:r>
+              <a:t>11. API token security best practices</a:t>
+            </a:r>
+          </a:p>
+          <a:p>
+            <a:pPr>
+              <a:spcAft>
+                <a:spcPts val="800"/>
+              </a:spcAft>
+              <a:defRPr sz="1200">
+                <a:solidFill>
+                  <a:srgbClr val="1858AB"/>
+                </a:solidFill>
+              </a:defRPr>
+            </a:pPr>
+            <a:r>
+              <a:t>https://www.youtube.com/results?search_query=API+token+security+best+practices</a:t>
+            </a:r>
+          </a:p>
+          <a:p>
+            <a:pPr>
+              <a:spcAft>
+                <a:spcPts val="0"/>
+              </a:spcAft>
+              <a:defRPr sz="1700" b="1">
+                <a:solidFill>
+                  <a:srgbClr val="203458"/>
+                </a:solidFill>
+              </a:defRPr>
+            </a:pPr>
+            <a:r>
+              <a:t>12. LLM governance for enterprise</a:t>
+            </a:r>
+          </a:p>
+          <a:p>
+            <a:pPr>
+              <a:spcAft>
+                <a:spcPts val="800"/>
+              </a:spcAft>
+              <a:defRPr sz="1200">
+                <a:solidFill>
+                  <a:srgbClr val="1858AB"/>
+                </a:solidFill>
+              </a:defRPr>
+            </a:pPr>
+            <a:r>
+              <a:t>https://www.youtube.com/results?search_query=LLM+governance+for+enterprise+teams</a:t>
+            </a:r>
+          </a:p>
+        </p:txBody>
+      </p:sp>
+    </p:spTree>
+  </p:cSld>
+  <p:clrMapOvr>
+    <a:masterClrMapping/>
+  </p:clrMapOvr>
+</p:sld>
+</file>
+
+<file path=ppt/slides/slide24.xml><?xml version="1.0" encoding="utf-8"?>
 <p:sld xmlns:a="http://schemas.openxmlformats.org/drawingml/2006/main" xmlns:p="http://schemas.openxmlformats.org/presentationml/2006/main" xmlns:r="http://schemas.openxmlformats.org/officeDocument/2006/relationships">
   <p:cSld>
     <p:spTree>

</xml_diff>